<commit_message>
added wasCalledBy, removed wasStartedBy, wasEndedBy
</commit_message>
<xml_diff>
--- a/Ingest/languagediagram.pptx
+++ b/Ingest/languagediagram.pptx
@@ -288,7 +288,7 @@
           <a:p>
             <a:fld id="{B39C4B1C-A8FF-8C49-B007-95A36DEBADE4}" type="datetimeFigureOut">
               <a:rPr lang="en-US" smtClean="0"/>
-              <a:t>11/3/15</a:t>
+              <a:t>12/2/15</a:t>
             </a:fld>
             <a:endParaRPr lang="en-US"/>
           </a:p>
@@ -458,7 +458,7 @@
           <a:p>
             <a:fld id="{B39C4B1C-A8FF-8C49-B007-95A36DEBADE4}" type="datetimeFigureOut">
               <a:rPr lang="en-US" smtClean="0"/>
-              <a:t>11/3/15</a:t>
+              <a:t>12/2/15</a:t>
             </a:fld>
             <a:endParaRPr lang="en-US"/>
           </a:p>
@@ -638,7 +638,7 @@
           <a:p>
             <a:fld id="{B39C4B1C-A8FF-8C49-B007-95A36DEBADE4}" type="datetimeFigureOut">
               <a:rPr lang="en-US" smtClean="0"/>
-              <a:t>11/3/15</a:t>
+              <a:t>12/2/15</a:t>
             </a:fld>
             <a:endParaRPr lang="en-US"/>
           </a:p>
@@ -808,7 +808,7 @@
           <a:p>
             <a:fld id="{B39C4B1C-A8FF-8C49-B007-95A36DEBADE4}" type="datetimeFigureOut">
               <a:rPr lang="en-US" smtClean="0"/>
-              <a:t>11/3/15</a:t>
+              <a:t>12/2/15</a:t>
             </a:fld>
             <a:endParaRPr lang="en-US"/>
           </a:p>
@@ -1054,7 +1054,7 @@
           <a:p>
             <a:fld id="{B39C4B1C-A8FF-8C49-B007-95A36DEBADE4}" type="datetimeFigureOut">
               <a:rPr lang="en-US" smtClean="0"/>
-              <a:t>11/3/15</a:t>
+              <a:t>12/2/15</a:t>
             </a:fld>
             <a:endParaRPr lang="en-US"/>
           </a:p>
@@ -1342,7 +1342,7 @@
           <a:p>
             <a:fld id="{B39C4B1C-A8FF-8C49-B007-95A36DEBADE4}" type="datetimeFigureOut">
               <a:rPr lang="en-US" smtClean="0"/>
-              <a:t>11/3/15</a:t>
+              <a:t>12/2/15</a:t>
             </a:fld>
             <a:endParaRPr lang="en-US"/>
           </a:p>
@@ -1764,7 +1764,7 @@
           <a:p>
             <a:fld id="{B39C4B1C-A8FF-8C49-B007-95A36DEBADE4}" type="datetimeFigureOut">
               <a:rPr lang="en-US" smtClean="0"/>
-              <a:t>11/3/15</a:t>
+              <a:t>12/2/15</a:t>
             </a:fld>
             <a:endParaRPr lang="en-US"/>
           </a:p>
@@ -1882,7 +1882,7 @@
           <a:p>
             <a:fld id="{B39C4B1C-A8FF-8C49-B007-95A36DEBADE4}" type="datetimeFigureOut">
               <a:rPr lang="en-US" smtClean="0"/>
-              <a:t>11/3/15</a:t>
+              <a:t>12/2/15</a:t>
             </a:fld>
             <a:endParaRPr lang="en-US"/>
           </a:p>
@@ -1977,7 +1977,7 @@
           <a:p>
             <a:fld id="{B39C4B1C-A8FF-8C49-B007-95A36DEBADE4}" type="datetimeFigureOut">
               <a:rPr lang="en-US" smtClean="0"/>
-              <a:t>11/3/15</a:t>
+              <a:t>12/2/15</a:t>
             </a:fld>
             <a:endParaRPr lang="en-US"/>
           </a:p>
@@ -2254,7 +2254,7 @@
           <a:p>
             <a:fld id="{B39C4B1C-A8FF-8C49-B007-95A36DEBADE4}" type="datetimeFigureOut">
               <a:rPr lang="en-US" smtClean="0"/>
-              <a:t>11/3/15</a:t>
+              <a:t>12/2/15</a:t>
             </a:fld>
             <a:endParaRPr lang="en-US"/>
           </a:p>
@@ -2507,7 +2507,7 @@
           <a:p>
             <a:fld id="{B39C4B1C-A8FF-8C49-B007-95A36DEBADE4}" type="datetimeFigureOut">
               <a:rPr lang="en-US" smtClean="0"/>
-              <a:t>11/3/15</a:t>
+              <a:t>12/2/15</a:t>
             </a:fld>
             <a:endParaRPr lang="en-US"/>
           </a:p>
@@ -2720,7 +2720,7 @@
           <a:p>
             <a:fld id="{B39C4B1C-A8FF-8C49-B007-95A36DEBADE4}" type="datetimeFigureOut">
               <a:rPr lang="en-US" smtClean="0"/>
-              <a:t>11/3/15</a:t>
+              <a:t>12/2/15</a:t>
             </a:fld>
             <a:endParaRPr lang="en-US"/>
           </a:p>
@@ -3473,7 +3473,7 @@
         <p:spPr>
           <a:xfrm>
             <a:off x="1177659" y="2978373"/>
-            <a:ext cx="1381233" cy="769441"/>
+            <a:ext cx="1381233" cy="600164"/>
           </a:xfrm>
           <a:prstGeom prst="rect">
             <a:avLst/>
@@ -3487,23 +3487,12 @@
           <a:lstStyle/>
           <a:p>
             <a:r>
+              <a:rPr lang="en-US" sz="1100" dirty="0" err="1"/>
+              <a:t>p</a:t>
+            </a:r>
+            <a:r>
               <a:rPr lang="en-US" sz="1100" dirty="0" err="1" smtClean="0"/>
-              <a:t>prov:wasStartedBy</a:t>
-            </a:r>
-            <a:r>
-              <a:rPr lang="en-US" sz="1100" dirty="0" smtClean="0"/>
-              <a:t>,</a:t>
-            </a:r>
-            <a:r>
-              <a:rPr lang="en-US" sz="1100" dirty="0" smtClean="0"/>
-              <a:t/>
-            </a:r>
-            <a:br>
-              <a:rPr lang="en-US" sz="1100" dirty="0" smtClean="0"/>
-            </a:br>
-            <a:r>
-              <a:rPr lang="en-US" sz="1100" dirty="0" err="1" smtClean="0"/>
-              <a:t>prov:wasEndedBy</a:t>
+              <a:t>rov-tc:wasCelledBy</a:t>
             </a:r>
             <a:r>
               <a:rPr lang="en-US" sz="1100" dirty="0" smtClean="0"/>

</xml_diff>

<commit_message>
updated diagram to prov-tc v2.0
</commit_message>
<xml_diff>
--- a/Ingest/languagediagram.pptx
+++ b/Ingest/languagediagram.pptx
@@ -288,7 +288,7 @@
           <a:p>
             <a:fld id="{B39C4B1C-A8FF-8C49-B007-95A36DEBADE4}" type="datetimeFigureOut">
               <a:rPr lang="en-US" smtClean="0"/>
-              <a:t>12/2/15</a:t>
+              <a:t>1/19/16</a:t>
             </a:fld>
             <a:endParaRPr lang="en-US"/>
           </a:p>
@@ -458,7 +458,7 @@
           <a:p>
             <a:fld id="{B39C4B1C-A8FF-8C49-B007-95A36DEBADE4}" type="datetimeFigureOut">
               <a:rPr lang="en-US" smtClean="0"/>
-              <a:t>12/2/15</a:t>
+              <a:t>1/19/16</a:t>
             </a:fld>
             <a:endParaRPr lang="en-US"/>
           </a:p>
@@ -638,7 +638,7 @@
           <a:p>
             <a:fld id="{B39C4B1C-A8FF-8C49-B007-95A36DEBADE4}" type="datetimeFigureOut">
               <a:rPr lang="en-US" smtClean="0"/>
-              <a:t>12/2/15</a:t>
+              <a:t>1/19/16</a:t>
             </a:fld>
             <a:endParaRPr lang="en-US"/>
           </a:p>
@@ -808,7 +808,7 @@
           <a:p>
             <a:fld id="{B39C4B1C-A8FF-8C49-B007-95A36DEBADE4}" type="datetimeFigureOut">
               <a:rPr lang="en-US" smtClean="0"/>
-              <a:t>12/2/15</a:t>
+              <a:t>1/19/16</a:t>
             </a:fld>
             <a:endParaRPr lang="en-US"/>
           </a:p>
@@ -1054,7 +1054,7 @@
           <a:p>
             <a:fld id="{B39C4B1C-A8FF-8C49-B007-95A36DEBADE4}" type="datetimeFigureOut">
               <a:rPr lang="en-US" smtClean="0"/>
-              <a:t>12/2/15</a:t>
+              <a:t>1/19/16</a:t>
             </a:fld>
             <a:endParaRPr lang="en-US"/>
           </a:p>
@@ -1342,7 +1342,7 @@
           <a:p>
             <a:fld id="{B39C4B1C-A8FF-8C49-B007-95A36DEBADE4}" type="datetimeFigureOut">
               <a:rPr lang="en-US" smtClean="0"/>
-              <a:t>12/2/15</a:t>
+              <a:t>1/19/16</a:t>
             </a:fld>
             <a:endParaRPr lang="en-US"/>
           </a:p>
@@ -1764,7 +1764,7 @@
           <a:p>
             <a:fld id="{B39C4B1C-A8FF-8C49-B007-95A36DEBADE4}" type="datetimeFigureOut">
               <a:rPr lang="en-US" smtClean="0"/>
-              <a:t>12/2/15</a:t>
+              <a:t>1/19/16</a:t>
             </a:fld>
             <a:endParaRPr lang="en-US"/>
           </a:p>
@@ -1882,7 +1882,7 @@
           <a:p>
             <a:fld id="{B39C4B1C-A8FF-8C49-B007-95A36DEBADE4}" type="datetimeFigureOut">
               <a:rPr lang="en-US" smtClean="0"/>
-              <a:t>12/2/15</a:t>
+              <a:t>1/19/16</a:t>
             </a:fld>
             <a:endParaRPr lang="en-US"/>
           </a:p>
@@ -1977,7 +1977,7 @@
           <a:p>
             <a:fld id="{B39C4B1C-A8FF-8C49-B007-95A36DEBADE4}" type="datetimeFigureOut">
               <a:rPr lang="en-US" smtClean="0"/>
-              <a:t>12/2/15</a:t>
+              <a:t>1/19/16</a:t>
             </a:fld>
             <a:endParaRPr lang="en-US"/>
           </a:p>
@@ -2254,7 +2254,7 @@
           <a:p>
             <a:fld id="{B39C4B1C-A8FF-8C49-B007-95A36DEBADE4}" type="datetimeFigureOut">
               <a:rPr lang="en-US" smtClean="0"/>
-              <a:t>12/2/15</a:t>
+              <a:t>1/19/16</a:t>
             </a:fld>
             <a:endParaRPr lang="en-US"/>
           </a:p>
@@ -2507,7 +2507,7 @@
           <a:p>
             <a:fld id="{B39C4B1C-A8FF-8C49-B007-95A36DEBADE4}" type="datetimeFigureOut">
               <a:rPr lang="en-US" smtClean="0"/>
-              <a:t>12/2/15</a:t>
+              <a:t>1/19/16</a:t>
             </a:fld>
             <a:endParaRPr lang="en-US"/>
           </a:p>
@@ -2720,7 +2720,7 @@
           <a:p>
             <a:fld id="{B39C4B1C-A8FF-8C49-B007-95A36DEBADE4}" type="datetimeFigureOut">
               <a:rPr lang="en-US" smtClean="0"/>
-              <a:t>12/2/15</a:t>
+              <a:t>1/19/16</a:t>
             </a:fld>
             <a:endParaRPr lang="en-US"/>
           </a:p>
@@ -3142,7 +3142,7 @@
         <p:spPr>
           <a:xfrm>
             <a:off x="5983996" y="1666540"/>
-            <a:ext cx="2025856" cy="2661010"/>
+            <a:ext cx="1463299" cy="2661010"/>
           </a:xfrm>
           <a:prstGeom prst="roundRect">
             <a:avLst/>
@@ -3179,8 +3179,8 @@
         </p:nvSpPr>
         <p:spPr>
           <a:xfrm>
-            <a:off x="78726" y="1509312"/>
-            <a:ext cx="1376568" cy="1251836"/>
+            <a:off x="488220" y="1509312"/>
+            <a:ext cx="967074" cy="944143"/>
           </a:xfrm>
           <a:prstGeom prst="roundRect">
             <a:avLst/>
@@ -3217,8 +3217,8 @@
         </p:nvSpPr>
         <p:spPr>
           <a:xfrm>
-            <a:off x="463062" y="1460514"/>
-            <a:ext cx="598967" cy="307777"/>
+            <a:off x="663331" y="1771518"/>
+            <a:ext cx="616851" cy="307777"/>
           </a:xfrm>
           <a:prstGeom prst="rect">
             <a:avLst/>
@@ -3234,9 +3234,8 @@
             <a:pPr algn="ctr"/>
             <a:r>
               <a:rPr lang="en-US" sz="1400" dirty="0" smtClean="0"/>
-              <a:t>agent</a:t>
-            </a:r>
-            <a:endParaRPr lang="en-US" sz="1400" dirty="0"/>
+              <a:t>Agent</a:t>
+            </a:r>
           </a:p>
         </p:txBody>
       </p:sp>
@@ -3367,8 +3366,8 @@
         </p:nvCxnSpPr>
         <p:spPr>
           <a:xfrm rot="16200000" flipV="1">
-            <a:off x="5226446" y="-103938"/>
-            <a:ext cx="165672" cy="3375284"/>
+            <a:off x="5085807" y="36701"/>
+            <a:ext cx="165672" cy="3094006"/>
           </a:xfrm>
           <a:prstGeom prst="bentConnector3">
             <a:avLst>
@@ -3472,8 +3471,8 @@
         </p:nvSpPr>
         <p:spPr>
           <a:xfrm>
-            <a:off x="1177659" y="2978373"/>
-            <a:ext cx="1381233" cy="600164"/>
+            <a:off x="1146184" y="2967246"/>
+            <a:ext cx="1381233" cy="430887"/>
           </a:xfrm>
           <a:prstGeom prst="rect">
             <a:avLst/>
@@ -3485,21 +3484,6 @@
             <a:spAutoFit/>
           </a:bodyPr>
           <a:lstStyle/>
-          <a:p>
-            <a:r>
-              <a:rPr lang="en-US" sz="1100" dirty="0" err="1"/>
-              <a:t>p</a:t>
-            </a:r>
-            <a:r>
-              <a:rPr lang="en-US" sz="1100" dirty="0" err="1" smtClean="0"/>
-              <a:t>rov-tc:wasCelledBy</a:t>
-            </a:r>
-            <a:r>
-              <a:rPr lang="en-US" sz="1100" dirty="0" smtClean="0"/>
-              <a:t>,</a:t>
-            </a:r>
-            <a:endParaRPr lang="en-US" sz="1100" dirty="0" smtClean="0"/>
-          </a:p>
           <a:p>
             <a:r>
               <a:rPr lang="en-US" sz="1100" dirty="0" err="1" smtClean="0"/>
@@ -3523,13 +3507,13 @@
         </p:nvCxnSpPr>
         <p:spPr>
           <a:xfrm rot="5400000" flipH="1" flipV="1">
-            <a:off x="6838135" y="3155834"/>
-            <a:ext cx="1330505" cy="1012928"/>
+            <a:off x="6416217" y="3296473"/>
+            <a:ext cx="1330505" cy="731649"/>
           </a:xfrm>
           <a:prstGeom prst="bentConnector4">
             <a:avLst>
               <a:gd name="adj1" fmla="val -17181"/>
-              <a:gd name="adj2" fmla="val 122568"/>
+              <a:gd name="adj2" fmla="val 131244"/>
             </a:avLst>
           </a:prstGeom>
           <a:ln>
@@ -3559,7 +3543,7 @@
         </p:nvSpPr>
         <p:spPr>
           <a:xfrm>
-            <a:off x="7479134" y="4507755"/>
+            <a:off x="7158301" y="4512215"/>
             <a:ext cx="1570487" cy="276999"/>
           </a:xfrm>
           <a:prstGeom prst="rect">
@@ -3593,12 +3577,12 @@
         </p:nvCxnSpPr>
         <p:spPr>
           <a:xfrm rot="16200000" flipV="1">
-            <a:off x="3803353" y="-1527031"/>
-            <a:ext cx="157228" cy="6229914"/>
+            <a:off x="3765088" y="-1284019"/>
+            <a:ext cx="157228" cy="5743889"/>
           </a:xfrm>
           <a:prstGeom prst="bentConnector3">
             <a:avLst>
-              <a:gd name="adj1" fmla="val 482618"/>
+              <a:gd name="adj1" fmla="val 477395"/>
             </a:avLst>
           </a:prstGeom>
           <a:ln>
@@ -3981,8 +3965,8 @@
         </p:nvSpPr>
         <p:spPr>
           <a:xfrm>
-            <a:off x="2339321" y="3907085"/>
-            <a:ext cx="496250" cy="338554"/>
+            <a:off x="2310767" y="3409260"/>
+            <a:ext cx="494446" cy="338554"/>
           </a:xfrm>
           <a:prstGeom prst="rect">
             <a:avLst/>
@@ -3997,7 +3981,11 @@
           <a:p>
             <a:r>
               <a:rPr lang="en-US" sz="1600" dirty="0" smtClean="0"/>
-              <a:t>0..1</a:t>
+              <a:t>0.</a:t>
+            </a:r>
+            <a:r>
+              <a:rPr lang="en-US" sz="1600" dirty="0" smtClean="0"/>
+              <a:t>.*</a:t>
             </a:r>
             <a:endParaRPr lang="en-US" sz="1600" dirty="0"/>
           </a:p>
@@ -4101,7 +4089,7 @@
         </p:nvSpPr>
         <p:spPr>
           <a:xfrm>
-            <a:off x="814806" y="1162314"/>
+            <a:off x="939497" y="1236658"/>
             <a:ext cx="494446" cy="338554"/>
           </a:xfrm>
           <a:prstGeom prst="rect">
@@ -4131,7 +4119,7 @@
         </p:nvSpPr>
         <p:spPr>
           <a:xfrm>
-            <a:off x="6952849" y="1323158"/>
+            <a:off x="6715646" y="1317673"/>
             <a:ext cx="494446" cy="338554"/>
           </a:xfrm>
           <a:prstGeom prst="rect">
@@ -4311,7 +4299,7 @@
         </p:nvSpPr>
         <p:spPr>
           <a:xfrm>
-            <a:off x="7092856" y="4273142"/>
+            <a:off x="6221200" y="4312161"/>
             <a:ext cx="494446" cy="338554"/>
           </a:xfrm>
           <a:prstGeom prst="rect">
@@ -4341,7 +4329,7 @@
         </p:nvSpPr>
         <p:spPr>
           <a:xfrm>
-            <a:off x="8009852" y="2639819"/>
+            <a:off x="7447295" y="2639819"/>
             <a:ext cx="496250" cy="338554"/>
           </a:xfrm>
           <a:prstGeom prst="rect">
@@ -4365,14 +4353,14 @@
       </p:sp>
       <p:sp>
         <p:nvSpPr>
-          <p:cNvPr id="105" name="Rounded Rectangle 104"/>
+          <p:cNvPr id="66" name="Rounded Rectangle 65"/>
           <p:cNvSpPr/>
           <p:nvPr/>
         </p:nvSpPr>
         <p:spPr>
           <a:xfrm>
-            <a:off x="5755896" y="5684964"/>
-            <a:ext cx="2363906" cy="922045"/>
+            <a:off x="3880355" y="4998603"/>
+            <a:ext cx="1177887" cy="482105"/>
           </a:xfrm>
           <a:prstGeom prst="roundRect">
             <a:avLst/>
@@ -4403,14 +4391,14 @@
       </p:sp>
       <p:sp>
         <p:nvSpPr>
-          <p:cNvPr id="110" name="TextBox 109"/>
+          <p:cNvPr id="67" name="TextBox 66"/>
           <p:cNvSpPr txBox="1"/>
           <p:nvPr/>
         </p:nvSpPr>
         <p:spPr>
           <a:xfrm>
-            <a:off x="6492843" y="5639418"/>
-            <a:ext cx="890012" cy="307777"/>
+            <a:off x="4049414" y="5049340"/>
+            <a:ext cx="864339" cy="307777"/>
           </a:xfrm>
           <a:prstGeom prst="rect">
             <a:avLst/>
@@ -4423,179 +4411,13 @@
           </a:bodyPr>
           <a:lstStyle/>
           <a:p>
-            <a:pPr algn="ctr"/>
+            <a:r>
+              <a:rPr lang="en-US" sz="1400" dirty="0"/>
+              <a:t>R</a:t>
+            </a:r>
             <a:r>
               <a:rPr lang="en-US" sz="1400" dirty="0" smtClean="0"/>
-              <a:t>metadata</a:t>
-            </a:r>
-            <a:endParaRPr lang="en-US" sz="1400" dirty="0"/>
-          </a:p>
-        </p:txBody>
-      </p:sp>
-      <p:cxnSp>
-        <p:nvCxnSpPr>
-          <p:cNvPr id="112" name="Elbow Connector 111"/>
-          <p:cNvCxnSpPr>
-            <a:stCxn id="105" idx="0"/>
-          </p:cNvCxnSpPr>
-          <p:nvPr/>
-        </p:nvCxnSpPr>
-        <p:spPr>
-          <a:xfrm rot="16200000" flipV="1">
-            <a:off x="6039011" y="4786126"/>
-            <a:ext cx="1357410" cy="440266"/>
-          </a:xfrm>
-          <a:prstGeom prst="bentConnector3">
-            <a:avLst>
-              <a:gd name="adj1" fmla="val 50000"/>
-            </a:avLst>
-          </a:prstGeom>
-          <a:ln>
-            <a:tailEnd type="arrow"/>
-          </a:ln>
-        </p:spPr>
-        <p:style>
-          <a:lnRef idx="2">
-            <a:schemeClr val="accent1"/>
-          </a:lnRef>
-          <a:fillRef idx="0">
-            <a:schemeClr val="accent1"/>
-          </a:fillRef>
-          <a:effectRef idx="1">
-            <a:schemeClr val="accent1"/>
-          </a:effectRef>
-          <a:fontRef idx="minor">
-            <a:schemeClr val="tx1"/>
-          </a:fontRef>
-        </p:style>
-      </p:cxnSp>
-      <p:sp>
-        <p:nvSpPr>
-          <p:cNvPr id="120" name="TextBox 119"/>
-          <p:cNvSpPr txBox="1"/>
-          <p:nvPr/>
-        </p:nvSpPr>
-        <p:spPr>
-          <a:xfrm>
-            <a:off x="5304467" y="5765903"/>
-            <a:ext cx="494446" cy="338554"/>
-          </a:xfrm>
-          <a:prstGeom prst="rect">
-            <a:avLst/>
-          </a:prstGeom>
-          <a:noFill/>
-        </p:spPr>
-        <p:txBody>
-          <a:bodyPr wrap="none" rtlCol="0">
-            <a:spAutoFit/>
-          </a:bodyPr>
-          <a:lstStyle/>
-          <a:p>
-            <a:r>
-              <a:rPr lang="en-US" sz="1600" dirty="0" smtClean="0"/>
-              <a:t>0..*</a:t>
-            </a:r>
-            <a:endParaRPr lang="en-US" sz="1600" dirty="0"/>
-          </a:p>
-        </p:txBody>
-      </p:sp>
-      <p:sp>
-        <p:nvSpPr>
-          <p:cNvPr id="121" name="TextBox 120"/>
-          <p:cNvSpPr txBox="1"/>
-          <p:nvPr/>
-        </p:nvSpPr>
-        <p:spPr>
-          <a:xfrm>
-            <a:off x="6018694" y="4280719"/>
-            <a:ext cx="496250" cy="338554"/>
-          </a:xfrm>
-          <a:prstGeom prst="rect">
-            <a:avLst/>
-          </a:prstGeom>
-          <a:noFill/>
-        </p:spPr>
-        <p:txBody>
-          <a:bodyPr wrap="none" rtlCol="0">
-            <a:spAutoFit/>
-          </a:bodyPr>
-          <a:lstStyle/>
-          <a:p>
-            <a:r>
-              <a:rPr lang="en-US" sz="1600" dirty="0"/>
-              <a:t>1</a:t>
-            </a:r>
-            <a:r>
-              <a:rPr lang="en-US" sz="1600" dirty="0" smtClean="0"/>
-              <a:t>..1</a:t>
-            </a:r>
-            <a:endParaRPr lang="en-US" sz="1600" dirty="0"/>
-          </a:p>
-        </p:txBody>
-      </p:sp>
-      <p:sp>
-        <p:nvSpPr>
-          <p:cNvPr id="66" name="Rounded Rectangle 65"/>
-          <p:cNvSpPr/>
-          <p:nvPr/>
-        </p:nvSpPr>
-        <p:spPr>
-          <a:xfrm>
-            <a:off x="2473298" y="5622352"/>
-            <a:ext cx="1177887" cy="482105"/>
-          </a:xfrm>
-          <a:prstGeom prst="roundRect">
-            <a:avLst/>
-          </a:prstGeom>
-        </p:spPr>
-        <p:style>
-          <a:lnRef idx="1">
-            <a:schemeClr val="accent1"/>
-          </a:lnRef>
-          <a:fillRef idx="3">
-            <a:schemeClr val="accent1"/>
-          </a:fillRef>
-          <a:effectRef idx="2">
-            <a:schemeClr val="accent1"/>
-          </a:effectRef>
-          <a:fontRef idx="minor">
-            <a:schemeClr val="lt1"/>
-          </a:fontRef>
-        </p:style>
-        <p:txBody>
-          <a:bodyPr rtlCol="0" anchor="ctr"/>
-          <a:lstStyle/>
-          <a:p>
-            <a:pPr algn="ctr"/>
-            <a:endParaRPr lang="en-US"/>
-          </a:p>
-        </p:txBody>
-      </p:sp>
-      <p:sp>
-        <p:nvSpPr>
-          <p:cNvPr id="67" name="TextBox 66"/>
-          <p:cNvSpPr txBox="1"/>
-          <p:nvPr/>
-        </p:nvSpPr>
-        <p:spPr>
-          <a:xfrm>
-            <a:off x="2558892" y="5612014"/>
-            <a:ext cx="825867" cy="307777"/>
-          </a:xfrm>
-          <a:prstGeom prst="rect">
-            <a:avLst/>
-          </a:prstGeom>
-          <a:noFill/>
-        </p:spPr>
-        <p:txBody>
-          <a:bodyPr wrap="none" rtlCol="0">
-            <a:spAutoFit/>
-          </a:bodyPr>
-          <a:lstStyle/>
-          <a:p>
-            <a:r>
-              <a:rPr lang="en-US" sz="1400" dirty="0" smtClean="0"/>
-              <a:t>resource</a:t>
+              <a:t>esource</a:t>
             </a:r>
             <a:endParaRPr lang="en-US" sz="1400" dirty="0"/>
           </a:p>
@@ -4640,7 +4462,7 @@
         <p:spPr>
           <a:xfrm flipH="1">
             <a:off x="1177659" y="2896390"/>
-            <a:ext cx="1" cy="1329897"/>
+            <a:ext cx="2" cy="512870"/>
           </a:xfrm>
           <a:prstGeom prst="line">
             <a:avLst/>
@@ -4669,7 +4491,7 @@
         </p:nvCxnSpPr>
         <p:spPr>
           <a:xfrm>
-            <a:off x="1177659" y="4226287"/>
+            <a:off x="1146002" y="3390427"/>
             <a:ext cx="1598086" cy="0"/>
           </a:xfrm>
           <a:prstGeom prst="straightConnector1">
@@ -4702,7 +4524,7 @@
         </p:nvSpPr>
         <p:spPr>
           <a:xfrm>
-            <a:off x="2473299" y="4275477"/>
+            <a:off x="3837894" y="4277454"/>
             <a:ext cx="494446" cy="338554"/>
           </a:xfrm>
           <a:prstGeom prst="rect">
@@ -4728,14 +4550,15 @@
         <p:nvCxnSpPr>
           <p:cNvPr id="95" name="Straight Arrow Connector 94"/>
           <p:cNvCxnSpPr>
-            <a:endCxn id="67" idx="0"/>
+            <a:stCxn id="4" idx="2"/>
+            <a:endCxn id="66" idx="0"/>
           </p:cNvCxnSpPr>
           <p:nvPr/>
         </p:nvCxnSpPr>
         <p:spPr>
-          <a:xfrm flipH="1">
-            <a:off x="2971826" y="4343923"/>
-            <a:ext cx="246384" cy="1268091"/>
+          <a:xfrm>
+            <a:off x="3621640" y="4327551"/>
+            <a:ext cx="847659" cy="671052"/>
           </a:xfrm>
           <a:prstGeom prst="straightConnector1">
             <a:avLst/>
@@ -4767,7 +4590,7 @@
         </p:nvSpPr>
         <p:spPr>
           <a:xfrm>
-            <a:off x="2967774" y="5292596"/>
+            <a:off x="3837894" y="4686177"/>
             <a:ext cx="533540" cy="338554"/>
           </a:xfrm>
           <a:prstGeom prst="rect">
@@ -4797,7 +4620,7 @@
         </p:nvSpPr>
         <p:spPr>
           <a:xfrm>
-            <a:off x="2004540" y="4692376"/>
+            <a:off x="4017013" y="4616008"/>
             <a:ext cx="1108703" cy="276999"/>
           </a:xfrm>
           <a:prstGeom prst="rect">
@@ -4819,18 +4642,271 @@
           </a:p>
         </p:txBody>
       </p:sp>
+      <p:sp>
+        <p:nvSpPr>
+          <p:cNvPr id="71" name="TextBox 70"/>
+          <p:cNvSpPr txBox="1"/>
+          <p:nvPr/>
+        </p:nvSpPr>
+        <p:spPr>
+          <a:xfrm>
+            <a:off x="7648673" y="3398133"/>
+            <a:ext cx="877163" cy="276999"/>
+          </a:xfrm>
+          <a:prstGeom prst="rect">
+            <a:avLst/>
+          </a:prstGeom>
+          <a:noFill/>
+        </p:spPr>
+        <p:txBody>
+          <a:bodyPr wrap="none" rtlCol="0">
+            <a:spAutoFit/>
+          </a:bodyPr>
+          <a:lstStyle/>
+          <a:p>
+            <a:pPr algn="ctr"/>
+            <a:r>
+              <a:rPr lang="en-US" sz="1200" dirty="0" err="1" smtClean="0"/>
+              <a:t>dc:isPartOf</a:t>
+            </a:r>
+            <a:endParaRPr lang="en-US" sz="1200" dirty="0"/>
+          </a:p>
+        </p:txBody>
+      </p:sp>
+      <p:sp>
+        <p:nvSpPr>
+          <p:cNvPr id="73" name="TextBox 72"/>
+          <p:cNvSpPr txBox="1"/>
+          <p:nvPr/>
+        </p:nvSpPr>
+        <p:spPr>
+          <a:xfrm>
+            <a:off x="2946557" y="1871367"/>
+            <a:ext cx="1362347" cy="1815882"/>
+          </a:xfrm>
+          <a:prstGeom prst="rect">
+            <a:avLst/>
+          </a:prstGeom>
+          <a:noFill/>
+        </p:spPr>
+        <p:txBody>
+          <a:bodyPr wrap="none" rtlCol="0">
+            <a:spAutoFit/>
+          </a:bodyPr>
+          <a:lstStyle/>
+          <a:p>
+            <a:pPr algn="ctr"/>
+            <a:r>
+              <a:rPr lang="en-US" sz="1400" u="sng" dirty="0" smtClean="0"/>
+              <a:t>unitOfExecution</a:t>
+            </a:r>
+          </a:p>
+          <a:p>
+            <a:pPr algn="ctr"/>
+            <a:r>
+              <a:rPr lang="en-US" sz="1400" dirty="0" smtClean="0"/>
+              <a:t>Types:</a:t>
+            </a:r>
+          </a:p>
+          <a:p>
+            <a:pPr algn="ctr"/>
+            <a:r>
+              <a:rPr lang="en-US" sz="1400" dirty="0" smtClean="0"/>
+              <a:t>Process</a:t>
+            </a:r>
+          </a:p>
+          <a:p>
+            <a:pPr algn="ctr"/>
+            <a:r>
+              <a:rPr lang="en-US" sz="1400" dirty="0" smtClean="0"/>
+              <a:t>Thread</a:t>
+            </a:r>
+          </a:p>
+          <a:p>
+            <a:pPr algn="ctr"/>
+            <a:r>
+              <a:rPr lang="en-US" sz="1400" dirty="0" smtClean="0"/>
+              <a:t>Function</a:t>
+            </a:r>
+          </a:p>
+          <a:p>
+            <a:pPr algn="ctr"/>
+            <a:r>
+              <a:rPr lang="en-US" sz="1400" dirty="0" smtClean="0"/>
+              <a:t>Basic block</a:t>
+            </a:r>
+          </a:p>
+          <a:p>
+            <a:pPr algn="ctr"/>
+            <a:r>
+              <a:rPr lang="en-US" sz="1400" dirty="0" smtClean="0"/>
+              <a:t>Instruction</a:t>
+            </a:r>
+          </a:p>
+          <a:p>
+            <a:pPr algn="ctr"/>
+            <a:r>
+              <a:rPr lang="en-US" sz="1400" dirty="0" smtClean="0"/>
+              <a:t>Event</a:t>
+            </a:r>
+            <a:endParaRPr lang="en-US" sz="1400" dirty="0"/>
+          </a:p>
+        </p:txBody>
+      </p:sp>
+      <p:sp>
+        <p:nvSpPr>
+          <p:cNvPr id="115" name="TextBox 114"/>
+          <p:cNvSpPr txBox="1"/>
+          <p:nvPr/>
+        </p:nvSpPr>
+        <p:spPr>
+          <a:xfrm>
+            <a:off x="6073744" y="2370949"/>
+            <a:ext cx="1405390" cy="1384995"/>
+          </a:xfrm>
+          <a:prstGeom prst="rect">
+            <a:avLst/>
+          </a:prstGeom>
+          <a:noFill/>
+        </p:spPr>
+        <p:txBody>
+          <a:bodyPr wrap="none" rtlCol="0">
+            <a:spAutoFit/>
+          </a:bodyPr>
+          <a:lstStyle/>
+          <a:p>
+            <a:pPr algn="ctr"/>
+            <a:r>
+              <a:rPr lang="en-US" sz="1400" u="sng" dirty="0" smtClean="0"/>
+              <a:t>Artifact</a:t>
+            </a:r>
+          </a:p>
+          <a:p>
+            <a:pPr algn="ctr"/>
+            <a:r>
+              <a:rPr lang="en-US" sz="1400" dirty="0" smtClean="0"/>
+              <a:t>Types:</a:t>
+            </a:r>
+          </a:p>
+          <a:p>
+            <a:pPr algn="ctr"/>
+            <a:r>
+              <a:rPr lang="en-US" sz="1400" dirty="0" smtClean="0"/>
+              <a:t>File</a:t>
+            </a:r>
+          </a:p>
+          <a:p>
+            <a:pPr algn="ctr"/>
+            <a:r>
+              <a:rPr lang="en-US" sz="1400" dirty="0" smtClean="0"/>
+              <a:t>Memory area</a:t>
+            </a:r>
+          </a:p>
+          <a:p>
+            <a:pPr algn="ctr"/>
+            <a:r>
+              <a:rPr lang="en-US" sz="1400" dirty="0" smtClean="0"/>
+              <a:t>Network socket</a:t>
+            </a:r>
+          </a:p>
+          <a:p>
+            <a:pPr algn="ctr"/>
+            <a:r>
+              <a:rPr lang="en-US" sz="1400" dirty="0" smtClean="0"/>
+              <a:t>Ephemeral value</a:t>
+            </a:r>
+            <a:endParaRPr lang="en-US" sz="1400" dirty="0"/>
+          </a:p>
+        </p:txBody>
+      </p:sp>
+      <p:sp>
+        <p:nvSpPr>
+          <p:cNvPr id="65" name="Rounded Rectangle 64"/>
+          <p:cNvSpPr/>
+          <p:nvPr/>
+        </p:nvSpPr>
+        <p:spPr>
+          <a:xfrm>
+            <a:off x="2946557" y="5818881"/>
+            <a:ext cx="1360914" cy="387208"/>
+          </a:xfrm>
+          <a:prstGeom prst="roundRect">
+            <a:avLst/>
+          </a:prstGeom>
+        </p:spPr>
+        <p:style>
+          <a:lnRef idx="1">
+            <a:schemeClr val="accent1"/>
+          </a:lnRef>
+          <a:fillRef idx="3">
+            <a:schemeClr val="accent1"/>
+          </a:fillRef>
+          <a:effectRef idx="2">
+            <a:schemeClr val="accent1"/>
+          </a:effectRef>
+          <a:fontRef idx="minor">
+            <a:schemeClr val="lt1"/>
+          </a:fontRef>
+        </p:style>
+        <p:txBody>
+          <a:bodyPr rtlCol="0" anchor="ctr"/>
+          <a:lstStyle/>
+          <a:p>
+            <a:pPr algn="ctr"/>
+            <a:endParaRPr lang="en-US"/>
+          </a:p>
+        </p:txBody>
+      </p:sp>
+      <p:sp>
+        <p:nvSpPr>
+          <p:cNvPr id="68" name="TextBox 67"/>
+          <p:cNvSpPr txBox="1"/>
+          <p:nvPr/>
+        </p:nvSpPr>
+        <p:spPr>
+          <a:xfrm>
+            <a:off x="3386031" y="5858596"/>
+            <a:ext cx="521560" cy="307777"/>
+          </a:xfrm>
+          <a:prstGeom prst="rect">
+            <a:avLst/>
+          </a:prstGeom>
+          <a:noFill/>
+        </p:spPr>
+        <p:txBody>
+          <a:bodyPr wrap="none" rtlCol="0">
+            <a:spAutoFit/>
+          </a:bodyPr>
+          <a:lstStyle/>
+          <a:p>
+            <a:pPr algn="ctr"/>
+            <a:r>
+              <a:rPr lang="en-US" sz="1400" dirty="0"/>
+              <a:t>H</a:t>
+            </a:r>
+            <a:r>
+              <a:rPr lang="en-US" sz="1400" dirty="0" smtClean="0"/>
+              <a:t>ost</a:t>
+            </a:r>
+            <a:endParaRPr lang="en-US" sz="1400" dirty="0"/>
+          </a:p>
+        </p:txBody>
+      </p:sp>
       <p:cxnSp>
         <p:nvCxnSpPr>
-          <p:cNvPr id="108" name="Elbow Connector 107"/>
-          <p:cNvCxnSpPr/>
+          <p:cNvPr id="79" name="Straight Arrow Connector 78"/>
+          <p:cNvCxnSpPr>
+            <a:stCxn id="66" idx="2"/>
+            <a:endCxn id="65" idx="0"/>
+          </p:cNvCxnSpPr>
           <p:nvPr/>
         </p:nvCxnSpPr>
         <p:spPr>
-          <a:xfrm rot="10800000">
-            <a:off x="4005003" y="4327550"/>
-            <a:ext cx="1741538" cy="1887894"/>
-          </a:xfrm>
-          <a:prstGeom prst="bentConnector2">
+          <a:xfrm flipH="1">
+            <a:off x="3627014" y="5480708"/>
+            <a:ext cx="842285" cy="338173"/>
+          </a:xfrm>
+          <a:prstGeom prst="straightConnector1">
             <a:avLst/>
           </a:prstGeom>
           <a:ln>
@@ -4852,16 +4928,88 @@
           </a:fontRef>
         </p:style>
       </p:cxnSp>
-      <p:sp>
-        <p:nvSpPr>
-          <p:cNvPr id="109" name="TextBox 108"/>
+      <p:cxnSp>
+        <p:nvCxnSpPr>
+          <p:cNvPr id="21" name="Elbow Connector 20"/>
+          <p:cNvCxnSpPr>
+            <a:stCxn id="6" idx="2"/>
+            <a:endCxn id="65" idx="1"/>
+          </p:cNvCxnSpPr>
+          <p:nvPr/>
+        </p:nvCxnSpPr>
+        <p:spPr>
+          <a:xfrm rot="16200000" flipH="1">
+            <a:off x="179642" y="3245570"/>
+            <a:ext cx="3559030" cy="1974800"/>
+          </a:xfrm>
+          <a:prstGeom prst="bentConnector2">
+            <a:avLst/>
+          </a:prstGeom>
+          <a:ln>
+            <a:tailEnd type="arrow"/>
+          </a:ln>
+        </p:spPr>
+        <p:style>
+          <a:lnRef idx="2">
+            <a:schemeClr val="accent1"/>
+          </a:lnRef>
+          <a:fillRef idx="0">
+            <a:schemeClr val="accent1"/>
+          </a:fillRef>
+          <a:effectRef idx="1">
+            <a:schemeClr val="accent1"/>
+          </a:effectRef>
+          <a:fontRef idx="minor">
+            <a:schemeClr val="tx1"/>
+          </a:fontRef>
+        </p:style>
+      </p:cxnSp>
+      <p:cxnSp>
+        <p:nvCxnSpPr>
+          <p:cNvPr id="97" name="Elbow Connector 96"/>
+          <p:cNvCxnSpPr>
+            <a:stCxn id="5" idx="2"/>
+            <a:endCxn id="65" idx="3"/>
+          </p:cNvCxnSpPr>
+          <p:nvPr/>
+        </p:nvCxnSpPr>
+        <p:spPr>
+          <a:xfrm rot="5400000">
+            <a:off x="4669092" y="3965930"/>
+            <a:ext cx="1684935" cy="2408175"/>
+          </a:xfrm>
+          <a:prstGeom prst="bentConnector2">
+            <a:avLst/>
+          </a:prstGeom>
+          <a:ln>
+            <a:tailEnd type="arrow"/>
+          </a:ln>
+        </p:spPr>
+        <p:style>
+          <a:lnRef idx="2">
+            <a:schemeClr val="accent1"/>
+          </a:lnRef>
+          <a:fillRef idx="0">
+            <a:schemeClr val="accent1"/>
+          </a:fillRef>
+          <a:effectRef idx="1">
+            <a:schemeClr val="accent1"/>
+          </a:effectRef>
+          <a:fontRef idx="minor">
+            <a:schemeClr val="tx1"/>
+          </a:fontRef>
+        </p:style>
+      </p:cxnSp>
+      <p:sp>
+        <p:nvSpPr>
+          <p:cNvPr id="107" name="TextBox 106"/>
           <p:cNvSpPr txBox="1"/>
           <p:nvPr/>
         </p:nvSpPr>
         <p:spPr>
           <a:xfrm>
-            <a:off x="3980067" y="5965957"/>
-            <a:ext cx="1072003" cy="276999"/>
+            <a:off x="5391067" y="5756696"/>
+            <a:ext cx="1321471" cy="276999"/>
           </a:xfrm>
           <a:prstGeom prst="rect">
             <a:avLst/>
@@ -4876,23 +5024,27 @@
           <a:p>
             <a:pPr algn="ctr"/>
             <a:r>
+              <a:rPr lang="en-US" sz="1200" dirty="0" err="1"/>
+              <a:t>p</a:t>
+            </a:r>
+            <a:r>
               <a:rPr lang="en-US" sz="1200" dirty="0" err="1" smtClean="0"/>
-              <a:t>dc:description</a:t>
-            </a:r>
-            <a:endParaRPr lang="en-US" sz="1200" dirty="0"/>
-          </a:p>
-        </p:txBody>
-      </p:sp>
-      <p:sp>
-        <p:nvSpPr>
-          <p:cNvPr id="113" name="TextBox 112"/>
+              <a:t>rov-tc:residedOn</a:t>
+            </a:r>
+            <a:endParaRPr lang="en-US" sz="1200" dirty="0" smtClean="0"/>
+          </a:p>
+        </p:txBody>
+      </p:sp>
+      <p:sp>
+        <p:nvSpPr>
+          <p:cNvPr id="111" name="TextBox 110"/>
           <p:cNvSpPr txBox="1"/>
           <p:nvPr/>
         </p:nvSpPr>
         <p:spPr>
           <a:xfrm>
-            <a:off x="6423816" y="5346410"/>
-            <a:ext cx="494446" cy="338554"/>
+            <a:off x="931270" y="5770753"/>
+            <a:ext cx="1606479" cy="276999"/>
           </a:xfrm>
           <a:prstGeom prst="rect">
             <a:avLst/>
@@ -4905,24 +5057,29 @@
           </a:bodyPr>
           <a:lstStyle/>
           <a:p>
-            <a:r>
-              <a:rPr lang="en-US" sz="1600" dirty="0" smtClean="0"/>
-              <a:t>0..*</a:t>
-            </a:r>
-            <a:endParaRPr lang="en-US" sz="1600" dirty="0"/>
-          </a:p>
-        </p:txBody>
-      </p:sp>
-      <p:sp>
-        <p:nvSpPr>
-          <p:cNvPr id="114" name="TextBox 113"/>
+            <a:pPr algn="ctr"/>
+            <a:r>
+              <a:rPr lang="en-US" sz="1200" dirty="0" err="1"/>
+              <a:t>p</a:t>
+            </a:r>
+            <a:r>
+              <a:rPr lang="en-US" sz="1200" dirty="0" err="1" smtClean="0"/>
+              <a:t>rov-tc:hadAccountOn</a:t>
+            </a:r>
+            <a:endParaRPr lang="en-US" sz="1200" dirty="0" smtClean="0"/>
+          </a:p>
+        </p:txBody>
+      </p:sp>
+      <p:sp>
+        <p:nvSpPr>
+          <p:cNvPr id="116" name="TextBox 115"/>
           <p:cNvSpPr txBox="1"/>
           <p:nvPr/>
         </p:nvSpPr>
         <p:spPr>
           <a:xfrm>
-            <a:off x="3594405" y="4355871"/>
-            <a:ext cx="496250" cy="338554"/>
+            <a:off x="4172010" y="5479697"/>
+            <a:ext cx="1321471" cy="276999"/>
           </a:xfrm>
           <a:prstGeom prst="rect">
             <a:avLst/>
@@ -4935,28 +5092,65 @@
           </a:bodyPr>
           <a:lstStyle/>
           <a:p>
-            <a:r>
-              <a:rPr lang="en-US" sz="1600" dirty="0"/>
-              <a:t>1</a:t>
-            </a:r>
-            <a:r>
-              <a:rPr lang="en-US" sz="1600" dirty="0" smtClean="0"/>
-              <a:t>..1</a:t>
-            </a:r>
-            <a:endParaRPr lang="en-US" sz="1600" dirty="0"/>
-          </a:p>
-        </p:txBody>
-      </p:sp>
-      <p:sp>
-        <p:nvSpPr>
-          <p:cNvPr id="71" name="TextBox 70"/>
+            <a:pPr algn="ctr"/>
+            <a:r>
+              <a:rPr lang="en-US" sz="1200" dirty="0" err="1"/>
+              <a:t>p</a:t>
+            </a:r>
+            <a:r>
+              <a:rPr lang="en-US" sz="1200" dirty="0" err="1" smtClean="0"/>
+              <a:t>rov-tc:residedOn</a:t>
+            </a:r>
+            <a:endParaRPr lang="en-US" sz="1200" dirty="0" smtClean="0"/>
+          </a:p>
+        </p:txBody>
+      </p:sp>
+      <p:cxnSp>
+        <p:nvCxnSpPr>
+          <p:cNvPr id="117" name="Straight Arrow Connector 116"/>
+          <p:cNvCxnSpPr>
+            <a:stCxn id="4" idx="2"/>
+            <a:endCxn id="65" idx="0"/>
+          </p:cNvCxnSpPr>
+          <p:nvPr/>
+        </p:nvCxnSpPr>
+        <p:spPr>
+          <a:xfrm>
+            <a:off x="3621640" y="4327551"/>
+            <a:ext cx="5374" cy="1491330"/>
+          </a:xfrm>
+          <a:prstGeom prst="straightConnector1">
+            <a:avLst/>
+          </a:prstGeom>
+          <a:ln>
+            <a:tailEnd type="arrow"/>
+          </a:ln>
+        </p:spPr>
+        <p:style>
+          <a:lnRef idx="2">
+            <a:schemeClr val="accent1"/>
+          </a:lnRef>
+          <a:fillRef idx="0">
+            <a:schemeClr val="accent1"/>
+          </a:fillRef>
+          <a:effectRef idx="1">
+            <a:schemeClr val="accent1"/>
+          </a:effectRef>
+          <a:fontRef idx="minor">
+            <a:schemeClr val="tx1"/>
+          </a:fontRef>
+        </p:style>
+      </p:cxnSp>
+      <p:sp>
+        <p:nvSpPr>
+          <p:cNvPr id="118" name="TextBox 117"/>
           <p:cNvSpPr txBox="1"/>
           <p:nvPr/>
         </p:nvSpPr>
         <p:spPr>
           <a:xfrm>
-            <a:off x="8178367" y="4061976"/>
-            <a:ext cx="877163" cy="276999"/>
+            <a:off x="2561323" y="4886231"/>
+            <a:ext cx="1065691" cy="276999"/>
           </a:xfrm>
           <a:prstGeom prst="rect">
             <a:avLst/>
@@ -4971,101 +5165,14 @@
           <a:p>
             <a:pPr algn="ctr"/>
             <a:r>
+              <a:rPr lang="en-US" sz="1200" dirty="0" err="1"/>
+              <a:t>p</a:t>
+            </a:r>
+            <a:r>
               <a:rPr lang="en-US" sz="1200" dirty="0" err="1" smtClean="0"/>
-              <a:t>dc:isPartOf</a:t>
-            </a:r>
-            <a:endParaRPr lang="en-US" sz="1200" dirty="0"/>
-          </a:p>
-        </p:txBody>
-      </p:sp>
-      <p:sp>
-        <p:nvSpPr>
-          <p:cNvPr id="72" name="TextBox 71"/>
-          <p:cNvSpPr txBox="1"/>
-          <p:nvPr/>
-        </p:nvSpPr>
-        <p:spPr>
-          <a:xfrm>
-            <a:off x="6937849" y="5407965"/>
-            <a:ext cx="1072003" cy="276999"/>
-          </a:xfrm>
-          <a:prstGeom prst="rect">
-            <a:avLst/>
-          </a:prstGeom>
-          <a:noFill/>
-        </p:spPr>
-        <p:txBody>
-          <a:bodyPr wrap="none" rtlCol="0">
-            <a:spAutoFit/>
-          </a:bodyPr>
-          <a:lstStyle/>
-          <a:p>
-            <a:pPr algn="ctr"/>
-            <a:r>
-              <a:rPr lang="en-US" sz="1200" dirty="0" err="1" smtClean="0"/>
-              <a:t>dc:description</a:t>
-            </a:r>
-            <a:endParaRPr lang="en-US" sz="1200" dirty="0"/>
-          </a:p>
-        </p:txBody>
-      </p:sp>
-      <p:sp>
-        <p:nvSpPr>
-          <p:cNvPr id="73" name="TextBox 72"/>
-          <p:cNvSpPr txBox="1"/>
-          <p:nvPr/>
-        </p:nvSpPr>
-        <p:spPr>
-          <a:xfrm>
-            <a:off x="2940466" y="2552489"/>
-            <a:ext cx="1362347" cy="307777"/>
-          </a:xfrm>
-          <a:prstGeom prst="rect">
-            <a:avLst/>
-          </a:prstGeom>
-          <a:noFill/>
-        </p:spPr>
-        <p:txBody>
-          <a:bodyPr wrap="none" rtlCol="0">
-            <a:spAutoFit/>
-          </a:bodyPr>
-          <a:lstStyle/>
-          <a:p>
-            <a:r>
-              <a:rPr lang="en-US" sz="1400" dirty="0" err="1" smtClean="0"/>
-              <a:t>unitOfExecution</a:t>
-            </a:r>
-            <a:endParaRPr lang="en-US" sz="1400" dirty="0"/>
-          </a:p>
-        </p:txBody>
-      </p:sp>
-      <p:sp>
-        <p:nvSpPr>
-          <p:cNvPr id="115" name="TextBox 114"/>
-          <p:cNvSpPr txBox="1"/>
-          <p:nvPr/>
-        </p:nvSpPr>
-        <p:spPr>
-          <a:xfrm>
-            <a:off x="6690626" y="2695166"/>
-            <a:ext cx="710125" cy="307777"/>
-          </a:xfrm>
-          <a:prstGeom prst="rect">
-            <a:avLst/>
-          </a:prstGeom>
-          <a:noFill/>
-        </p:spPr>
-        <p:txBody>
-          <a:bodyPr wrap="none" rtlCol="0">
-            <a:spAutoFit/>
-          </a:bodyPr>
-          <a:lstStyle/>
-          <a:p>
-            <a:r>
-              <a:rPr lang="en-US" sz="1400" dirty="0" smtClean="0"/>
-              <a:t>artifact</a:t>
-            </a:r>
-            <a:endParaRPr lang="en-US" sz="1400" dirty="0"/>
+              <a:t>rov-tc:ranOn</a:t>
+            </a:r>
+            <a:endParaRPr lang="en-US" sz="1200" dirty="0" smtClean="0"/>
           </a:p>
         </p:txBody>
       </p:sp>

</xml_diff>

<commit_message>
revised ADAPT architecture and data model
</commit_message>
<xml_diff>
--- a/Ingest/languagediagram.pptx
+++ b/Ingest/languagediagram.pptx
@@ -288,7 +288,7 @@
           <a:p>
             <a:fld id="{B39C4B1C-A8FF-8C49-B007-95A36DEBADE4}" type="datetimeFigureOut">
               <a:rPr lang="en-US" smtClean="0"/>
-              <a:t>1/19/16</a:t>
+              <a:t>3/8/16</a:t>
             </a:fld>
             <a:endParaRPr lang="en-US"/>
           </a:p>
@@ -458,7 +458,7 @@
           <a:p>
             <a:fld id="{B39C4B1C-A8FF-8C49-B007-95A36DEBADE4}" type="datetimeFigureOut">
               <a:rPr lang="en-US" smtClean="0"/>
-              <a:t>1/19/16</a:t>
+              <a:t>3/8/16</a:t>
             </a:fld>
             <a:endParaRPr lang="en-US"/>
           </a:p>
@@ -638,7 +638,7 @@
           <a:p>
             <a:fld id="{B39C4B1C-A8FF-8C49-B007-95A36DEBADE4}" type="datetimeFigureOut">
               <a:rPr lang="en-US" smtClean="0"/>
-              <a:t>1/19/16</a:t>
+              <a:t>3/8/16</a:t>
             </a:fld>
             <a:endParaRPr lang="en-US"/>
           </a:p>
@@ -808,7 +808,7 @@
           <a:p>
             <a:fld id="{B39C4B1C-A8FF-8C49-B007-95A36DEBADE4}" type="datetimeFigureOut">
               <a:rPr lang="en-US" smtClean="0"/>
-              <a:t>1/19/16</a:t>
+              <a:t>3/8/16</a:t>
             </a:fld>
             <a:endParaRPr lang="en-US"/>
           </a:p>
@@ -1054,7 +1054,7 @@
           <a:p>
             <a:fld id="{B39C4B1C-A8FF-8C49-B007-95A36DEBADE4}" type="datetimeFigureOut">
               <a:rPr lang="en-US" smtClean="0"/>
-              <a:t>1/19/16</a:t>
+              <a:t>3/8/16</a:t>
             </a:fld>
             <a:endParaRPr lang="en-US"/>
           </a:p>
@@ -1342,7 +1342,7 @@
           <a:p>
             <a:fld id="{B39C4B1C-A8FF-8C49-B007-95A36DEBADE4}" type="datetimeFigureOut">
               <a:rPr lang="en-US" smtClean="0"/>
-              <a:t>1/19/16</a:t>
+              <a:t>3/8/16</a:t>
             </a:fld>
             <a:endParaRPr lang="en-US"/>
           </a:p>
@@ -1764,7 +1764,7 @@
           <a:p>
             <a:fld id="{B39C4B1C-A8FF-8C49-B007-95A36DEBADE4}" type="datetimeFigureOut">
               <a:rPr lang="en-US" smtClean="0"/>
-              <a:t>1/19/16</a:t>
+              <a:t>3/8/16</a:t>
             </a:fld>
             <a:endParaRPr lang="en-US"/>
           </a:p>
@@ -1882,7 +1882,7 @@
           <a:p>
             <a:fld id="{B39C4B1C-A8FF-8C49-B007-95A36DEBADE4}" type="datetimeFigureOut">
               <a:rPr lang="en-US" smtClean="0"/>
-              <a:t>1/19/16</a:t>
+              <a:t>3/8/16</a:t>
             </a:fld>
             <a:endParaRPr lang="en-US"/>
           </a:p>
@@ -1977,7 +1977,7 @@
           <a:p>
             <a:fld id="{B39C4B1C-A8FF-8C49-B007-95A36DEBADE4}" type="datetimeFigureOut">
               <a:rPr lang="en-US" smtClean="0"/>
-              <a:t>1/19/16</a:t>
+              <a:t>3/8/16</a:t>
             </a:fld>
             <a:endParaRPr lang="en-US"/>
           </a:p>
@@ -2254,7 +2254,7 @@
           <a:p>
             <a:fld id="{B39C4B1C-A8FF-8C49-B007-95A36DEBADE4}" type="datetimeFigureOut">
               <a:rPr lang="en-US" smtClean="0"/>
-              <a:t>1/19/16</a:t>
+              <a:t>3/8/16</a:t>
             </a:fld>
             <a:endParaRPr lang="en-US"/>
           </a:p>
@@ -2507,7 +2507,7 @@
           <a:p>
             <a:fld id="{B39C4B1C-A8FF-8C49-B007-95A36DEBADE4}" type="datetimeFigureOut">
               <a:rPr lang="en-US" smtClean="0"/>
-              <a:t>1/19/16</a:t>
+              <a:t>3/8/16</a:t>
             </a:fld>
             <a:endParaRPr lang="en-US"/>
           </a:p>
@@ -2720,7 +2720,7 @@
           <a:p>
             <a:fld id="{B39C4B1C-A8FF-8C49-B007-95A36DEBADE4}" type="datetimeFigureOut">
               <a:rPr lang="en-US" smtClean="0"/>
-              <a:t>1/19/16</a:t>
+              <a:t>3/8/16</a:t>
             </a:fld>
             <a:endParaRPr lang="en-US"/>
           </a:p>
@@ -3103,8 +3103,8 @@
         </p:nvSpPr>
         <p:spPr>
           <a:xfrm>
-            <a:off x="2775747" y="1500868"/>
-            <a:ext cx="1691785" cy="2826683"/>
+            <a:off x="2775747" y="3307774"/>
+            <a:ext cx="1691785" cy="1330507"/>
           </a:xfrm>
           <a:prstGeom prst="roundRect">
             <a:avLst/>
@@ -3141,8 +3141,8 @@
         </p:nvSpPr>
         <p:spPr>
           <a:xfrm>
-            <a:off x="5983996" y="1666540"/>
-            <a:ext cx="1463299" cy="2661010"/>
+            <a:off x="5983996" y="3307774"/>
+            <a:ext cx="1463299" cy="1330505"/>
           </a:xfrm>
           <a:prstGeom prst="roundRect">
             <a:avLst/>
@@ -3179,7 +3179,7 @@
         </p:nvSpPr>
         <p:spPr>
           <a:xfrm>
-            <a:off x="488220" y="1509312"/>
+            <a:off x="313108" y="3236235"/>
             <a:ext cx="967074" cy="944143"/>
           </a:xfrm>
           <a:prstGeom prst="roundRect">
@@ -3217,7 +3217,7 @@
         </p:nvSpPr>
         <p:spPr>
           <a:xfrm>
-            <a:off x="663331" y="1771518"/>
+            <a:off x="488219" y="3543691"/>
             <a:ext cx="616851" cy="307777"/>
           </a:xfrm>
           <a:prstGeom prst="rect">
@@ -3247,7 +3247,7 @@
         </p:nvCxnSpPr>
         <p:spPr>
           <a:xfrm>
-            <a:off x="4484873" y="2909542"/>
+            <a:off x="4484873" y="4261555"/>
             <a:ext cx="1461242" cy="12700"/>
           </a:xfrm>
           <a:prstGeom prst="bentConnector3">
@@ -3276,18 +3276,21 @@
       </p:cxnSp>
       <p:cxnSp>
         <p:nvCxnSpPr>
-          <p:cNvPr id="28" name="Elbow Connector 27"/>
-          <p:cNvCxnSpPr/>
+          <p:cNvPr id="75" name="Elbow Connector 74"/>
+          <p:cNvCxnSpPr>
+            <a:stCxn id="5" idx="0"/>
+            <a:endCxn id="6" idx="0"/>
+          </p:cNvCxnSpPr>
           <p:nvPr/>
         </p:nvCxnSpPr>
         <p:spPr>
-          <a:xfrm rot="10800000">
-            <a:off x="1455294" y="1871367"/>
-            <a:ext cx="1320636" cy="12700"/>
+          <a:xfrm rot="16200000" flipV="1">
+            <a:off x="3720377" y="312504"/>
+            <a:ext cx="71539" cy="5919001"/>
           </a:xfrm>
           <a:prstGeom prst="bentConnector3">
             <a:avLst>
-              <a:gd name="adj1" fmla="val 50000"/>
+              <a:gd name="adj1" fmla="val 740588"/>
             </a:avLst>
           </a:prstGeom>
           <a:ln>
@@ -3311,14 +3314,14 @@
       </p:cxnSp>
       <p:sp>
         <p:nvSpPr>
-          <p:cNvPr id="32" name="TextBox 31"/>
+          <p:cNvPr id="81" name="TextBox 80"/>
           <p:cNvSpPr txBox="1"/>
           <p:nvPr/>
         </p:nvSpPr>
         <p:spPr>
           <a:xfrm>
-            <a:off x="1422983" y="2297370"/>
-            <a:ext cx="1406830" cy="461665"/>
+            <a:off x="1369385" y="2536679"/>
+            <a:ext cx="1557337" cy="276999"/>
           </a:xfrm>
           <a:prstGeom prst="rect">
             <a:avLst/>
@@ -3338,128 +3341,9 @@
             </a:r>
             <a:r>
               <a:rPr lang="en-US" sz="1200" dirty="0" err="1" smtClean="0"/>
-              <a:t>rov</a:t>
-            </a:r>
-            <a:r>
-              <a:rPr lang="en-US" sz="1200" dirty="0" smtClean="0"/>
-              <a:t>:</a:t>
-            </a:r>
-            <a:br>
-              <a:rPr lang="en-US" sz="1200" dirty="0" smtClean="0"/>
-            </a:br>
-            <a:r>
-              <a:rPr lang="en-US" sz="1200" dirty="0" err="1" smtClean="0"/>
-              <a:t>wasAssociatedWith</a:t>
-            </a:r>
-            <a:endParaRPr lang="en-US" sz="1200" dirty="0" smtClean="0"/>
-          </a:p>
-        </p:txBody>
-      </p:sp>
-      <p:cxnSp>
-        <p:nvCxnSpPr>
-          <p:cNvPr id="75" name="Elbow Connector 74"/>
-          <p:cNvCxnSpPr>
-            <a:stCxn id="5" idx="0"/>
-            <a:endCxn id="4" idx="0"/>
-          </p:cNvCxnSpPr>
-          <p:nvPr/>
-        </p:nvCxnSpPr>
-        <p:spPr>
-          <a:xfrm rot="16200000" flipV="1">
-            <a:off x="5085807" y="36701"/>
-            <a:ext cx="165672" cy="3094006"/>
-          </a:xfrm>
-          <a:prstGeom prst="bentConnector3">
-            <a:avLst>
-              <a:gd name="adj1" fmla="val 237983"/>
-            </a:avLst>
-          </a:prstGeom>
-          <a:ln>
-            <a:tailEnd type="arrow"/>
-          </a:ln>
-        </p:spPr>
-        <p:style>
-          <a:lnRef idx="2">
-            <a:schemeClr val="accent1"/>
-          </a:lnRef>
-          <a:fillRef idx="0">
-            <a:schemeClr val="accent1"/>
-          </a:fillRef>
-          <a:effectRef idx="1">
-            <a:schemeClr val="accent1"/>
-          </a:effectRef>
-          <a:fontRef idx="minor">
-            <a:schemeClr val="tx1"/>
-          </a:fontRef>
-        </p:style>
-      </p:cxnSp>
-      <p:sp>
-        <p:nvSpPr>
-          <p:cNvPr id="81" name="TextBox 80"/>
-          <p:cNvSpPr txBox="1"/>
-          <p:nvPr/>
-        </p:nvSpPr>
-        <p:spPr>
-          <a:xfrm>
-            <a:off x="4012123" y="1010051"/>
-            <a:ext cx="1557337" cy="276999"/>
-          </a:xfrm>
-          <a:prstGeom prst="rect">
-            <a:avLst/>
-          </a:prstGeom>
-          <a:noFill/>
-        </p:spPr>
-        <p:txBody>
-          <a:bodyPr wrap="none" rtlCol="0">
-            <a:spAutoFit/>
-          </a:bodyPr>
-          <a:lstStyle/>
-          <a:p>
-            <a:pPr algn="ctr"/>
-            <a:r>
-              <a:rPr lang="en-US" sz="1200" dirty="0" err="1"/>
-              <a:t>p</a:t>
-            </a:r>
-            <a:r>
-              <a:rPr lang="en-US" sz="1200" dirty="0" err="1" smtClean="0"/>
               <a:t>rov:wasAttributedTo</a:t>
             </a:r>
             <a:endParaRPr lang="en-US" sz="1200" dirty="0"/>
-          </a:p>
-        </p:txBody>
-      </p:sp>
-      <p:sp>
-        <p:nvSpPr>
-          <p:cNvPr id="82" name="TextBox 81"/>
-          <p:cNvSpPr txBox="1"/>
-          <p:nvPr/>
-        </p:nvSpPr>
-        <p:spPr>
-          <a:xfrm>
-            <a:off x="1347149" y="1449869"/>
-            <a:ext cx="1595309" cy="276999"/>
-          </a:xfrm>
-          <a:prstGeom prst="rect">
-            <a:avLst/>
-          </a:prstGeom>
-          <a:noFill/>
-        </p:spPr>
-        <p:txBody>
-          <a:bodyPr wrap="none" rtlCol="0">
-            <a:spAutoFit/>
-          </a:bodyPr>
-          <a:lstStyle/>
-          <a:p>
-            <a:pPr algn="ctr"/>
-            <a:r>
-              <a:rPr lang="en-US" sz="1200" dirty="0" err="1"/>
-              <a:t>p</a:t>
-            </a:r>
-            <a:r>
-              <a:rPr lang="en-US" sz="1200" dirty="0" err="1" smtClean="0"/>
-              <a:t>rov:actedOnBehalfOf</a:t>
-            </a:r>
-            <a:endParaRPr lang="en-US" sz="1200" dirty="0" smtClean="0"/>
           </a:p>
         </p:txBody>
       </p:sp>
@@ -3471,7 +3355,7 @@
         </p:nvSpPr>
         <p:spPr>
           <a:xfrm>
-            <a:off x="1146184" y="2967246"/>
+            <a:off x="1444174" y="3398152"/>
             <a:ext cx="1381233" cy="430887"/>
           </a:xfrm>
           <a:prstGeom prst="rect">
@@ -3507,12 +3391,12 @@
         </p:nvCxnSpPr>
         <p:spPr>
           <a:xfrm rot="5400000" flipH="1" flipV="1">
-            <a:off x="6416217" y="3296473"/>
-            <a:ext cx="1330505" cy="731649"/>
+            <a:off x="6748844" y="3939828"/>
+            <a:ext cx="665252" cy="731649"/>
           </a:xfrm>
           <a:prstGeom prst="bentConnector4">
             <a:avLst>
-              <a:gd name="adj1" fmla="val -17181"/>
+              <a:gd name="adj1" fmla="val -34363"/>
               <a:gd name="adj2" fmla="val 131244"/>
             </a:avLst>
           </a:prstGeom>
@@ -3543,7 +3427,7 @@
         </p:nvSpPr>
         <p:spPr>
           <a:xfrm>
-            <a:off x="7158301" y="4512215"/>
+            <a:off x="7158301" y="4822945"/>
             <a:ext cx="1570487" cy="276999"/>
           </a:xfrm>
           <a:prstGeom prst="rect">
@@ -3570,19 +3454,19 @@
         <p:nvCxnSpPr>
           <p:cNvPr id="100" name="Elbow Connector 99"/>
           <p:cNvCxnSpPr>
-            <a:stCxn id="5" idx="0"/>
+            <a:stCxn id="4" idx="0"/>
             <a:endCxn id="6" idx="0"/>
           </p:cNvCxnSpPr>
           <p:nvPr/>
         </p:nvCxnSpPr>
         <p:spPr>
           <a:xfrm rot="16200000" flipV="1">
-            <a:off x="3765088" y="-1284019"/>
-            <a:ext cx="157228" cy="5743889"/>
+            <a:off x="2173374" y="1859507"/>
+            <a:ext cx="71539" cy="2824995"/>
           </a:xfrm>
           <a:prstGeom prst="bentConnector3">
             <a:avLst>
-              <a:gd name="adj1" fmla="val 477395"/>
+              <a:gd name="adj1" fmla="val 419546"/>
             </a:avLst>
           </a:prstGeom>
           <a:ln>
@@ -3612,7 +3496,7 @@
         </p:nvSpPr>
         <p:spPr>
           <a:xfrm>
-            <a:off x="1833282" y="623588"/>
+            <a:off x="1459161" y="2959236"/>
             <a:ext cx="1557337" cy="276999"/>
           </a:xfrm>
           <a:prstGeom prst="rect">
@@ -3647,7 +3531,7 @@
         </p:nvSpPr>
         <p:spPr>
           <a:xfrm>
-            <a:off x="4469299" y="3675131"/>
+            <a:off x="4456018" y="3903379"/>
             <a:ext cx="1582484" cy="276999"/>
           </a:xfrm>
           <a:prstGeom prst="rect">
@@ -3678,7 +3562,7 @@
         </p:nvSpPr>
         <p:spPr>
           <a:xfrm>
-            <a:off x="4851160" y="2867197"/>
+            <a:off x="4851160" y="4219210"/>
             <a:ext cx="757395" cy="261610"/>
           </a:xfrm>
           <a:prstGeom prst="rect">
@@ -3709,7 +3593,7 @@
         </p:nvSpPr>
         <p:spPr>
           <a:xfrm>
-            <a:off x="4430369" y="2176456"/>
+            <a:off x="4430369" y="3528469"/>
             <a:ext cx="1608133" cy="276999"/>
           </a:xfrm>
           <a:prstGeom prst="rect">
@@ -3740,7 +3624,7 @@
         </p:nvCxnSpPr>
         <p:spPr>
           <a:xfrm rot="10800000" flipV="1">
-            <a:off x="4467534" y="2230324"/>
+            <a:off x="4467534" y="3582337"/>
             <a:ext cx="1516462" cy="2"/>
           </a:xfrm>
           <a:prstGeom prst="bentConnector3">
@@ -3775,7 +3659,7 @@
         </p:nvCxnSpPr>
         <p:spPr>
           <a:xfrm rot="10800000" flipV="1">
-            <a:off x="4452511" y="3675129"/>
+            <a:off x="4439230" y="3903377"/>
             <a:ext cx="1516462" cy="2"/>
           </a:xfrm>
           <a:prstGeom prst="bentConnector3">
@@ -3802,555 +3686,6 @@
           </a:fontRef>
         </p:style>
       </p:cxnSp>
-      <p:cxnSp>
-        <p:nvCxnSpPr>
-          <p:cNvPr id="76" name="Elbow Connector 75"/>
-          <p:cNvCxnSpPr/>
-          <p:nvPr/>
-        </p:nvCxnSpPr>
-        <p:spPr>
-          <a:xfrm rot="10800000" flipV="1">
-            <a:off x="1487818" y="2367804"/>
-            <a:ext cx="1288112" cy="3144"/>
-          </a:xfrm>
-          <a:prstGeom prst="bentConnector3">
-            <a:avLst>
-              <a:gd name="adj1" fmla="val 50000"/>
-            </a:avLst>
-          </a:prstGeom>
-          <a:ln>
-            <a:tailEnd type="arrow"/>
-          </a:ln>
-        </p:spPr>
-        <p:style>
-          <a:lnRef idx="2">
-            <a:schemeClr val="accent1"/>
-          </a:lnRef>
-          <a:fillRef idx="0">
-            <a:schemeClr val="accent1"/>
-          </a:fillRef>
-          <a:effectRef idx="1">
-            <a:schemeClr val="accent1"/>
-          </a:effectRef>
-          <a:fontRef idx="minor">
-            <a:schemeClr val="tx1"/>
-          </a:fontRef>
-        </p:style>
-      </p:cxnSp>
-      <p:sp>
-        <p:nvSpPr>
-          <p:cNvPr id="36" name="TextBox 35"/>
-          <p:cNvSpPr txBox="1"/>
-          <p:nvPr/>
-        </p:nvSpPr>
-        <p:spPr>
-          <a:xfrm>
-            <a:off x="2335367" y="1586853"/>
-            <a:ext cx="494446" cy="338554"/>
-          </a:xfrm>
-          <a:prstGeom prst="rect">
-            <a:avLst/>
-          </a:prstGeom>
-          <a:noFill/>
-        </p:spPr>
-        <p:txBody>
-          <a:bodyPr wrap="none" rtlCol="0">
-            <a:spAutoFit/>
-          </a:bodyPr>
-          <a:lstStyle/>
-          <a:p>
-            <a:r>
-              <a:rPr lang="en-US" sz="1600" dirty="0" smtClean="0"/>
-              <a:t>0..*</a:t>
-            </a:r>
-            <a:endParaRPr lang="en-US" sz="1600" dirty="0"/>
-          </a:p>
-        </p:txBody>
-      </p:sp>
-      <p:sp>
-        <p:nvSpPr>
-          <p:cNvPr id="77" name="TextBox 76"/>
-          <p:cNvSpPr txBox="1"/>
-          <p:nvPr/>
-        </p:nvSpPr>
-        <p:spPr>
-          <a:xfrm>
-            <a:off x="1487818" y="1588369"/>
-            <a:ext cx="496250" cy="338554"/>
-          </a:xfrm>
-          <a:prstGeom prst="rect">
-            <a:avLst/>
-          </a:prstGeom>
-          <a:noFill/>
-        </p:spPr>
-        <p:txBody>
-          <a:bodyPr wrap="none" rtlCol="0">
-            <a:spAutoFit/>
-          </a:bodyPr>
-          <a:lstStyle/>
-          <a:p>
-            <a:r>
-              <a:rPr lang="en-US" sz="1600" dirty="0" smtClean="0"/>
-              <a:t>0..1</a:t>
-            </a:r>
-            <a:endParaRPr lang="en-US" sz="1600" dirty="0"/>
-          </a:p>
-        </p:txBody>
-      </p:sp>
-      <p:sp>
-        <p:nvSpPr>
-          <p:cNvPr id="78" name="TextBox 77"/>
-          <p:cNvSpPr txBox="1"/>
-          <p:nvPr/>
-        </p:nvSpPr>
-        <p:spPr>
-          <a:xfrm>
-            <a:off x="1470130" y="2032394"/>
-            <a:ext cx="496250" cy="338554"/>
-          </a:xfrm>
-          <a:prstGeom prst="rect">
-            <a:avLst/>
-          </a:prstGeom>
-          <a:noFill/>
-        </p:spPr>
-        <p:txBody>
-          <a:bodyPr wrap="none" rtlCol="0">
-            <a:spAutoFit/>
-          </a:bodyPr>
-          <a:lstStyle/>
-          <a:p>
-            <a:r>
-              <a:rPr lang="en-US" sz="1600" dirty="0" smtClean="0"/>
-              <a:t>0..1</a:t>
-            </a:r>
-            <a:endParaRPr lang="en-US" sz="1600" dirty="0"/>
-          </a:p>
-        </p:txBody>
-      </p:sp>
-      <p:sp>
-        <p:nvSpPr>
-          <p:cNvPr id="80" name="TextBox 79"/>
-          <p:cNvSpPr txBox="1"/>
-          <p:nvPr/>
-        </p:nvSpPr>
-        <p:spPr>
-          <a:xfrm>
-            <a:off x="3596209" y="1209638"/>
-            <a:ext cx="494446" cy="338554"/>
-          </a:xfrm>
-          <a:prstGeom prst="rect">
-            <a:avLst/>
-          </a:prstGeom>
-          <a:noFill/>
-        </p:spPr>
-        <p:txBody>
-          <a:bodyPr wrap="none" rtlCol="0">
-            <a:spAutoFit/>
-          </a:bodyPr>
-          <a:lstStyle/>
-          <a:p>
-            <a:r>
-              <a:rPr lang="en-US" sz="1600" dirty="0" smtClean="0"/>
-              <a:t>0..*</a:t>
-            </a:r>
-            <a:endParaRPr lang="en-US" sz="1600" dirty="0"/>
-          </a:p>
-        </p:txBody>
-      </p:sp>
-      <p:sp>
-        <p:nvSpPr>
-          <p:cNvPr id="83" name="TextBox 82"/>
-          <p:cNvSpPr txBox="1"/>
-          <p:nvPr/>
-        </p:nvSpPr>
-        <p:spPr>
-          <a:xfrm>
-            <a:off x="2310767" y="3409260"/>
-            <a:ext cx="494446" cy="338554"/>
-          </a:xfrm>
-          <a:prstGeom prst="rect">
-            <a:avLst/>
-          </a:prstGeom>
-          <a:noFill/>
-        </p:spPr>
-        <p:txBody>
-          <a:bodyPr wrap="none" rtlCol="0">
-            <a:spAutoFit/>
-          </a:bodyPr>
-          <a:lstStyle/>
-          <a:p>
-            <a:r>
-              <a:rPr lang="en-US" sz="1600" dirty="0" smtClean="0"/>
-              <a:t>0.</a:t>
-            </a:r>
-            <a:r>
-              <a:rPr lang="en-US" sz="1600" dirty="0" smtClean="0"/>
-              <a:t>.*</a:t>
-            </a:r>
-            <a:endParaRPr lang="en-US" sz="1600" dirty="0"/>
-          </a:p>
-        </p:txBody>
-      </p:sp>
-      <p:sp>
-        <p:nvSpPr>
-          <p:cNvPr id="84" name="TextBox 83"/>
-          <p:cNvSpPr txBox="1"/>
-          <p:nvPr/>
-        </p:nvSpPr>
-        <p:spPr>
-          <a:xfrm>
-            <a:off x="2353683" y="2630999"/>
-            <a:ext cx="494446" cy="338554"/>
-          </a:xfrm>
-          <a:prstGeom prst="rect">
-            <a:avLst/>
-          </a:prstGeom>
-          <a:noFill/>
-        </p:spPr>
-        <p:txBody>
-          <a:bodyPr wrap="none" rtlCol="0">
-            <a:spAutoFit/>
-          </a:bodyPr>
-          <a:lstStyle/>
-          <a:p>
-            <a:r>
-              <a:rPr lang="en-US" sz="1600" dirty="0" smtClean="0"/>
-              <a:t>0..*</a:t>
-            </a:r>
-            <a:endParaRPr lang="en-US" sz="1600" dirty="0"/>
-          </a:p>
-        </p:txBody>
-      </p:sp>
-      <p:sp>
-        <p:nvSpPr>
-          <p:cNvPr id="87" name="TextBox 86"/>
-          <p:cNvSpPr txBox="1"/>
-          <p:nvPr/>
-        </p:nvSpPr>
-        <p:spPr>
-          <a:xfrm>
-            <a:off x="4407103" y="1908418"/>
-            <a:ext cx="496250" cy="338554"/>
-          </a:xfrm>
-          <a:prstGeom prst="rect">
-            <a:avLst/>
-          </a:prstGeom>
-          <a:noFill/>
-        </p:spPr>
-        <p:txBody>
-          <a:bodyPr wrap="none" rtlCol="0">
-            <a:spAutoFit/>
-          </a:bodyPr>
-          <a:lstStyle/>
-          <a:p>
-            <a:r>
-              <a:rPr lang="en-US" sz="1600" dirty="0" smtClean="0"/>
-              <a:t>0..1</a:t>
-            </a:r>
-            <a:endParaRPr lang="en-US" sz="1600" dirty="0"/>
-          </a:p>
-        </p:txBody>
-      </p:sp>
-      <p:sp>
-        <p:nvSpPr>
-          <p:cNvPr id="89" name="TextBox 88"/>
-          <p:cNvSpPr txBox="1"/>
-          <p:nvPr/>
-        </p:nvSpPr>
-        <p:spPr>
-          <a:xfrm>
-            <a:off x="2348019" y="2073812"/>
-            <a:ext cx="494446" cy="338554"/>
-          </a:xfrm>
-          <a:prstGeom prst="rect">
-            <a:avLst/>
-          </a:prstGeom>
-          <a:noFill/>
-        </p:spPr>
-        <p:txBody>
-          <a:bodyPr wrap="none" rtlCol="0">
-            <a:spAutoFit/>
-          </a:bodyPr>
-          <a:lstStyle/>
-          <a:p>
-            <a:r>
-              <a:rPr lang="en-US" sz="1600" dirty="0" smtClean="0"/>
-              <a:t>0..*</a:t>
-            </a:r>
-            <a:endParaRPr lang="en-US" sz="1600" dirty="0"/>
-          </a:p>
-        </p:txBody>
-      </p:sp>
-      <p:sp>
-        <p:nvSpPr>
-          <p:cNvPr id="90" name="TextBox 89"/>
-          <p:cNvSpPr txBox="1"/>
-          <p:nvPr/>
-        </p:nvSpPr>
-        <p:spPr>
-          <a:xfrm>
-            <a:off x="939497" y="1236658"/>
-            <a:ext cx="494446" cy="338554"/>
-          </a:xfrm>
-          <a:prstGeom prst="rect">
-            <a:avLst/>
-          </a:prstGeom>
-          <a:noFill/>
-        </p:spPr>
-        <p:txBody>
-          <a:bodyPr wrap="none" rtlCol="0">
-            <a:spAutoFit/>
-          </a:bodyPr>
-          <a:lstStyle/>
-          <a:p>
-            <a:r>
-              <a:rPr lang="en-US" sz="1600" dirty="0" smtClean="0"/>
-              <a:t>0..*</a:t>
-            </a:r>
-            <a:endParaRPr lang="en-US" sz="1600" dirty="0"/>
-          </a:p>
-        </p:txBody>
-      </p:sp>
-      <p:sp>
-        <p:nvSpPr>
-          <p:cNvPr id="91" name="TextBox 90"/>
-          <p:cNvSpPr txBox="1"/>
-          <p:nvPr/>
-        </p:nvSpPr>
-        <p:spPr>
-          <a:xfrm>
-            <a:off x="6715646" y="1317673"/>
-            <a:ext cx="494446" cy="338554"/>
-          </a:xfrm>
-          <a:prstGeom prst="rect">
-            <a:avLst/>
-          </a:prstGeom>
-          <a:noFill/>
-        </p:spPr>
-        <p:txBody>
-          <a:bodyPr wrap="none" rtlCol="0">
-            <a:spAutoFit/>
-          </a:bodyPr>
-          <a:lstStyle/>
-          <a:p>
-            <a:r>
-              <a:rPr lang="en-US" sz="1600" dirty="0" smtClean="0"/>
-              <a:t>0..*</a:t>
-            </a:r>
-            <a:endParaRPr lang="en-US" sz="1600" dirty="0"/>
-          </a:p>
-        </p:txBody>
-      </p:sp>
-      <p:sp>
-        <p:nvSpPr>
-          <p:cNvPr id="92" name="TextBox 91"/>
-          <p:cNvSpPr txBox="1"/>
-          <p:nvPr/>
-        </p:nvSpPr>
-        <p:spPr>
-          <a:xfrm>
-            <a:off x="5524248" y="1911245"/>
-            <a:ext cx="494446" cy="338554"/>
-          </a:xfrm>
-          <a:prstGeom prst="rect">
-            <a:avLst/>
-          </a:prstGeom>
-          <a:noFill/>
-        </p:spPr>
-        <p:txBody>
-          <a:bodyPr wrap="none" rtlCol="0">
-            <a:spAutoFit/>
-          </a:bodyPr>
-          <a:lstStyle/>
-          <a:p>
-            <a:r>
-              <a:rPr lang="en-US" sz="1600" dirty="0" smtClean="0"/>
-              <a:t>0..*</a:t>
-            </a:r>
-            <a:endParaRPr lang="en-US" sz="1600" dirty="0"/>
-          </a:p>
-        </p:txBody>
-      </p:sp>
-      <p:sp>
-        <p:nvSpPr>
-          <p:cNvPr id="98" name="TextBox 97"/>
-          <p:cNvSpPr txBox="1"/>
-          <p:nvPr/>
-        </p:nvSpPr>
-        <p:spPr>
-          <a:xfrm>
-            <a:off x="4442261" y="2613053"/>
-            <a:ext cx="494446" cy="338554"/>
-          </a:xfrm>
-          <a:prstGeom prst="rect">
-            <a:avLst/>
-          </a:prstGeom>
-          <a:noFill/>
-        </p:spPr>
-        <p:txBody>
-          <a:bodyPr wrap="none" rtlCol="0">
-            <a:spAutoFit/>
-          </a:bodyPr>
-          <a:lstStyle/>
-          <a:p>
-            <a:r>
-              <a:rPr lang="en-US" sz="1600" dirty="0" smtClean="0"/>
-              <a:t>0..*</a:t>
-            </a:r>
-            <a:endParaRPr lang="en-US" sz="1600" dirty="0"/>
-          </a:p>
-        </p:txBody>
-      </p:sp>
-      <p:sp>
-        <p:nvSpPr>
-          <p:cNvPr id="99" name="TextBox 98"/>
-          <p:cNvSpPr txBox="1"/>
-          <p:nvPr/>
-        </p:nvSpPr>
-        <p:spPr>
-          <a:xfrm>
-            <a:off x="5529747" y="2604319"/>
-            <a:ext cx="494446" cy="338554"/>
-          </a:xfrm>
-          <a:prstGeom prst="rect">
-            <a:avLst/>
-          </a:prstGeom>
-          <a:noFill/>
-        </p:spPr>
-        <p:txBody>
-          <a:bodyPr wrap="none" rtlCol="0">
-            <a:spAutoFit/>
-          </a:bodyPr>
-          <a:lstStyle/>
-          <a:p>
-            <a:r>
-              <a:rPr lang="en-US" sz="1600" dirty="0" smtClean="0"/>
-              <a:t>0..*</a:t>
-            </a:r>
-            <a:endParaRPr lang="en-US" sz="1600" dirty="0"/>
-          </a:p>
-        </p:txBody>
-      </p:sp>
-      <p:sp>
-        <p:nvSpPr>
-          <p:cNvPr id="101" name="TextBox 100"/>
-          <p:cNvSpPr txBox="1"/>
-          <p:nvPr/>
-        </p:nvSpPr>
-        <p:spPr>
-          <a:xfrm>
-            <a:off x="5557357" y="3374353"/>
-            <a:ext cx="494446" cy="338554"/>
-          </a:xfrm>
-          <a:prstGeom prst="rect">
-            <a:avLst/>
-          </a:prstGeom>
-          <a:noFill/>
-        </p:spPr>
-        <p:txBody>
-          <a:bodyPr wrap="none" rtlCol="0">
-            <a:spAutoFit/>
-          </a:bodyPr>
-          <a:lstStyle/>
-          <a:p>
-            <a:r>
-              <a:rPr lang="en-US" sz="1600" dirty="0" smtClean="0"/>
-              <a:t>0..*</a:t>
-            </a:r>
-            <a:endParaRPr lang="en-US" sz="1600" dirty="0"/>
-          </a:p>
-        </p:txBody>
-      </p:sp>
-      <p:sp>
-        <p:nvSpPr>
-          <p:cNvPr id="102" name="TextBox 101"/>
-          <p:cNvSpPr txBox="1"/>
-          <p:nvPr/>
-        </p:nvSpPr>
-        <p:spPr>
-          <a:xfrm>
-            <a:off x="4397813" y="3390427"/>
-            <a:ext cx="494446" cy="338554"/>
-          </a:xfrm>
-          <a:prstGeom prst="rect">
-            <a:avLst/>
-          </a:prstGeom>
-          <a:noFill/>
-        </p:spPr>
-        <p:txBody>
-          <a:bodyPr wrap="none" rtlCol="0">
-            <a:spAutoFit/>
-          </a:bodyPr>
-          <a:lstStyle/>
-          <a:p>
-            <a:r>
-              <a:rPr lang="en-US" sz="1600" dirty="0" smtClean="0"/>
-              <a:t>0..*</a:t>
-            </a:r>
-            <a:endParaRPr lang="en-US" sz="1600" dirty="0"/>
-          </a:p>
-        </p:txBody>
-      </p:sp>
-      <p:sp>
-        <p:nvSpPr>
-          <p:cNvPr id="103" name="TextBox 102"/>
-          <p:cNvSpPr txBox="1"/>
-          <p:nvPr/>
-        </p:nvSpPr>
-        <p:spPr>
-          <a:xfrm>
-            <a:off x="6221200" y="4312161"/>
-            <a:ext cx="494446" cy="338554"/>
-          </a:xfrm>
-          <a:prstGeom prst="rect">
-            <a:avLst/>
-          </a:prstGeom>
-          <a:noFill/>
-        </p:spPr>
-        <p:txBody>
-          <a:bodyPr wrap="none" rtlCol="0">
-            <a:spAutoFit/>
-          </a:bodyPr>
-          <a:lstStyle/>
-          <a:p>
-            <a:r>
-              <a:rPr lang="en-US" sz="1600" dirty="0" smtClean="0"/>
-              <a:t>0..*</a:t>
-            </a:r>
-            <a:endParaRPr lang="en-US" sz="1600" dirty="0"/>
-          </a:p>
-        </p:txBody>
-      </p:sp>
-      <p:sp>
-        <p:nvSpPr>
-          <p:cNvPr id="104" name="TextBox 103"/>
-          <p:cNvSpPr txBox="1"/>
-          <p:nvPr/>
-        </p:nvSpPr>
-        <p:spPr>
-          <a:xfrm>
-            <a:off x="7447295" y="2639819"/>
-            <a:ext cx="496250" cy="338554"/>
-          </a:xfrm>
-          <a:prstGeom prst="rect">
-            <a:avLst/>
-          </a:prstGeom>
-          <a:noFill/>
-        </p:spPr>
-        <p:txBody>
-          <a:bodyPr wrap="none" rtlCol="0">
-            <a:spAutoFit/>
-          </a:bodyPr>
-          <a:lstStyle/>
-          <a:p>
-            <a:r>
-              <a:rPr lang="en-US" sz="1600" dirty="0" smtClean="0"/>
-              <a:t>0..1</a:t>
-            </a:r>
-            <a:endParaRPr lang="en-US" sz="1600" dirty="0"/>
-          </a:p>
-        </p:txBody>
-      </p:sp>
       <p:sp>
         <p:nvSpPr>
           <p:cNvPr id="66" name="Rounded Rectangle 65"/>
@@ -4359,7 +3694,7 @@
         </p:nvSpPr>
         <p:spPr>
           <a:xfrm>
-            <a:off x="3880355" y="4998603"/>
+            <a:off x="3880355" y="5309333"/>
             <a:ext cx="1177887" cy="482105"/>
           </a:xfrm>
           <a:prstGeom prst="roundRect">
@@ -4397,7 +3732,7 @@
         </p:nvSpPr>
         <p:spPr>
           <a:xfrm>
-            <a:off x="4049414" y="5049340"/>
+            <a:off x="4049414" y="5360070"/>
             <a:ext cx="864339" cy="307777"/>
           </a:xfrm>
           <a:prstGeom prst="rect">
@@ -4431,8 +3766,8 @@
         </p:nvCxnSpPr>
         <p:spPr>
           <a:xfrm flipH="1">
-            <a:off x="1177659" y="2896390"/>
-            <a:ext cx="1566429" cy="0"/>
+            <a:off x="1560803" y="3717467"/>
+            <a:ext cx="1183529" cy="0"/>
           </a:xfrm>
           <a:prstGeom prst="line">
             <a:avLst/>
@@ -4461,7 +3796,7 @@
         </p:nvCxnSpPr>
         <p:spPr>
           <a:xfrm flipH="1">
-            <a:off x="1177659" y="2896390"/>
+            <a:off x="1560803" y="3717467"/>
             <a:ext cx="2" cy="512870"/>
           </a:xfrm>
           <a:prstGeom prst="line">
@@ -4490,9 +3825,9 @@
           <p:nvPr/>
         </p:nvCxnSpPr>
         <p:spPr>
-          <a:xfrm>
-            <a:off x="1146002" y="3390427"/>
-            <a:ext cx="1598086" cy="0"/>
+          <a:xfrm flipV="1">
+            <a:off x="1563049" y="4211504"/>
+            <a:ext cx="1181282" cy="18833"/>
           </a:xfrm>
           <a:prstGeom prst="straightConnector1">
             <a:avLst/>
@@ -4516,36 +3851,6 @@
           </a:fontRef>
         </p:style>
       </p:cxnSp>
-      <p:sp>
-        <p:nvSpPr>
-          <p:cNvPr id="94" name="TextBox 93"/>
-          <p:cNvSpPr txBox="1"/>
-          <p:nvPr/>
-        </p:nvSpPr>
-        <p:spPr>
-          <a:xfrm>
-            <a:off x="3837894" y="4277454"/>
-            <a:ext cx="494446" cy="338554"/>
-          </a:xfrm>
-          <a:prstGeom prst="rect">
-            <a:avLst/>
-          </a:prstGeom>
-          <a:noFill/>
-        </p:spPr>
-        <p:txBody>
-          <a:bodyPr wrap="none" rtlCol="0">
-            <a:spAutoFit/>
-          </a:bodyPr>
-          <a:lstStyle/>
-          <a:p>
-            <a:r>
-              <a:rPr lang="en-US" sz="1600" dirty="0" smtClean="0"/>
-              <a:t>0..*</a:t>
-            </a:r>
-            <a:endParaRPr lang="en-US" sz="1600" dirty="0"/>
-          </a:p>
-        </p:txBody>
-      </p:sp>
       <p:cxnSp>
         <p:nvCxnSpPr>
           <p:cNvPr id="95" name="Straight Arrow Connector 94"/>
@@ -4557,7 +3862,7 @@
         </p:nvCxnSpPr>
         <p:spPr>
           <a:xfrm>
-            <a:off x="3621640" y="4327551"/>
+            <a:off x="3621640" y="4638281"/>
             <a:ext cx="847659" cy="671052"/>
           </a:xfrm>
           <a:prstGeom prst="straightConnector1">
@@ -4584,43 +3889,13 @@
       </p:cxnSp>
       <p:sp>
         <p:nvSpPr>
-          <p:cNvPr id="96" name="TextBox 95"/>
-          <p:cNvSpPr txBox="1"/>
-          <p:nvPr/>
-        </p:nvSpPr>
-        <p:spPr>
-          <a:xfrm>
-            <a:off x="3837894" y="4686177"/>
-            <a:ext cx="533540" cy="338554"/>
-          </a:xfrm>
-          <a:prstGeom prst="rect">
-            <a:avLst/>
-          </a:prstGeom>
-          <a:noFill/>
-        </p:spPr>
-        <p:txBody>
-          <a:bodyPr wrap="square" rtlCol="0">
-            <a:spAutoFit/>
-          </a:bodyPr>
-          <a:lstStyle/>
-          <a:p>
-            <a:r>
-              <a:rPr lang="en-US" sz="1600" dirty="0" smtClean="0"/>
-              <a:t>0..*</a:t>
-            </a:r>
-            <a:endParaRPr lang="en-US" sz="1600" dirty="0"/>
-          </a:p>
-        </p:txBody>
-      </p:sp>
-      <p:sp>
-        <p:nvSpPr>
           <p:cNvPr id="44" name="Rectangle 43"/>
           <p:cNvSpPr/>
           <p:nvPr/>
         </p:nvSpPr>
         <p:spPr>
           <a:xfrm>
-            <a:off x="4017013" y="4616008"/>
+            <a:off x="3441014" y="4657425"/>
             <a:ext cx="1108703" cy="276999"/>
           </a:xfrm>
           <a:prstGeom prst="rect">
@@ -4650,7 +3925,7 @@
         </p:nvSpPr>
         <p:spPr>
           <a:xfrm>
-            <a:off x="7648673" y="3398133"/>
+            <a:off x="7648673" y="3708863"/>
             <a:ext cx="877163" cy="276999"/>
           </a:xfrm>
           <a:prstGeom prst="rect">
@@ -4681,8 +3956,8 @@
         </p:nvSpPr>
         <p:spPr>
           <a:xfrm>
-            <a:off x="2946557" y="1871367"/>
-            <a:ext cx="1362347" cy="1815882"/>
+            <a:off x="3250858" y="3788323"/>
+            <a:ext cx="724152" cy="307777"/>
           </a:xfrm>
           <a:prstGeom prst="rect">
             <a:avLst/>
@@ -4698,58 +3973,9 @@
             <a:pPr algn="ctr"/>
             <a:r>
               <a:rPr lang="en-US" sz="1400" u="sng" dirty="0" smtClean="0"/>
-              <a:t>unitOfExecution</a:t>
-            </a:r>
-          </a:p>
-          <a:p>
-            <a:pPr algn="ctr"/>
-            <a:r>
-              <a:rPr lang="en-US" sz="1400" dirty="0" smtClean="0"/>
-              <a:t>Types:</a:t>
-            </a:r>
-          </a:p>
-          <a:p>
-            <a:pPr algn="ctr"/>
-            <a:r>
-              <a:rPr lang="en-US" sz="1400" dirty="0" smtClean="0"/>
-              <a:t>Process</a:t>
-            </a:r>
-          </a:p>
-          <a:p>
-            <a:pPr algn="ctr"/>
-            <a:r>
-              <a:rPr lang="en-US" sz="1400" dirty="0" smtClean="0"/>
-              <a:t>Thread</a:t>
-            </a:r>
-          </a:p>
-          <a:p>
-            <a:pPr algn="ctr"/>
-            <a:r>
-              <a:rPr lang="en-US" sz="1400" dirty="0" smtClean="0"/>
-              <a:t>Function</a:t>
-            </a:r>
-          </a:p>
-          <a:p>
-            <a:pPr algn="ctr"/>
-            <a:r>
-              <a:rPr lang="en-US" sz="1400" dirty="0" smtClean="0"/>
-              <a:t>Basic block</a:t>
-            </a:r>
-          </a:p>
-          <a:p>
-            <a:pPr algn="ctr"/>
-            <a:r>
-              <a:rPr lang="en-US" sz="1400" dirty="0" smtClean="0"/>
-              <a:t>Instruction</a:t>
-            </a:r>
-          </a:p>
-          <a:p>
-            <a:pPr algn="ctr"/>
-            <a:r>
-              <a:rPr lang="en-US" sz="1400" dirty="0" smtClean="0"/>
-              <a:t>Event</a:t>
-            </a:r>
-            <a:endParaRPr lang="en-US" sz="1400" dirty="0"/>
+              <a:t>Subject</a:t>
+            </a:r>
+            <a:endParaRPr lang="en-US" sz="1400" u="sng" dirty="0" smtClean="0"/>
           </a:p>
         </p:txBody>
       </p:sp>
@@ -4761,8 +3987,8 @@
         </p:nvSpPr>
         <p:spPr>
           <a:xfrm>
-            <a:off x="6073744" y="2370949"/>
-            <a:ext cx="1405390" cy="1384995"/>
+            <a:off x="6075711" y="3388250"/>
+            <a:ext cx="1313180" cy="1169551"/>
           </a:xfrm>
           <a:prstGeom prst="rect">
             <a:avLst/>
@@ -4778,44 +4004,39 @@
             <a:pPr algn="ctr"/>
             <a:r>
               <a:rPr lang="en-US" sz="1400" u="sng" dirty="0" smtClean="0"/>
-              <a:t>Artifact</a:t>
-            </a:r>
+              <a:t>Entity-File</a:t>
+            </a:r>
+            <a:endParaRPr lang="en-US" sz="1400" dirty="0"/>
           </a:p>
           <a:p>
             <a:pPr algn="ctr"/>
             <a:r>
               <a:rPr lang="en-US" sz="1400" dirty="0" smtClean="0"/>
-              <a:t>Types:</a:t>
+              <a:t>Or</a:t>
             </a:r>
           </a:p>
           <a:p>
             <a:pPr algn="ctr"/>
             <a:r>
+              <a:rPr lang="en-US" sz="1400" u="sng" dirty="0" err="1" smtClean="0"/>
+              <a:t>Entity_NetFlow</a:t>
+            </a:r>
+            <a:endParaRPr lang="en-US" sz="1400" u="sng" dirty="0" smtClean="0"/>
+          </a:p>
+          <a:p>
+            <a:pPr algn="ctr"/>
+            <a:r>
               <a:rPr lang="en-US" sz="1400" dirty="0" smtClean="0"/>
-              <a:t>File</a:t>
+              <a:t>Or</a:t>
             </a:r>
           </a:p>
           <a:p>
             <a:pPr algn="ctr"/>
             <a:r>
-              <a:rPr lang="en-US" sz="1400" dirty="0" smtClean="0"/>
-              <a:t>Memory area</a:t>
-            </a:r>
-          </a:p>
-          <a:p>
-            <a:pPr algn="ctr"/>
-            <a:r>
-              <a:rPr lang="en-US" sz="1400" dirty="0" smtClean="0"/>
-              <a:t>Network socket</a:t>
-            </a:r>
-          </a:p>
-          <a:p>
-            <a:pPr algn="ctr"/>
-            <a:r>
-              <a:rPr lang="en-US" sz="1400" dirty="0" smtClean="0"/>
-              <a:t>Ephemeral value</a:t>
-            </a:r>
-            <a:endParaRPr lang="en-US" sz="1400" dirty="0"/>
+              <a:rPr lang="en-US" sz="1400" u="sng" dirty="0" err="1" smtClean="0"/>
+              <a:t>Entity_Memory</a:t>
+            </a:r>
+            <a:endParaRPr lang="en-US" sz="1400" u="sng" dirty="0" smtClean="0"/>
           </a:p>
         </p:txBody>
       </p:sp>
@@ -4827,7 +4048,7 @@
         </p:nvSpPr>
         <p:spPr>
           <a:xfrm>
-            <a:off x="2946557" y="5818881"/>
+            <a:off x="2946557" y="6129611"/>
             <a:ext cx="1360914" cy="387208"/>
           </a:xfrm>
           <a:prstGeom prst="roundRect">
@@ -4865,7 +4086,7 @@
         </p:nvSpPr>
         <p:spPr>
           <a:xfrm>
-            <a:off x="3386031" y="5858596"/>
+            <a:off x="3386031" y="6169326"/>
             <a:ext cx="521560" cy="307777"/>
           </a:xfrm>
           <a:prstGeom prst="rect">
@@ -4903,46 +4124,10 @@
         </p:nvCxnSpPr>
         <p:spPr>
           <a:xfrm flipH="1">
-            <a:off x="3627014" y="5480708"/>
+            <a:off x="3627014" y="5791438"/>
             <a:ext cx="842285" cy="338173"/>
           </a:xfrm>
           <a:prstGeom prst="straightConnector1">
-            <a:avLst/>
-          </a:prstGeom>
-          <a:ln>
-            <a:tailEnd type="arrow"/>
-          </a:ln>
-        </p:spPr>
-        <p:style>
-          <a:lnRef idx="2">
-            <a:schemeClr val="accent1"/>
-          </a:lnRef>
-          <a:fillRef idx="0">
-            <a:schemeClr val="accent1"/>
-          </a:fillRef>
-          <a:effectRef idx="1">
-            <a:schemeClr val="accent1"/>
-          </a:effectRef>
-          <a:fontRef idx="minor">
-            <a:schemeClr val="tx1"/>
-          </a:fontRef>
-        </p:style>
-      </p:cxnSp>
-      <p:cxnSp>
-        <p:nvCxnSpPr>
-          <p:cNvPr id="21" name="Elbow Connector 20"/>
-          <p:cNvCxnSpPr>
-            <a:stCxn id="6" idx="2"/>
-            <a:endCxn id="65" idx="1"/>
-          </p:cNvCxnSpPr>
-          <p:nvPr/>
-        </p:nvCxnSpPr>
-        <p:spPr>
-          <a:xfrm rot="16200000" flipH="1">
-            <a:off x="179642" y="3245570"/>
-            <a:ext cx="3559030" cy="1974800"/>
-          </a:xfrm>
-          <a:prstGeom prst="bentConnector2">
             <a:avLst/>
           </a:prstGeom>
           <a:ln>
@@ -4975,8 +4160,8 @@
         </p:nvCxnSpPr>
         <p:spPr>
           <a:xfrm rot="5400000">
-            <a:off x="4669092" y="3965930"/>
-            <a:ext cx="1684935" cy="2408175"/>
+            <a:off x="4669091" y="4276660"/>
+            <a:ext cx="1684936" cy="2408175"/>
           </a:xfrm>
           <a:prstGeom prst="bentConnector2">
             <a:avLst/>
@@ -5008,7 +4193,7 @@
         </p:nvSpPr>
         <p:spPr>
           <a:xfrm>
-            <a:off x="5391067" y="5756696"/>
+            <a:off x="5391067" y="6067426"/>
             <a:ext cx="1321471" cy="276999"/>
           </a:xfrm>
           <a:prstGeom prst="rect">
@@ -5037,48 +4222,13 @@
       </p:sp>
       <p:sp>
         <p:nvSpPr>
-          <p:cNvPr id="111" name="TextBox 110"/>
-          <p:cNvSpPr txBox="1"/>
-          <p:nvPr/>
-        </p:nvSpPr>
-        <p:spPr>
-          <a:xfrm>
-            <a:off x="931270" y="5770753"/>
-            <a:ext cx="1606479" cy="276999"/>
-          </a:xfrm>
-          <a:prstGeom prst="rect">
-            <a:avLst/>
-          </a:prstGeom>
-          <a:noFill/>
-        </p:spPr>
-        <p:txBody>
-          <a:bodyPr wrap="none" rtlCol="0">
-            <a:spAutoFit/>
-          </a:bodyPr>
-          <a:lstStyle/>
-          <a:p>
-            <a:pPr algn="ctr"/>
-            <a:r>
-              <a:rPr lang="en-US" sz="1200" dirty="0" err="1"/>
-              <a:t>p</a:t>
-            </a:r>
-            <a:r>
-              <a:rPr lang="en-US" sz="1200" dirty="0" err="1" smtClean="0"/>
-              <a:t>rov-tc:hadAccountOn</a:t>
-            </a:r>
-            <a:endParaRPr lang="en-US" sz="1200" dirty="0" smtClean="0"/>
-          </a:p>
-        </p:txBody>
-      </p:sp>
-      <p:sp>
-        <p:nvSpPr>
           <p:cNvPr id="116" name="TextBox 115"/>
           <p:cNvSpPr txBox="1"/>
           <p:nvPr/>
         </p:nvSpPr>
         <p:spPr>
           <a:xfrm>
-            <a:off x="4172010" y="5479697"/>
+            <a:off x="4172010" y="5790427"/>
             <a:ext cx="1321471" cy="276999"/>
           </a:xfrm>
           <a:prstGeom prst="rect">
@@ -5116,7 +4266,7 @@
         </p:nvCxnSpPr>
         <p:spPr>
           <a:xfrm>
-            <a:off x="3621640" y="4327551"/>
+            <a:off x="3621640" y="4638281"/>
             <a:ext cx="5374" cy="1491330"/>
           </a:xfrm>
           <a:prstGeom prst="straightConnector1">
@@ -5149,8 +4299,8 @@
         </p:nvSpPr>
         <p:spPr>
           <a:xfrm>
-            <a:off x="2561323" y="4886231"/>
-            <a:ext cx="1065691" cy="276999"/>
+            <a:off x="2527660" y="5196961"/>
+            <a:ext cx="1133017" cy="276999"/>
           </a:xfrm>
           <a:prstGeom prst="rect">
             <a:avLst/>
@@ -5170,9 +4320,700 @@
             </a:r>
             <a:r>
               <a:rPr lang="en-US" sz="1200" dirty="0" err="1" smtClean="0"/>
-              <a:t>rov-tc:ranOn</a:t>
+              <a:t>rov-</a:t>
+            </a:r>
+            <a:r>
+              <a:rPr lang="en-US" sz="1200" dirty="0" err="1" smtClean="0"/>
+              <a:t>tc:runsOn</a:t>
             </a:r>
             <a:endParaRPr lang="en-US" sz="1200" dirty="0" smtClean="0"/>
+          </a:p>
+        </p:txBody>
+      </p:sp>
+      <p:sp>
+        <p:nvSpPr>
+          <p:cNvPr id="62" name="Rounded Rectangle 61"/>
+          <p:cNvSpPr/>
+          <p:nvPr/>
+        </p:nvSpPr>
+        <p:spPr>
+          <a:xfrm>
+            <a:off x="4574705" y="1875468"/>
+            <a:ext cx="967074" cy="472071"/>
+          </a:xfrm>
+          <a:prstGeom prst="roundRect">
+            <a:avLst/>
+          </a:prstGeom>
+        </p:spPr>
+        <p:style>
+          <a:lnRef idx="1">
+            <a:schemeClr val="accent1"/>
+          </a:lnRef>
+          <a:fillRef idx="3">
+            <a:schemeClr val="accent1"/>
+          </a:fillRef>
+          <a:effectRef idx="2">
+            <a:schemeClr val="accent1"/>
+          </a:effectRef>
+          <a:fontRef idx="minor">
+            <a:schemeClr val="lt1"/>
+          </a:fontRef>
+        </p:style>
+        <p:txBody>
+          <a:bodyPr rtlCol="0" anchor="ctr"/>
+          <a:lstStyle/>
+          <a:p>
+            <a:pPr algn="ctr"/>
+            <a:r>
+              <a:rPr lang="en-US" dirty="0" smtClean="0">
+                <a:solidFill>
+                  <a:schemeClr val="tx1"/>
+                </a:solidFill>
+              </a:rPr>
+              <a:t>Pattern</a:t>
+            </a:r>
+            <a:endParaRPr lang="en-US" dirty="0">
+              <a:solidFill>
+                <a:schemeClr val="tx1"/>
+              </a:solidFill>
+            </a:endParaRPr>
+          </a:p>
+        </p:txBody>
+      </p:sp>
+      <p:sp>
+        <p:nvSpPr>
+          <p:cNvPr id="63" name="Rounded Rectangle 62"/>
+          <p:cNvSpPr/>
+          <p:nvPr/>
+        </p:nvSpPr>
+        <p:spPr>
+          <a:xfrm>
+            <a:off x="4553700" y="1095068"/>
+            <a:ext cx="967074" cy="431560"/>
+          </a:xfrm>
+          <a:prstGeom prst="roundRect">
+            <a:avLst/>
+          </a:prstGeom>
+        </p:spPr>
+        <p:style>
+          <a:lnRef idx="1">
+            <a:schemeClr val="accent1"/>
+          </a:lnRef>
+          <a:fillRef idx="3">
+            <a:schemeClr val="accent1"/>
+          </a:fillRef>
+          <a:effectRef idx="2">
+            <a:schemeClr val="accent1"/>
+          </a:effectRef>
+          <a:fontRef idx="minor">
+            <a:schemeClr val="lt1"/>
+          </a:fontRef>
+        </p:style>
+        <p:txBody>
+          <a:bodyPr rtlCol="0" anchor="ctr"/>
+          <a:lstStyle/>
+          <a:p>
+            <a:pPr algn="ctr"/>
+            <a:r>
+              <a:rPr lang="en-US" dirty="0" smtClean="0">
+                <a:solidFill>
+                  <a:schemeClr val="tx1"/>
+                </a:solidFill>
+              </a:rPr>
+              <a:t>Activity</a:t>
+            </a:r>
+            <a:endParaRPr lang="en-US" dirty="0">
+              <a:solidFill>
+                <a:schemeClr val="tx1"/>
+              </a:solidFill>
+            </a:endParaRPr>
+          </a:p>
+        </p:txBody>
+      </p:sp>
+      <p:sp>
+        <p:nvSpPr>
+          <p:cNvPr id="64" name="Rounded Rectangle 63"/>
+          <p:cNvSpPr/>
+          <p:nvPr/>
+        </p:nvSpPr>
+        <p:spPr>
+          <a:xfrm>
+            <a:off x="2292210" y="431083"/>
+            <a:ext cx="967074" cy="431560"/>
+          </a:xfrm>
+          <a:prstGeom prst="roundRect">
+            <a:avLst/>
+          </a:prstGeom>
+        </p:spPr>
+        <p:style>
+          <a:lnRef idx="1">
+            <a:schemeClr val="accent1"/>
+          </a:lnRef>
+          <a:fillRef idx="3">
+            <a:schemeClr val="accent1"/>
+          </a:fillRef>
+          <a:effectRef idx="2">
+            <a:schemeClr val="accent1"/>
+          </a:effectRef>
+          <a:fontRef idx="minor">
+            <a:schemeClr val="lt1"/>
+          </a:fontRef>
+        </p:style>
+        <p:txBody>
+          <a:bodyPr rtlCol="0" anchor="ctr"/>
+          <a:lstStyle/>
+          <a:p>
+            <a:pPr algn="ctr"/>
+            <a:r>
+              <a:rPr lang="en-US" dirty="0" smtClean="0">
+                <a:solidFill>
+                  <a:schemeClr val="tx1"/>
+                </a:solidFill>
+              </a:rPr>
+              <a:t>APT</a:t>
+            </a:r>
+            <a:endParaRPr lang="en-US" dirty="0">
+              <a:solidFill>
+                <a:schemeClr val="tx1"/>
+              </a:solidFill>
+            </a:endParaRPr>
+          </a:p>
+        </p:txBody>
+      </p:sp>
+      <p:sp>
+        <p:nvSpPr>
+          <p:cNvPr id="69" name="Rounded Rectangle 68"/>
+          <p:cNvSpPr/>
+          <p:nvPr/>
+        </p:nvSpPr>
+        <p:spPr>
+          <a:xfrm>
+            <a:off x="4553700" y="390326"/>
+            <a:ext cx="967074" cy="431560"/>
+          </a:xfrm>
+          <a:prstGeom prst="roundRect">
+            <a:avLst/>
+          </a:prstGeom>
+        </p:spPr>
+        <p:style>
+          <a:lnRef idx="1">
+            <a:schemeClr val="accent1"/>
+          </a:lnRef>
+          <a:fillRef idx="3">
+            <a:schemeClr val="accent1"/>
+          </a:fillRef>
+          <a:effectRef idx="2">
+            <a:schemeClr val="accent1"/>
+          </a:effectRef>
+          <a:fontRef idx="minor">
+            <a:schemeClr val="lt1"/>
+          </a:fontRef>
+        </p:style>
+        <p:txBody>
+          <a:bodyPr rtlCol="0" anchor="ctr"/>
+          <a:lstStyle/>
+          <a:p>
+            <a:pPr algn="ctr"/>
+            <a:r>
+              <a:rPr lang="en-US" dirty="0" smtClean="0">
+                <a:solidFill>
+                  <a:schemeClr val="tx1"/>
+                </a:solidFill>
+              </a:rPr>
+              <a:t>Phase</a:t>
+            </a:r>
+            <a:endParaRPr lang="en-US" dirty="0">
+              <a:solidFill>
+                <a:schemeClr val="tx1"/>
+              </a:solidFill>
+            </a:endParaRPr>
+          </a:p>
+        </p:txBody>
+      </p:sp>
+      <p:sp>
+        <p:nvSpPr>
+          <p:cNvPr id="70" name="Rounded Rectangle 69"/>
+          <p:cNvSpPr/>
+          <p:nvPr/>
+        </p:nvSpPr>
+        <p:spPr>
+          <a:xfrm>
+            <a:off x="785268" y="886536"/>
+            <a:ext cx="1168234" cy="431560"/>
+          </a:xfrm>
+          <a:prstGeom prst="roundRect">
+            <a:avLst/>
+          </a:prstGeom>
+        </p:spPr>
+        <p:style>
+          <a:lnRef idx="1">
+            <a:schemeClr val="accent1"/>
+          </a:lnRef>
+          <a:fillRef idx="3">
+            <a:schemeClr val="accent1"/>
+          </a:fillRef>
+          <a:effectRef idx="2">
+            <a:schemeClr val="accent1"/>
+          </a:effectRef>
+          <a:fontRef idx="minor">
+            <a:schemeClr val="lt1"/>
+          </a:fontRef>
+        </p:style>
+        <p:txBody>
+          <a:bodyPr rtlCol="0" anchor="ctr"/>
+          <a:lstStyle/>
+          <a:p>
+            <a:pPr algn="ctr"/>
+            <a:r>
+              <a:rPr lang="en-US" dirty="0" smtClean="0">
+                <a:solidFill>
+                  <a:schemeClr val="tx1"/>
+                </a:solidFill>
+              </a:rPr>
+              <a:t>Segment</a:t>
+            </a:r>
+            <a:endParaRPr lang="en-US" dirty="0">
+              <a:solidFill>
+                <a:schemeClr val="tx1"/>
+              </a:solidFill>
+            </a:endParaRPr>
+          </a:p>
+        </p:txBody>
+      </p:sp>
+      <p:cxnSp>
+        <p:nvCxnSpPr>
+          <p:cNvPr id="25" name="Straight Arrow Connector 24"/>
+          <p:cNvCxnSpPr>
+            <a:stCxn id="4" idx="0"/>
+            <a:endCxn id="62" idx="2"/>
+          </p:cNvCxnSpPr>
+          <p:nvPr/>
+        </p:nvCxnSpPr>
+        <p:spPr>
+          <a:xfrm flipV="1">
+            <a:off x="3621640" y="2347539"/>
+            <a:ext cx="1436602" cy="960235"/>
+          </a:xfrm>
+          <a:prstGeom prst="straightConnector1">
+            <a:avLst/>
+          </a:prstGeom>
+          <a:ln>
+            <a:tailEnd type="arrow"/>
+          </a:ln>
+        </p:spPr>
+        <p:style>
+          <a:lnRef idx="2">
+            <a:schemeClr val="accent1"/>
+          </a:lnRef>
+          <a:fillRef idx="0">
+            <a:schemeClr val="accent1"/>
+          </a:fillRef>
+          <a:effectRef idx="1">
+            <a:schemeClr val="accent1"/>
+          </a:effectRef>
+          <a:fontRef idx="minor">
+            <a:schemeClr val="tx1"/>
+          </a:fontRef>
+        </p:style>
+      </p:cxnSp>
+      <p:cxnSp>
+        <p:nvCxnSpPr>
+          <p:cNvPr id="105" name="Straight Arrow Connector 104"/>
+          <p:cNvCxnSpPr>
+            <a:stCxn id="5" idx="0"/>
+            <a:endCxn id="62" idx="2"/>
+          </p:cNvCxnSpPr>
+          <p:nvPr/>
+        </p:nvCxnSpPr>
+        <p:spPr>
+          <a:xfrm flipH="1" flipV="1">
+            <a:off x="5058242" y="2347539"/>
+            <a:ext cx="1657404" cy="960235"/>
+          </a:xfrm>
+          <a:prstGeom prst="straightConnector1">
+            <a:avLst/>
+          </a:prstGeom>
+          <a:ln>
+            <a:tailEnd type="arrow"/>
+          </a:ln>
+        </p:spPr>
+        <p:style>
+          <a:lnRef idx="2">
+            <a:schemeClr val="accent1"/>
+          </a:lnRef>
+          <a:fillRef idx="0">
+            <a:schemeClr val="accent1"/>
+          </a:fillRef>
+          <a:effectRef idx="1">
+            <a:schemeClr val="accent1"/>
+          </a:effectRef>
+          <a:fontRef idx="minor">
+            <a:schemeClr val="tx1"/>
+          </a:fontRef>
+        </p:style>
+      </p:cxnSp>
+      <p:cxnSp>
+        <p:nvCxnSpPr>
+          <p:cNvPr id="108" name="Straight Arrow Connector 107"/>
+          <p:cNvCxnSpPr>
+            <a:stCxn id="66" idx="0"/>
+            <a:endCxn id="62" idx="2"/>
+          </p:cNvCxnSpPr>
+          <p:nvPr/>
+        </p:nvCxnSpPr>
+        <p:spPr>
+          <a:xfrm flipV="1">
+            <a:off x="4469299" y="2347539"/>
+            <a:ext cx="588943" cy="2961794"/>
+          </a:xfrm>
+          <a:prstGeom prst="straightConnector1">
+            <a:avLst/>
+          </a:prstGeom>
+          <a:ln>
+            <a:tailEnd type="arrow"/>
+          </a:ln>
+        </p:spPr>
+        <p:style>
+          <a:lnRef idx="2">
+            <a:schemeClr val="accent1"/>
+          </a:lnRef>
+          <a:fillRef idx="0">
+            <a:schemeClr val="accent1"/>
+          </a:fillRef>
+          <a:effectRef idx="1">
+            <a:schemeClr val="accent1"/>
+          </a:effectRef>
+          <a:fontRef idx="minor">
+            <a:schemeClr val="tx1"/>
+          </a:fontRef>
+        </p:style>
+      </p:cxnSp>
+      <p:sp>
+        <p:nvSpPr>
+          <p:cNvPr id="109" name="TextBox 108"/>
+          <p:cNvSpPr txBox="1"/>
+          <p:nvPr/>
+        </p:nvSpPr>
+        <p:spPr>
+          <a:xfrm>
+            <a:off x="4539871" y="2401579"/>
+            <a:ext cx="1055172" cy="276999"/>
+          </a:xfrm>
+          <a:prstGeom prst="rect">
+            <a:avLst/>
+          </a:prstGeom>
+          <a:noFill/>
+        </p:spPr>
+        <p:txBody>
+          <a:bodyPr wrap="none" rtlCol="0">
+            <a:spAutoFit/>
+          </a:bodyPr>
+          <a:lstStyle/>
+          <a:p>
+            <a:pPr algn="ctr"/>
+            <a:r>
+              <a:rPr lang="en-US" sz="1200" dirty="0" err="1" smtClean="0"/>
+              <a:t>partOfPattern</a:t>
+            </a:r>
+            <a:endParaRPr lang="en-US" sz="1200" dirty="0"/>
+          </a:p>
+        </p:txBody>
+      </p:sp>
+      <p:cxnSp>
+        <p:nvCxnSpPr>
+          <p:cNvPr id="110" name="Straight Arrow Connector 109"/>
+          <p:cNvCxnSpPr>
+            <a:stCxn id="62" idx="0"/>
+            <a:endCxn id="63" idx="2"/>
+          </p:cNvCxnSpPr>
+          <p:nvPr/>
+        </p:nvCxnSpPr>
+        <p:spPr>
+          <a:xfrm flipH="1" flipV="1">
+            <a:off x="5037237" y="1526628"/>
+            <a:ext cx="21005" cy="348840"/>
+          </a:xfrm>
+          <a:prstGeom prst="straightConnector1">
+            <a:avLst/>
+          </a:prstGeom>
+          <a:ln>
+            <a:tailEnd type="arrow"/>
+          </a:ln>
+        </p:spPr>
+        <p:style>
+          <a:lnRef idx="2">
+            <a:schemeClr val="accent1"/>
+          </a:lnRef>
+          <a:fillRef idx="0">
+            <a:schemeClr val="accent1"/>
+          </a:fillRef>
+          <a:effectRef idx="1">
+            <a:schemeClr val="accent1"/>
+          </a:effectRef>
+          <a:fontRef idx="minor">
+            <a:schemeClr val="tx1"/>
+          </a:fontRef>
+        </p:style>
+      </p:cxnSp>
+      <p:sp>
+        <p:nvSpPr>
+          <p:cNvPr id="112" name="TextBox 111"/>
+          <p:cNvSpPr txBox="1"/>
+          <p:nvPr/>
+        </p:nvSpPr>
+        <p:spPr>
+          <a:xfrm>
+            <a:off x="4990894" y="1595272"/>
+            <a:ext cx="1069524" cy="276999"/>
+          </a:xfrm>
+          <a:prstGeom prst="rect">
+            <a:avLst/>
+          </a:prstGeom>
+          <a:noFill/>
+        </p:spPr>
+        <p:txBody>
+          <a:bodyPr wrap="none" rtlCol="0">
+            <a:spAutoFit/>
+          </a:bodyPr>
+          <a:lstStyle/>
+          <a:p>
+            <a:pPr algn="ctr"/>
+            <a:r>
+              <a:rPr lang="en-US" sz="1200" dirty="0" err="1" smtClean="0"/>
+              <a:t>partOfActivity</a:t>
+            </a:r>
+            <a:endParaRPr lang="en-US" sz="1200" dirty="0"/>
+          </a:p>
+        </p:txBody>
+      </p:sp>
+      <p:sp>
+        <p:nvSpPr>
+          <p:cNvPr id="113" name="TextBox 112"/>
+          <p:cNvSpPr txBox="1"/>
+          <p:nvPr/>
+        </p:nvSpPr>
+        <p:spPr>
+          <a:xfrm>
+            <a:off x="4990894" y="802077"/>
+            <a:ext cx="966931" cy="276999"/>
+          </a:xfrm>
+          <a:prstGeom prst="rect">
+            <a:avLst/>
+          </a:prstGeom>
+          <a:noFill/>
+        </p:spPr>
+        <p:txBody>
+          <a:bodyPr wrap="none" rtlCol="0">
+            <a:spAutoFit/>
+          </a:bodyPr>
+          <a:lstStyle/>
+          <a:p>
+            <a:pPr algn="ctr"/>
+            <a:r>
+              <a:rPr lang="en-US" sz="1200" dirty="0" err="1" smtClean="0"/>
+              <a:t>partOfPhase</a:t>
+            </a:r>
+            <a:endParaRPr lang="en-US" sz="1200" dirty="0"/>
+          </a:p>
+        </p:txBody>
+      </p:sp>
+      <p:cxnSp>
+        <p:nvCxnSpPr>
+          <p:cNvPr id="114" name="Straight Arrow Connector 113"/>
+          <p:cNvCxnSpPr>
+            <a:stCxn id="63" idx="0"/>
+            <a:endCxn id="69" idx="2"/>
+          </p:cNvCxnSpPr>
+          <p:nvPr/>
+        </p:nvCxnSpPr>
+        <p:spPr>
+          <a:xfrm flipV="1">
+            <a:off x="5037237" y="821886"/>
+            <a:ext cx="0" cy="273182"/>
+          </a:xfrm>
+          <a:prstGeom prst="straightConnector1">
+            <a:avLst/>
+          </a:prstGeom>
+          <a:ln>
+            <a:tailEnd type="arrow"/>
+          </a:ln>
+        </p:spPr>
+        <p:style>
+          <a:lnRef idx="2">
+            <a:schemeClr val="accent1"/>
+          </a:lnRef>
+          <a:fillRef idx="0">
+            <a:schemeClr val="accent1"/>
+          </a:fillRef>
+          <a:effectRef idx="1">
+            <a:schemeClr val="accent1"/>
+          </a:effectRef>
+          <a:fontRef idx="minor">
+            <a:schemeClr val="tx1"/>
+          </a:fontRef>
+        </p:style>
+      </p:cxnSp>
+      <p:sp>
+        <p:nvSpPr>
+          <p:cNvPr id="119" name="TextBox 118"/>
+          <p:cNvSpPr txBox="1"/>
+          <p:nvPr/>
+        </p:nvSpPr>
+        <p:spPr>
+          <a:xfrm>
+            <a:off x="3461948" y="609537"/>
+            <a:ext cx="836813" cy="276999"/>
+          </a:xfrm>
+          <a:prstGeom prst="rect">
+            <a:avLst/>
+          </a:prstGeom>
+          <a:noFill/>
+        </p:spPr>
+        <p:txBody>
+          <a:bodyPr wrap="none" rtlCol="0">
+            <a:spAutoFit/>
+          </a:bodyPr>
+          <a:lstStyle/>
+          <a:p>
+            <a:pPr algn="ctr"/>
+            <a:r>
+              <a:rPr lang="en-US" sz="1200" dirty="0" err="1" smtClean="0"/>
+              <a:t>partOfAPT</a:t>
+            </a:r>
+            <a:endParaRPr lang="en-US" sz="1200" dirty="0"/>
+          </a:p>
+        </p:txBody>
+      </p:sp>
+      <p:cxnSp>
+        <p:nvCxnSpPr>
+          <p:cNvPr id="120" name="Straight Arrow Connector 119"/>
+          <p:cNvCxnSpPr>
+            <a:stCxn id="69" idx="1"/>
+            <a:endCxn id="64" idx="3"/>
+          </p:cNvCxnSpPr>
+          <p:nvPr/>
+        </p:nvCxnSpPr>
+        <p:spPr>
+          <a:xfrm flipH="1">
+            <a:off x="3259284" y="606106"/>
+            <a:ext cx="1294416" cy="40757"/>
+          </a:xfrm>
+          <a:prstGeom prst="straightConnector1">
+            <a:avLst/>
+          </a:prstGeom>
+          <a:ln>
+            <a:tailEnd type="arrow"/>
+          </a:ln>
+        </p:spPr>
+        <p:style>
+          <a:lnRef idx="2">
+            <a:schemeClr val="accent1"/>
+          </a:lnRef>
+          <a:fillRef idx="0">
+            <a:schemeClr val="accent1"/>
+          </a:fillRef>
+          <a:effectRef idx="1">
+            <a:schemeClr val="accent1"/>
+          </a:effectRef>
+          <a:fontRef idx="minor">
+            <a:schemeClr val="tx1"/>
+          </a:fontRef>
+        </p:style>
+      </p:cxnSp>
+      <p:cxnSp>
+        <p:nvCxnSpPr>
+          <p:cNvPr id="122" name="Straight Arrow Connector 121"/>
+          <p:cNvCxnSpPr>
+            <a:endCxn id="70" idx="2"/>
+          </p:cNvCxnSpPr>
+          <p:nvPr/>
+        </p:nvCxnSpPr>
+        <p:spPr>
+          <a:xfrm flipV="1">
+            <a:off x="1369385" y="1318096"/>
+            <a:ext cx="0" cy="428181"/>
+          </a:xfrm>
+          <a:prstGeom prst="straightConnector1">
+            <a:avLst/>
+          </a:prstGeom>
+          <a:ln>
+            <a:tailEnd type="arrow"/>
+          </a:ln>
+        </p:spPr>
+        <p:style>
+          <a:lnRef idx="2">
+            <a:schemeClr val="accent1"/>
+          </a:lnRef>
+          <a:fillRef idx="0">
+            <a:schemeClr val="accent1"/>
+          </a:fillRef>
+          <a:effectRef idx="1">
+            <a:schemeClr val="accent1"/>
+          </a:effectRef>
+          <a:fontRef idx="minor">
+            <a:schemeClr val="tx1"/>
+          </a:fontRef>
+        </p:style>
+      </p:cxnSp>
+      <p:sp>
+        <p:nvSpPr>
+          <p:cNvPr id="124" name="TextBox 123"/>
+          <p:cNvSpPr txBox="1"/>
+          <p:nvPr/>
+        </p:nvSpPr>
+        <p:spPr>
+          <a:xfrm>
+            <a:off x="1309141" y="1388128"/>
+            <a:ext cx="1146468" cy="276999"/>
+          </a:xfrm>
+          <a:prstGeom prst="rect">
+            <a:avLst/>
+          </a:prstGeom>
+          <a:noFill/>
+        </p:spPr>
+        <p:txBody>
+          <a:bodyPr wrap="none" rtlCol="0">
+            <a:spAutoFit/>
+          </a:bodyPr>
+          <a:lstStyle/>
+          <a:p>
+            <a:pPr algn="ctr"/>
+            <a:r>
+              <a:rPr lang="en-US" sz="1200" dirty="0" err="1" smtClean="0"/>
+              <a:t>partOfSegment</a:t>
+            </a:r>
+            <a:endParaRPr lang="en-US" sz="1200" dirty="0"/>
+          </a:p>
+        </p:txBody>
+      </p:sp>
+      <p:sp>
+        <p:nvSpPr>
+          <p:cNvPr id="125" name="TextBox 124"/>
+          <p:cNvSpPr txBox="1"/>
+          <p:nvPr/>
+        </p:nvSpPr>
+        <p:spPr>
+          <a:xfrm>
+            <a:off x="393266" y="1824717"/>
+            <a:ext cx="1939480" cy="461665"/>
+          </a:xfrm>
+          <a:prstGeom prst="rect">
+            <a:avLst/>
+          </a:prstGeom>
+          <a:noFill/>
+        </p:spPr>
+        <p:txBody>
+          <a:bodyPr wrap="square" rtlCol="0">
+            <a:spAutoFit/>
+          </a:bodyPr>
+          <a:lstStyle/>
+          <a:p>
+            <a:pPr algn="ctr"/>
+            <a:r>
+              <a:rPr lang="en-US" sz="1200" dirty="0" smtClean="0"/>
+              <a:t>Resources, Subjects, Entities, Patterns, Agents</a:t>
+            </a:r>
+            <a:endParaRPr lang="en-US" sz="1200" dirty="0"/>
           </a:p>
         </p:txBody>
       </p:sp>

</xml_diff>

<commit_message>
cleanup on architecture diagram
</commit_message>
<xml_diff>
--- a/Ingest/languagediagram.pptx
+++ b/Ingest/languagediagram.pptx
@@ -2,15 +2,15 @@
 <file path=ppt/presentation.xml><?xml version="1.0" encoding="utf-8"?>
 <p:presentation xmlns:a="http://schemas.openxmlformats.org/drawingml/2006/main" xmlns:r="http://schemas.openxmlformats.org/officeDocument/2006/relationships" xmlns:p="http://schemas.openxmlformats.org/presentationml/2006/main">
   <p:sldMasterIdLst>
-    <p:sldMasterId id="2147483648" r:id="rId5"/>
+    <p:sldMasterId id="2147483648" r:id="rId1"/>
   </p:sldMasterIdLst>
   <p:notesMasterIdLst>
-    <p:notesMasterId r:id="rId7"/>
+    <p:notesMasterId r:id="rId3"/>
   </p:notesMasterIdLst>
   <p:sldIdLst>
-    <p:sldId id="256" r:id="rId8"/>
+    <p:sldId id="256" r:id="rId2"/>
   </p:sldIdLst>
-  <p:sldSz cx="9144000" cy="6858000"/>
+  <p:sldSz cx="9144000" cy="6858000" type="screen4x3"/>
   <p:notesSz cx="6858000" cy="9144000"/>
   <p:defaultTextStyle>
     <a:defPPr marL="0" marR="0" indent="0" algn="l" defTabSz="914400" rtl="0" fontAlgn="auto" latinLnBrk="1" hangingPunct="0">
@@ -28,7 +28,7 @@
       <a:buFontTx/>
       <a:buNone/>
       <a:tabLst/>
-      <a:defRPr b="0" baseline="0" cap="none" i="0" spc="0" strike="noStrike" sz="1800" u="none" kumimoji="0" normalizeH="0">
+      <a:defRPr kumimoji="0" sz="1800" b="0" i="0" u="none" strike="noStrike" cap="none" spc="0" normalizeH="0" baseline="0">
         <a:ln>
           <a:noFill/>
         </a:ln>
@@ -54,7 +54,7 @@
       <a:buFontTx/>
       <a:buNone/>
       <a:tabLst/>
-      <a:defRPr b="0" baseline="0" cap="none" i="0" spc="0" strike="noStrike" sz="1800" u="none" kumimoji="0" normalizeH="0">
+      <a:defRPr kumimoji="0" sz="1800" b="0" i="0" u="none" strike="noStrike" cap="none" spc="0" normalizeH="0" baseline="0">
         <a:ln>
           <a:noFill/>
         </a:ln>
@@ -84,7 +84,7 @@
       <a:buFontTx/>
       <a:buNone/>
       <a:tabLst/>
-      <a:defRPr b="0" baseline="0" cap="none" i="0" spc="0" strike="noStrike" sz="1800" u="none" kumimoji="0" normalizeH="0">
+      <a:defRPr kumimoji="0" sz="1800" b="0" i="0" u="none" strike="noStrike" cap="none" spc="0" normalizeH="0" baseline="0">
         <a:ln>
           <a:noFill/>
         </a:ln>
@@ -114,7 +114,7 @@
       <a:buFontTx/>
       <a:buNone/>
       <a:tabLst/>
-      <a:defRPr b="0" baseline="0" cap="none" i="0" spc="0" strike="noStrike" sz="1800" u="none" kumimoji="0" normalizeH="0">
+      <a:defRPr kumimoji="0" sz="1800" b="0" i="0" u="none" strike="noStrike" cap="none" spc="0" normalizeH="0" baseline="0">
         <a:ln>
           <a:noFill/>
         </a:ln>
@@ -144,7 +144,7 @@
       <a:buFontTx/>
       <a:buNone/>
       <a:tabLst/>
-      <a:defRPr b="0" baseline="0" cap="none" i="0" spc="0" strike="noStrike" sz="1800" u="none" kumimoji="0" normalizeH="0">
+      <a:defRPr kumimoji="0" sz="1800" b="0" i="0" u="none" strike="noStrike" cap="none" spc="0" normalizeH="0" baseline="0">
         <a:ln>
           <a:noFill/>
         </a:ln>
@@ -174,7 +174,7 @@
       <a:buFontTx/>
       <a:buNone/>
       <a:tabLst/>
-      <a:defRPr b="0" baseline="0" cap="none" i="0" spc="0" strike="noStrike" sz="1800" u="none" kumimoji="0" normalizeH="0">
+      <a:defRPr kumimoji="0" sz="1800" b="0" i="0" u="none" strike="noStrike" cap="none" spc="0" normalizeH="0" baseline="0">
         <a:ln>
           <a:noFill/>
         </a:ln>
@@ -204,7 +204,7 @@
       <a:buFontTx/>
       <a:buNone/>
       <a:tabLst/>
-      <a:defRPr b="0" baseline="0" cap="none" i="0" spc="0" strike="noStrike" sz="1800" u="none" kumimoji="0" normalizeH="0">
+      <a:defRPr kumimoji="0" sz="1800" b="0" i="0" u="none" strike="noStrike" cap="none" spc="0" normalizeH="0" baseline="0">
         <a:ln>
           <a:noFill/>
         </a:ln>
@@ -234,7 +234,7 @@
       <a:buFontTx/>
       <a:buNone/>
       <a:tabLst/>
-      <a:defRPr b="0" baseline="0" cap="none" i="0" spc="0" strike="noStrike" sz="1800" u="none" kumimoji="0" normalizeH="0">
+      <a:defRPr kumimoji="0" sz="1800" b="0" i="0" u="none" strike="noStrike" cap="none" spc="0" normalizeH="0" baseline="0">
         <a:ln>
           <a:noFill/>
         </a:ln>
@@ -264,7 +264,7 @@
       <a:buFontTx/>
       <a:buNone/>
       <a:tabLst/>
-      <a:defRPr b="0" baseline="0" cap="none" i="0" spc="0" strike="noStrike" sz="1800" u="none" kumimoji="0" normalizeH="0">
+      <a:defRPr kumimoji="0" sz="1800" b="0" i="0" u="none" strike="noStrike" cap="none" spc="0" normalizeH="0" baseline="0">
         <a:ln>
           <a:noFill/>
         </a:ln>
@@ -294,7 +294,7 @@
       <a:buFontTx/>
       <a:buNone/>
       <a:tabLst/>
-      <a:defRPr b="0" baseline="0" cap="none" i="0" spc="0" strike="noStrike" sz="1800" u="none" kumimoji="0" normalizeH="0">
+      <a:defRPr kumimoji="0" sz="1800" b="0" i="0" u="none" strike="noStrike" cap="none" spc="0" normalizeH="0" baseline="0">
         <a:ln>
           <a:noFill/>
         </a:ln>
@@ -313,13 +313,14 @@
 </p:presentation>
 </file>
 
-<file path=ppt/commentAuthors.xml><?xml version="1.0" encoding="utf-8"?>
-<p:cmAuthorLst xmlns:a="http://schemas.openxmlformats.org/drawingml/2006/main" xmlns:r="http://schemas.openxmlformats.org/officeDocument/2006/relationships" xmlns:p="http://schemas.openxmlformats.org/presentationml/2006/main"/>
-</file>
-
 <file path=ppt/notesMasters/notesMaster1.xml><?xml version="1.0" encoding="utf-8"?>
 <p:notesMaster xmlns:a="http://schemas.openxmlformats.org/drawingml/2006/main" xmlns:r="http://schemas.openxmlformats.org/officeDocument/2006/relationships" xmlns:p="http://schemas.openxmlformats.org/presentationml/2006/main">
   <p:cSld>
+    <p:bg>
+      <p:bgRef idx="1001">
+        <a:schemeClr val="bg1"/>
+      </p:bgRef>
+    </p:bg>
     <p:spTree>
       <p:nvGrpSpPr>
         <p:cNvPr id="1" name=""/>
@@ -337,7 +338,9 @@
       <p:sp>
         <p:nvSpPr>
           <p:cNvPr id="109" name="Shape 109"/>
-          <p:cNvSpPr/>
+          <p:cNvSpPr>
+            <a:spLocks noGrp="1" noRot="1" noChangeAspect="1"/>
+          </p:cNvSpPr>
           <p:nvPr>
             <p:ph type="sldImg"/>
           </p:nvPr>
@@ -355,14 +358,16 @@
           <a:bodyPr/>
           <a:lstStyle/>
           <a:p>
-            <a:pPr/>
+            <a:endParaRPr/>
           </a:p>
         </p:txBody>
       </p:sp>
       <p:sp>
         <p:nvSpPr>
           <p:cNvPr id="110" name="Shape 110"/>
-          <p:cNvSpPr/>
+          <p:cNvSpPr>
+            <a:spLocks noGrp="1"/>
+          </p:cNvSpPr>
           <p:nvPr>
             <p:ph type="body" sz="quarter" idx="1"/>
           </p:nvPr>
@@ -380,11 +385,16 @@
           <a:bodyPr/>
           <a:lstStyle/>
           <a:p>
-            <a:pPr/>
+            <a:endParaRPr/>
           </a:p>
         </p:txBody>
       </p:sp>
     </p:spTree>
+    <p:extLst>
+      <p:ext uri="{BB962C8B-B14F-4D97-AF65-F5344CB8AC3E}">
+        <p14:creationId xmlns:p14="http://schemas.microsoft.com/office/powerpoint/2010/main" val="84536978"/>
+      </p:ext>
+    </p:extLst>
   </p:cSld>
   <p:clrMap bg1="lt1" tx1="dk1" bg2="lt2" tx2="dk2" accent1="accent1" accent2="accent2" accent3="accent3" accent4="accent4" accent5="accent5" accent6="accent6" hlink="hlink" folHlink="folHlink"/>
   <p:notesStyle>
@@ -465,7 +475,7 @@
 </file>
 
 <file path=ppt/slideLayouts/slideLayout1.xml><?xml version="1.0" encoding="utf-8"?>
-<p:sldLayout xmlns:a="http://schemas.openxmlformats.org/drawingml/2006/main" xmlns:r="http://schemas.openxmlformats.org/officeDocument/2006/relationships" xmlns:p="http://schemas.openxmlformats.org/presentationml/2006/main" type="title" showMasterSp="1" showMasterPhAnim="1">
+<p:sldLayout xmlns:a="http://schemas.openxmlformats.org/drawingml/2006/main" xmlns:r="http://schemas.openxmlformats.org/officeDocument/2006/relationships" xmlns:p="http://schemas.openxmlformats.org/presentationml/2006/main" type="title">
   <p:cSld name="Title Slide">
     <p:spTree>
       <p:nvGrpSpPr>
@@ -484,7 +494,9 @@
       <p:sp>
         <p:nvSpPr>
           <p:cNvPr id="11" name="Shape 11"/>
-          <p:cNvSpPr/>
+          <p:cNvSpPr>
+            <a:spLocks noGrp="1"/>
+          </p:cNvSpPr>
           <p:nvPr>
             <p:ph type="title"/>
           </p:nvPr>
@@ -502,7 +514,6 @@
           <a:bodyPr/>
           <a:lstStyle/>
           <a:p>
-            <a:pPr/>
             <a:r>
               <a:t>Click to edit Master title style</a:t>
             </a:r>
@@ -512,7 +523,9 @@
       <p:sp>
         <p:nvSpPr>
           <p:cNvPr id="12" name="Shape 12"/>
-          <p:cNvSpPr/>
+          <p:cNvSpPr>
+            <a:spLocks noGrp="1"/>
+          </p:cNvSpPr>
           <p:nvPr>
             <p:ph type="body" sz="quarter" idx="1"/>
           </p:nvPr>
@@ -541,7 +554,6 @@
             </a:lvl1pPr>
           </a:lstStyle>
           <a:p>
-            <a:pPr/>
             <a:r>
               <a:t>Click to edit Master subtitle style</a:t>
             </a:r>
@@ -551,7 +563,9 @@
       <p:sp>
         <p:nvSpPr>
           <p:cNvPr id="13" name="Shape 13"/>
-          <p:cNvSpPr/>
+          <p:cNvSpPr>
+            <a:spLocks noGrp="1"/>
+          </p:cNvSpPr>
           <p:nvPr>
             <p:ph type="sldNum" sz="quarter" idx="2"/>
           </p:nvPr>
@@ -565,8 +579,10 @@
           <a:bodyPr/>
           <a:lstStyle/>
           <a:p>
-            <a:pPr/>
-            <a:fld id="{86CB4B4D-7CA3-9044-876B-883B54F8677D}" type="slidenum"/>
+            <a:fld id="{86CB4B4D-7CA3-9044-876B-883B54F8677D}" type="slidenum">
+              <a:t>‹#›</a:t>
+            </a:fld>
+            <a:endParaRPr/>
           </a:p>
         </p:txBody>
       </p:sp>
@@ -575,12 +591,12 @@
   <p:clrMapOvr>
     <a:masterClrMapping/>
   </p:clrMapOvr>
-  <p:transition xmlns:p14="http://schemas.microsoft.com/office/powerpoint/2010/main" spd="med" advClick="1"/>
+  <p:transition xmlns:p14="http://schemas.microsoft.com/office/powerpoint/2010/main" spd="med"/>
 </p:sldLayout>
 </file>
 
 <file path=ppt/slideLayouts/slideLayout10.xml><?xml version="1.0" encoding="utf-8"?>
-<p:sldLayout xmlns:a="http://schemas.openxmlformats.org/drawingml/2006/main" xmlns:r="http://schemas.openxmlformats.org/officeDocument/2006/relationships" xmlns:p="http://schemas.openxmlformats.org/presentationml/2006/main" type="tx" showMasterSp="1" showMasterPhAnim="1">
+<p:sldLayout xmlns:a="http://schemas.openxmlformats.org/drawingml/2006/main" xmlns:r="http://schemas.openxmlformats.org/officeDocument/2006/relationships" xmlns:p="http://schemas.openxmlformats.org/presentationml/2006/main" type="tx">
   <p:cSld name="Title and Vertical Text">
     <p:spTree>
       <p:nvGrpSpPr>
@@ -599,7 +615,9 @@
       <p:sp>
         <p:nvSpPr>
           <p:cNvPr id="92" name="Shape 92"/>
-          <p:cNvSpPr/>
+          <p:cNvSpPr>
+            <a:spLocks noGrp="1"/>
+          </p:cNvSpPr>
           <p:nvPr>
             <p:ph type="title"/>
           </p:nvPr>
@@ -613,7 +631,6 @@
           <a:bodyPr/>
           <a:lstStyle/>
           <a:p>
-            <a:pPr/>
             <a:r>
               <a:t>Click to edit Master title style</a:t>
             </a:r>
@@ -623,7 +640,9 @@
       <p:sp>
         <p:nvSpPr>
           <p:cNvPr id="93" name="Shape 93"/>
-          <p:cNvSpPr/>
+          <p:cNvSpPr>
+            <a:spLocks noGrp="1"/>
+          </p:cNvSpPr>
           <p:nvPr>
             <p:ph type="body" idx="1"/>
           </p:nvPr>
@@ -637,7 +656,6 @@
           <a:bodyPr/>
           <a:lstStyle/>
           <a:p>
-            <a:pPr/>
             <a:r>
               <a:t>Click to edit Master text styles</a:t>
             </a:r>
@@ -671,7 +689,9 @@
       <p:sp>
         <p:nvSpPr>
           <p:cNvPr id="94" name="Shape 94"/>
-          <p:cNvSpPr/>
+          <p:cNvSpPr>
+            <a:spLocks noGrp="1"/>
+          </p:cNvSpPr>
           <p:nvPr>
             <p:ph type="sldNum" sz="quarter" idx="2"/>
           </p:nvPr>
@@ -685,8 +705,10 @@
           <a:bodyPr/>
           <a:lstStyle/>
           <a:p>
-            <a:pPr/>
-            <a:fld id="{86CB4B4D-7CA3-9044-876B-883B54F8677D}" type="slidenum"/>
+            <a:fld id="{86CB4B4D-7CA3-9044-876B-883B54F8677D}" type="slidenum">
+              <a:t>‹#›</a:t>
+            </a:fld>
+            <a:endParaRPr/>
           </a:p>
         </p:txBody>
       </p:sp>
@@ -695,12 +717,12 @@
   <p:clrMapOvr>
     <a:masterClrMapping/>
   </p:clrMapOvr>
-  <p:transition xmlns:p14="http://schemas.microsoft.com/office/powerpoint/2010/main" spd="med" advClick="1"/>
+  <p:transition xmlns:p14="http://schemas.microsoft.com/office/powerpoint/2010/main" spd="med"/>
 </p:sldLayout>
 </file>
 
 <file path=ppt/slideLayouts/slideLayout11.xml><?xml version="1.0" encoding="utf-8"?>
-<p:sldLayout xmlns:a="http://schemas.openxmlformats.org/drawingml/2006/main" xmlns:r="http://schemas.openxmlformats.org/officeDocument/2006/relationships" xmlns:p="http://schemas.openxmlformats.org/presentationml/2006/main" type="tx" showMasterSp="1" showMasterPhAnim="1">
+<p:sldLayout xmlns:a="http://schemas.openxmlformats.org/drawingml/2006/main" xmlns:r="http://schemas.openxmlformats.org/officeDocument/2006/relationships" xmlns:p="http://schemas.openxmlformats.org/presentationml/2006/main" type="tx">
   <p:cSld name="Vertical Title and Text">
     <p:spTree>
       <p:nvGrpSpPr>
@@ -719,7 +741,9 @@
       <p:sp>
         <p:nvSpPr>
           <p:cNvPr id="101" name="Shape 101"/>
-          <p:cNvSpPr/>
+          <p:cNvSpPr>
+            <a:spLocks noGrp="1"/>
+          </p:cNvSpPr>
           <p:nvPr>
             <p:ph type="title"/>
           </p:nvPr>
@@ -737,7 +761,6 @@
           <a:bodyPr/>
           <a:lstStyle/>
           <a:p>
-            <a:pPr/>
             <a:r>
               <a:t>Click to edit Master title style</a:t>
             </a:r>
@@ -747,7 +770,9 @@
       <p:sp>
         <p:nvSpPr>
           <p:cNvPr id="102" name="Shape 102"/>
-          <p:cNvSpPr/>
+          <p:cNvSpPr>
+            <a:spLocks noGrp="1"/>
+          </p:cNvSpPr>
           <p:nvPr>
             <p:ph type="body" idx="1"/>
           </p:nvPr>
@@ -765,7 +790,6 @@
           <a:bodyPr/>
           <a:lstStyle/>
           <a:p>
-            <a:pPr/>
             <a:r>
               <a:t>Click to edit Master text styles</a:t>
             </a:r>
@@ -799,7 +823,9 @@
       <p:sp>
         <p:nvSpPr>
           <p:cNvPr id="103" name="Shape 103"/>
-          <p:cNvSpPr/>
+          <p:cNvSpPr>
+            <a:spLocks noGrp="1"/>
+          </p:cNvSpPr>
           <p:nvPr>
             <p:ph type="sldNum" sz="quarter" idx="2"/>
           </p:nvPr>
@@ -813,8 +839,10 @@
           <a:bodyPr/>
           <a:lstStyle/>
           <a:p>
-            <a:pPr/>
-            <a:fld id="{86CB4B4D-7CA3-9044-876B-883B54F8677D}" type="slidenum"/>
+            <a:fld id="{86CB4B4D-7CA3-9044-876B-883B54F8677D}" type="slidenum">
+              <a:t>‹#›</a:t>
+            </a:fld>
+            <a:endParaRPr/>
           </a:p>
         </p:txBody>
       </p:sp>
@@ -823,12 +851,12 @@
   <p:clrMapOvr>
     <a:masterClrMapping/>
   </p:clrMapOvr>
-  <p:transition xmlns:p14="http://schemas.microsoft.com/office/powerpoint/2010/main" spd="med" advClick="1"/>
+  <p:transition xmlns:p14="http://schemas.microsoft.com/office/powerpoint/2010/main" spd="med"/>
 </p:sldLayout>
 </file>
 
 <file path=ppt/slideLayouts/slideLayout2.xml><?xml version="1.0" encoding="utf-8"?>
-<p:sldLayout xmlns:a="http://schemas.openxmlformats.org/drawingml/2006/main" xmlns:r="http://schemas.openxmlformats.org/officeDocument/2006/relationships" xmlns:p="http://schemas.openxmlformats.org/presentationml/2006/main" type="tx" showMasterSp="1" showMasterPhAnim="1">
+<p:sldLayout xmlns:a="http://schemas.openxmlformats.org/drawingml/2006/main" xmlns:r="http://schemas.openxmlformats.org/officeDocument/2006/relationships" xmlns:p="http://schemas.openxmlformats.org/presentationml/2006/main" type="tx">
   <p:cSld name="Title and Content">
     <p:spTree>
       <p:nvGrpSpPr>
@@ -847,7 +875,9 @@
       <p:sp>
         <p:nvSpPr>
           <p:cNvPr id="20" name="Shape 20"/>
-          <p:cNvSpPr/>
+          <p:cNvSpPr>
+            <a:spLocks noGrp="1"/>
+          </p:cNvSpPr>
           <p:nvPr>
             <p:ph type="title"/>
           </p:nvPr>
@@ -861,7 +891,6 @@
           <a:bodyPr/>
           <a:lstStyle/>
           <a:p>
-            <a:pPr/>
             <a:r>
               <a:t>Click to edit Master title style</a:t>
             </a:r>
@@ -871,7 +900,9 @@
       <p:sp>
         <p:nvSpPr>
           <p:cNvPr id="21" name="Shape 21"/>
-          <p:cNvSpPr/>
+          <p:cNvSpPr>
+            <a:spLocks noGrp="1"/>
+          </p:cNvSpPr>
           <p:nvPr>
             <p:ph type="body" idx="1"/>
           </p:nvPr>
@@ -885,7 +916,6 @@
           <a:bodyPr/>
           <a:lstStyle/>
           <a:p>
-            <a:pPr/>
             <a:r>
               <a:t>Click to edit Master text styles</a:t>
             </a:r>
@@ -919,7 +949,9 @@
       <p:sp>
         <p:nvSpPr>
           <p:cNvPr id="22" name="Shape 22"/>
-          <p:cNvSpPr/>
+          <p:cNvSpPr>
+            <a:spLocks noGrp="1"/>
+          </p:cNvSpPr>
           <p:nvPr>
             <p:ph type="sldNum" sz="quarter" idx="2"/>
           </p:nvPr>
@@ -933,8 +965,10 @@
           <a:bodyPr/>
           <a:lstStyle/>
           <a:p>
-            <a:pPr/>
-            <a:fld id="{86CB4B4D-7CA3-9044-876B-883B54F8677D}" type="slidenum"/>
+            <a:fld id="{86CB4B4D-7CA3-9044-876B-883B54F8677D}" type="slidenum">
+              <a:t>‹#›</a:t>
+            </a:fld>
+            <a:endParaRPr/>
           </a:p>
         </p:txBody>
       </p:sp>
@@ -943,12 +977,12 @@
   <p:clrMapOvr>
     <a:masterClrMapping/>
   </p:clrMapOvr>
-  <p:transition xmlns:p14="http://schemas.microsoft.com/office/powerpoint/2010/main" spd="med" advClick="1"/>
+  <p:transition xmlns:p14="http://schemas.microsoft.com/office/powerpoint/2010/main" spd="med"/>
 </p:sldLayout>
 </file>
 
 <file path=ppt/slideLayouts/slideLayout3.xml><?xml version="1.0" encoding="utf-8"?>
-<p:sldLayout xmlns:a="http://schemas.openxmlformats.org/drawingml/2006/main" xmlns:r="http://schemas.openxmlformats.org/officeDocument/2006/relationships" xmlns:p="http://schemas.openxmlformats.org/presentationml/2006/main" type="tx" showMasterSp="1" showMasterPhAnim="1">
+<p:sldLayout xmlns:a="http://schemas.openxmlformats.org/drawingml/2006/main" xmlns:r="http://schemas.openxmlformats.org/officeDocument/2006/relationships" xmlns:p="http://schemas.openxmlformats.org/presentationml/2006/main" type="tx">
   <p:cSld name="Section Header">
     <p:spTree>
       <p:nvGrpSpPr>
@@ -967,7 +1001,9 @@
       <p:sp>
         <p:nvSpPr>
           <p:cNvPr id="29" name="Shape 29"/>
-          <p:cNvSpPr/>
+          <p:cNvSpPr>
+            <a:spLocks noGrp="1"/>
+          </p:cNvSpPr>
           <p:nvPr>
             <p:ph type="title"/>
           </p:nvPr>
@@ -985,11 +1021,10 @@
           <a:bodyPr anchor="t"/>
           <a:lstStyle>
             <a:lvl1pPr algn="l">
-              <a:defRPr b="1" cap="all" sz="4000"/>
+              <a:defRPr sz="4000" b="1" cap="all"/>
             </a:lvl1pPr>
           </a:lstStyle>
           <a:p>
-            <a:pPr/>
             <a:r>
               <a:t>Click to edit Master title style</a:t>
             </a:r>
@@ -999,7 +1034,9 @@
       <p:sp>
         <p:nvSpPr>
           <p:cNvPr id="30" name="Shape 30"/>
-          <p:cNvSpPr/>
+          <p:cNvSpPr>
+            <a:spLocks noGrp="1"/>
+          </p:cNvSpPr>
           <p:nvPr>
             <p:ph type="body" sz="quarter" idx="1"/>
           </p:nvPr>
@@ -1031,7 +1068,6 @@
             </a:lvl1pPr>
           </a:lstStyle>
           <a:p>
-            <a:pPr/>
             <a:r>
               <a:t>Click to edit Master text styles</a:t>
             </a:r>
@@ -1041,7 +1077,9 @@
       <p:sp>
         <p:nvSpPr>
           <p:cNvPr id="31" name="Shape 31"/>
-          <p:cNvSpPr/>
+          <p:cNvSpPr>
+            <a:spLocks noGrp="1"/>
+          </p:cNvSpPr>
           <p:nvPr>
             <p:ph type="sldNum" sz="quarter" idx="2"/>
           </p:nvPr>
@@ -1055,8 +1093,10 @@
           <a:bodyPr/>
           <a:lstStyle/>
           <a:p>
-            <a:pPr/>
-            <a:fld id="{86CB4B4D-7CA3-9044-876B-883B54F8677D}" type="slidenum"/>
+            <a:fld id="{86CB4B4D-7CA3-9044-876B-883B54F8677D}" type="slidenum">
+              <a:t>‹#›</a:t>
+            </a:fld>
+            <a:endParaRPr/>
           </a:p>
         </p:txBody>
       </p:sp>
@@ -1065,12 +1105,12 @@
   <p:clrMapOvr>
     <a:masterClrMapping/>
   </p:clrMapOvr>
-  <p:transition xmlns:p14="http://schemas.microsoft.com/office/powerpoint/2010/main" spd="med" advClick="1"/>
+  <p:transition xmlns:p14="http://schemas.microsoft.com/office/powerpoint/2010/main" spd="med"/>
 </p:sldLayout>
 </file>
 
 <file path=ppt/slideLayouts/slideLayout4.xml><?xml version="1.0" encoding="utf-8"?>
-<p:sldLayout xmlns:a="http://schemas.openxmlformats.org/drawingml/2006/main" xmlns:r="http://schemas.openxmlformats.org/officeDocument/2006/relationships" xmlns:p="http://schemas.openxmlformats.org/presentationml/2006/main" type="tx" showMasterSp="1" showMasterPhAnim="1">
+<p:sldLayout xmlns:a="http://schemas.openxmlformats.org/drawingml/2006/main" xmlns:r="http://schemas.openxmlformats.org/officeDocument/2006/relationships" xmlns:p="http://schemas.openxmlformats.org/presentationml/2006/main" type="tx">
   <p:cSld name="Two Content">
     <p:spTree>
       <p:nvGrpSpPr>
@@ -1089,7 +1129,9 @@
       <p:sp>
         <p:nvSpPr>
           <p:cNvPr id="38" name="Shape 38"/>
-          <p:cNvSpPr/>
+          <p:cNvSpPr>
+            <a:spLocks noGrp="1"/>
+          </p:cNvSpPr>
           <p:nvPr>
             <p:ph type="title"/>
           </p:nvPr>
@@ -1103,7 +1145,6 @@
           <a:bodyPr/>
           <a:lstStyle/>
           <a:p>
-            <a:pPr/>
             <a:r>
               <a:t>Click to edit Master title style</a:t>
             </a:r>
@@ -1113,7 +1154,9 @@
       <p:sp>
         <p:nvSpPr>
           <p:cNvPr id="39" name="Shape 39"/>
-          <p:cNvSpPr/>
+          <p:cNvSpPr>
+            <a:spLocks noGrp="1"/>
+          </p:cNvSpPr>
           <p:nvPr>
             <p:ph type="body" sz="half" idx="1"/>
           </p:nvPr>
@@ -1162,7 +1205,6 @@
             </a:lvl5pPr>
           </a:lstStyle>
           <a:p>
-            <a:pPr/>
             <a:r>
               <a:t>Click to edit Master text styles</a:t>
             </a:r>
@@ -1196,7 +1238,9 @@
       <p:sp>
         <p:nvSpPr>
           <p:cNvPr id="40" name="Shape 40"/>
-          <p:cNvSpPr/>
+          <p:cNvSpPr>
+            <a:spLocks noGrp="1"/>
+          </p:cNvSpPr>
           <p:nvPr>
             <p:ph type="sldNum" sz="quarter" idx="2"/>
           </p:nvPr>
@@ -1210,8 +1254,10 @@
           <a:bodyPr/>
           <a:lstStyle/>
           <a:p>
-            <a:pPr/>
-            <a:fld id="{86CB4B4D-7CA3-9044-876B-883B54F8677D}" type="slidenum"/>
+            <a:fld id="{86CB4B4D-7CA3-9044-876B-883B54F8677D}" type="slidenum">
+              <a:t>‹#›</a:t>
+            </a:fld>
+            <a:endParaRPr/>
           </a:p>
         </p:txBody>
       </p:sp>
@@ -1220,12 +1266,12 @@
   <p:clrMapOvr>
     <a:masterClrMapping/>
   </p:clrMapOvr>
-  <p:transition xmlns:p14="http://schemas.microsoft.com/office/powerpoint/2010/main" spd="med" advClick="1"/>
+  <p:transition xmlns:p14="http://schemas.microsoft.com/office/powerpoint/2010/main" spd="med"/>
 </p:sldLayout>
 </file>
 
 <file path=ppt/slideLayouts/slideLayout5.xml><?xml version="1.0" encoding="utf-8"?>
-<p:sldLayout xmlns:a="http://schemas.openxmlformats.org/drawingml/2006/main" xmlns:r="http://schemas.openxmlformats.org/officeDocument/2006/relationships" xmlns:p="http://schemas.openxmlformats.org/presentationml/2006/main" type="tx" showMasterSp="1" showMasterPhAnim="1">
+<p:sldLayout xmlns:a="http://schemas.openxmlformats.org/drawingml/2006/main" xmlns:r="http://schemas.openxmlformats.org/officeDocument/2006/relationships" xmlns:p="http://schemas.openxmlformats.org/presentationml/2006/main" type="tx">
   <p:cSld name="Comparison">
     <p:spTree>
       <p:nvGrpSpPr>
@@ -1244,7 +1290,9 @@
       <p:sp>
         <p:nvSpPr>
           <p:cNvPr id="47" name="Shape 47"/>
-          <p:cNvSpPr/>
+          <p:cNvSpPr>
+            <a:spLocks noGrp="1"/>
+          </p:cNvSpPr>
           <p:nvPr>
             <p:ph type="title"/>
           </p:nvPr>
@@ -1258,7 +1306,6 @@
           <a:bodyPr/>
           <a:lstStyle/>
           <a:p>
-            <a:pPr/>
             <a:r>
               <a:t>Click to edit Master title style</a:t>
             </a:r>
@@ -1268,7 +1315,9 @@
       <p:sp>
         <p:nvSpPr>
           <p:cNvPr id="48" name="Shape 48"/>
-          <p:cNvSpPr/>
+          <p:cNvSpPr>
+            <a:spLocks noGrp="1"/>
+          </p:cNvSpPr>
           <p:nvPr>
             <p:ph type="body" sz="quarter" idx="1"/>
           </p:nvPr>
@@ -1292,11 +1341,10 @@
               <a:buSzTx/>
               <a:buFontTx/>
               <a:buNone/>
-              <a:defRPr b="1" sz="2400"/>
+              <a:defRPr sz="2400" b="1"/>
             </a:lvl1pPr>
           </a:lstStyle>
           <a:p>
-            <a:pPr/>
             <a:r>
               <a:t>Click to edit Master text styles</a:t>
             </a:r>
@@ -1306,7 +1354,9 @@
       <p:sp>
         <p:nvSpPr>
           <p:cNvPr id="49" name="Shape 49"/>
-          <p:cNvSpPr/>
+          <p:cNvSpPr>
+            <a:spLocks noGrp="1"/>
+          </p:cNvSpPr>
           <p:nvPr>
             <p:ph type="body" sz="quarter" idx="13"/>
           </p:nvPr>
@@ -1331,15 +1381,18 @@
               <a:buSzTx/>
               <a:buFontTx/>
               <a:buNone/>
-              <a:defRPr b="1" sz="2400"/>
+              <a:defRPr sz="2400" b="1"/>
             </a:pPr>
+            <a:endParaRPr/>
           </a:p>
         </p:txBody>
       </p:sp>
       <p:sp>
         <p:nvSpPr>
           <p:cNvPr id="50" name="Shape 50"/>
-          <p:cNvSpPr/>
+          <p:cNvSpPr>
+            <a:spLocks noGrp="1"/>
+          </p:cNvSpPr>
           <p:nvPr>
             <p:ph type="sldNum" sz="quarter" idx="2"/>
           </p:nvPr>
@@ -1353,8 +1406,10 @@
           <a:bodyPr/>
           <a:lstStyle/>
           <a:p>
-            <a:pPr/>
-            <a:fld id="{86CB4B4D-7CA3-9044-876B-883B54F8677D}" type="slidenum"/>
+            <a:fld id="{86CB4B4D-7CA3-9044-876B-883B54F8677D}" type="slidenum">
+              <a:t>‹#›</a:t>
+            </a:fld>
+            <a:endParaRPr/>
           </a:p>
         </p:txBody>
       </p:sp>
@@ -1363,12 +1418,12 @@
   <p:clrMapOvr>
     <a:masterClrMapping/>
   </p:clrMapOvr>
-  <p:transition xmlns:p14="http://schemas.microsoft.com/office/powerpoint/2010/main" spd="med" advClick="1"/>
+  <p:transition xmlns:p14="http://schemas.microsoft.com/office/powerpoint/2010/main" spd="med"/>
 </p:sldLayout>
 </file>
 
 <file path=ppt/slideLayouts/slideLayout6.xml><?xml version="1.0" encoding="utf-8"?>
-<p:sldLayout xmlns:a="http://schemas.openxmlformats.org/drawingml/2006/main" xmlns:r="http://schemas.openxmlformats.org/officeDocument/2006/relationships" xmlns:p="http://schemas.openxmlformats.org/presentationml/2006/main" type="tx" showMasterSp="1" showMasterPhAnim="1">
+<p:sldLayout xmlns:a="http://schemas.openxmlformats.org/drawingml/2006/main" xmlns:r="http://schemas.openxmlformats.org/officeDocument/2006/relationships" xmlns:p="http://schemas.openxmlformats.org/presentationml/2006/main" type="tx">
   <p:cSld name="Title Only">
     <p:spTree>
       <p:nvGrpSpPr>
@@ -1387,7 +1442,9 @@
       <p:sp>
         <p:nvSpPr>
           <p:cNvPr id="57" name="Shape 57"/>
-          <p:cNvSpPr/>
+          <p:cNvSpPr>
+            <a:spLocks noGrp="1"/>
+          </p:cNvSpPr>
           <p:nvPr>
             <p:ph type="title"/>
           </p:nvPr>
@@ -1401,7 +1458,6 @@
           <a:bodyPr/>
           <a:lstStyle/>
           <a:p>
-            <a:pPr/>
             <a:r>
               <a:t>Click to edit Master title style</a:t>
             </a:r>
@@ -1411,7 +1467,9 @@
       <p:sp>
         <p:nvSpPr>
           <p:cNvPr id="58" name="Shape 58"/>
-          <p:cNvSpPr/>
+          <p:cNvSpPr>
+            <a:spLocks noGrp="1"/>
+          </p:cNvSpPr>
           <p:nvPr>
             <p:ph type="sldNum" sz="quarter" idx="2"/>
           </p:nvPr>
@@ -1425,8 +1483,10 @@
           <a:bodyPr/>
           <a:lstStyle/>
           <a:p>
-            <a:pPr/>
-            <a:fld id="{86CB4B4D-7CA3-9044-876B-883B54F8677D}" type="slidenum"/>
+            <a:fld id="{86CB4B4D-7CA3-9044-876B-883B54F8677D}" type="slidenum">
+              <a:t>‹#›</a:t>
+            </a:fld>
+            <a:endParaRPr/>
           </a:p>
         </p:txBody>
       </p:sp>
@@ -1435,12 +1495,12 @@
   <p:clrMapOvr>
     <a:masterClrMapping/>
   </p:clrMapOvr>
-  <p:transition xmlns:p14="http://schemas.microsoft.com/office/powerpoint/2010/main" spd="med" advClick="1"/>
+  <p:transition xmlns:p14="http://schemas.microsoft.com/office/powerpoint/2010/main" spd="med"/>
 </p:sldLayout>
 </file>
 
 <file path=ppt/slideLayouts/slideLayout7.xml><?xml version="1.0" encoding="utf-8"?>
-<p:sldLayout xmlns:a="http://schemas.openxmlformats.org/drawingml/2006/main" xmlns:r="http://schemas.openxmlformats.org/officeDocument/2006/relationships" xmlns:p="http://schemas.openxmlformats.org/presentationml/2006/main" type="tx" showMasterSp="1" showMasterPhAnim="1">
+<p:sldLayout xmlns:a="http://schemas.openxmlformats.org/drawingml/2006/main" xmlns:r="http://schemas.openxmlformats.org/officeDocument/2006/relationships" xmlns:p="http://schemas.openxmlformats.org/presentationml/2006/main" type="tx">
   <p:cSld name="Blank">
     <p:spTree>
       <p:nvGrpSpPr>
@@ -1459,7 +1519,9 @@
       <p:sp>
         <p:nvSpPr>
           <p:cNvPr id="65" name="Shape 65"/>
-          <p:cNvSpPr/>
+          <p:cNvSpPr>
+            <a:spLocks noGrp="1"/>
+          </p:cNvSpPr>
           <p:nvPr>
             <p:ph type="sldNum" sz="quarter" idx="2"/>
           </p:nvPr>
@@ -1473,8 +1535,10 @@
           <a:bodyPr/>
           <a:lstStyle/>
           <a:p>
-            <a:pPr/>
-            <a:fld id="{86CB4B4D-7CA3-9044-876B-883B54F8677D}" type="slidenum"/>
+            <a:fld id="{86CB4B4D-7CA3-9044-876B-883B54F8677D}" type="slidenum">
+              <a:t>‹#›</a:t>
+            </a:fld>
+            <a:endParaRPr/>
           </a:p>
         </p:txBody>
       </p:sp>
@@ -1483,12 +1547,12 @@
   <p:clrMapOvr>
     <a:masterClrMapping/>
   </p:clrMapOvr>
-  <p:transition xmlns:p14="http://schemas.microsoft.com/office/powerpoint/2010/main" spd="med" advClick="1"/>
+  <p:transition xmlns:p14="http://schemas.microsoft.com/office/powerpoint/2010/main" spd="med"/>
 </p:sldLayout>
 </file>
 
 <file path=ppt/slideLayouts/slideLayout8.xml><?xml version="1.0" encoding="utf-8"?>
-<p:sldLayout xmlns:a="http://schemas.openxmlformats.org/drawingml/2006/main" xmlns:r="http://schemas.openxmlformats.org/officeDocument/2006/relationships" xmlns:p="http://schemas.openxmlformats.org/presentationml/2006/main" type="tx" showMasterSp="1" showMasterPhAnim="1">
+<p:sldLayout xmlns:a="http://schemas.openxmlformats.org/drawingml/2006/main" xmlns:r="http://schemas.openxmlformats.org/officeDocument/2006/relationships" xmlns:p="http://schemas.openxmlformats.org/presentationml/2006/main" type="tx">
   <p:cSld name="Content with Caption">
     <p:spTree>
       <p:nvGrpSpPr>
@@ -1507,7 +1571,9 @@
       <p:sp>
         <p:nvSpPr>
           <p:cNvPr id="72" name="Shape 72"/>
-          <p:cNvSpPr/>
+          <p:cNvSpPr>
+            <a:spLocks noGrp="1"/>
+          </p:cNvSpPr>
           <p:nvPr>
             <p:ph type="title"/>
           </p:nvPr>
@@ -1525,11 +1591,10 @@
           <a:bodyPr anchor="b"/>
           <a:lstStyle>
             <a:lvl1pPr algn="l">
-              <a:defRPr b="1" sz="2000"/>
+              <a:defRPr sz="2000" b="1"/>
             </a:lvl1pPr>
           </a:lstStyle>
           <a:p>
-            <a:pPr/>
             <a:r>
               <a:t>Click to edit Master title style</a:t>
             </a:r>
@@ -1539,7 +1604,9 @@
       <p:sp>
         <p:nvSpPr>
           <p:cNvPr id="73" name="Shape 73"/>
-          <p:cNvSpPr/>
+          <p:cNvSpPr>
+            <a:spLocks noGrp="1"/>
+          </p:cNvSpPr>
           <p:nvPr>
             <p:ph type="body" idx="1"/>
           </p:nvPr>
@@ -1557,7 +1624,6 @@
           <a:bodyPr/>
           <a:lstStyle/>
           <a:p>
-            <a:pPr/>
             <a:r>
               <a:t>Click to edit Master text styles</a:t>
             </a:r>
@@ -1591,7 +1657,9 @@
       <p:sp>
         <p:nvSpPr>
           <p:cNvPr id="74" name="Shape 74"/>
-          <p:cNvSpPr/>
+          <p:cNvSpPr>
+            <a:spLocks noGrp="1"/>
+          </p:cNvSpPr>
           <p:nvPr>
             <p:ph type="body" sz="half" idx="13"/>
           </p:nvPr>
@@ -1618,13 +1686,16 @@
               <a:buNone/>
               <a:defRPr sz="1400"/>
             </a:pPr>
+            <a:endParaRPr/>
           </a:p>
         </p:txBody>
       </p:sp>
       <p:sp>
         <p:nvSpPr>
           <p:cNvPr id="75" name="Shape 75"/>
-          <p:cNvSpPr/>
+          <p:cNvSpPr>
+            <a:spLocks noGrp="1"/>
+          </p:cNvSpPr>
           <p:nvPr>
             <p:ph type="sldNum" sz="quarter" idx="2"/>
           </p:nvPr>
@@ -1638,8 +1709,10 @@
           <a:bodyPr/>
           <a:lstStyle/>
           <a:p>
-            <a:pPr/>
-            <a:fld id="{86CB4B4D-7CA3-9044-876B-883B54F8677D}" type="slidenum"/>
+            <a:fld id="{86CB4B4D-7CA3-9044-876B-883B54F8677D}" type="slidenum">
+              <a:t>‹#›</a:t>
+            </a:fld>
+            <a:endParaRPr/>
           </a:p>
         </p:txBody>
       </p:sp>
@@ -1648,12 +1721,12 @@
   <p:clrMapOvr>
     <a:masterClrMapping/>
   </p:clrMapOvr>
-  <p:transition xmlns:p14="http://schemas.microsoft.com/office/powerpoint/2010/main" spd="med" advClick="1"/>
+  <p:transition xmlns:p14="http://schemas.microsoft.com/office/powerpoint/2010/main" spd="med"/>
 </p:sldLayout>
 </file>
 
 <file path=ppt/slideLayouts/slideLayout9.xml><?xml version="1.0" encoding="utf-8"?>
-<p:sldLayout xmlns:a="http://schemas.openxmlformats.org/drawingml/2006/main" xmlns:r="http://schemas.openxmlformats.org/officeDocument/2006/relationships" xmlns:p="http://schemas.openxmlformats.org/presentationml/2006/main" type="tx" showMasterSp="1" showMasterPhAnim="1">
+<p:sldLayout xmlns:a="http://schemas.openxmlformats.org/drawingml/2006/main" xmlns:r="http://schemas.openxmlformats.org/officeDocument/2006/relationships" xmlns:p="http://schemas.openxmlformats.org/presentationml/2006/main" type="tx">
   <p:cSld name="Picture with Caption">
     <p:spTree>
       <p:nvGrpSpPr>
@@ -1672,7 +1745,9 @@
       <p:sp>
         <p:nvSpPr>
           <p:cNvPr id="82" name="Shape 82"/>
-          <p:cNvSpPr/>
+          <p:cNvSpPr>
+            <a:spLocks noGrp="1"/>
+          </p:cNvSpPr>
           <p:nvPr>
             <p:ph type="title"/>
           </p:nvPr>
@@ -1690,11 +1765,10 @@
           <a:bodyPr anchor="b"/>
           <a:lstStyle>
             <a:lvl1pPr algn="l">
-              <a:defRPr b="1" sz="2000"/>
+              <a:defRPr sz="2000" b="1"/>
             </a:lvl1pPr>
           </a:lstStyle>
           <a:p>
-            <a:pPr/>
             <a:r>
               <a:t>Click to edit Master title style</a:t>
             </a:r>
@@ -1704,7 +1778,9 @@
       <p:sp>
         <p:nvSpPr>
           <p:cNvPr id="83" name="Shape 83"/>
-          <p:cNvSpPr/>
+          <p:cNvSpPr>
+            <a:spLocks noGrp="1"/>
+          </p:cNvSpPr>
           <p:nvPr>
             <p:ph type="pic" sz="half" idx="13"/>
           </p:nvPr>
@@ -1724,14 +1800,16 @@
           </a:bodyPr>
           <a:lstStyle/>
           <a:p>
-            <a:pPr/>
+            <a:endParaRPr/>
           </a:p>
         </p:txBody>
       </p:sp>
       <p:sp>
         <p:nvSpPr>
           <p:cNvPr id="84" name="Shape 84"/>
-          <p:cNvSpPr/>
+          <p:cNvSpPr>
+            <a:spLocks noGrp="1"/>
+          </p:cNvSpPr>
           <p:nvPr>
             <p:ph type="body" sz="quarter" idx="1"/>
           </p:nvPr>
@@ -1759,7 +1837,6 @@
             </a:lvl1pPr>
           </a:lstStyle>
           <a:p>
-            <a:pPr/>
             <a:r>
               <a:t>Click to edit Master text styles</a:t>
             </a:r>
@@ -1769,7 +1846,9 @@
       <p:sp>
         <p:nvSpPr>
           <p:cNvPr id="85" name="Shape 85"/>
-          <p:cNvSpPr/>
+          <p:cNvSpPr>
+            <a:spLocks noGrp="1"/>
+          </p:cNvSpPr>
           <p:nvPr>
             <p:ph type="sldNum" sz="quarter" idx="2"/>
           </p:nvPr>
@@ -1783,8 +1862,10 @@
           <a:bodyPr/>
           <a:lstStyle/>
           <a:p>
-            <a:pPr/>
-            <a:fld id="{86CB4B4D-7CA3-9044-876B-883B54F8677D}" type="slidenum"/>
+            <a:fld id="{86CB4B4D-7CA3-9044-876B-883B54F8677D}" type="slidenum">
+              <a:t>‹#›</a:t>
+            </a:fld>
+            <a:endParaRPr/>
           </a:p>
         </p:txBody>
       </p:sp>
@@ -1793,7 +1874,7 @@
   <p:clrMapOvr>
     <a:masterClrMapping/>
   </p:clrMapOvr>
-  <p:transition xmlns:p14="http://schemas.microsoft.com/office/powerpoint/2010/main" spd="med" advClick="1"/>
+  <p:transition xmlns:p14="http://schemas.microsoft.com/office/powerpoint/2010/main" spd="med"/>
 </p:sldLayout>
 </file>
 
@@ -1805,6 +1886,7 @@
         <a:solidFill>
           <a:srgbClr val="FFFFFF"/>
         </a:solidFill>
+        <a:effectLst/>
       </p:bgPr>
     </p:bg>
     <p:spTree>
@@ -1824,7 +1906,9 @@
       <p:sp>
         <p:nvSpPr>
           <p:cNvPr id="2" name="Shape 2"/>
-          <p:cNvSpPr/>
+          <p:cNvSpPr>
+            <a:spLocks noGrp="1"/>
+          </p:cNvSpPr>
           <p:nvPr>
             <p:ph type="title"/>
           </p:nvPr>
@@ -1848,11 +1932,10 @@
         </p:spPr>
         <p:txBody>
           <a:bodyPr lIns="45719" rIns="45719" anchor="ctr">
-            <a:normAutofit fontScale="100000" lnSpcReduction="0"/>
+            <a:normAutofit/>
           </a:bodyPr>
           <a:lstStyle/>
           <a:p>
-            <a:pPr/>
             <a:r>
               <a:t>Click to edit Master title style</a:t>
             </a:r>
@@ -1862,7 +1945,9 @@
       <p:sp>
         <p:nvSpPr>
           <p:cNvPr id="3" name="Shape 3"/>
-          <p:cNvSpPr/>
+          <p:cNvSpPr>
+            <a:spLocks noGrp="1"/>
+          </p:cNvSpPr>
           <p:nvPr>
             <p:ph type="body" idx="1"/>
           </p:nvPr>
@@ -1886,11 +1971,10 @@
         </p:spPr>
         <p:txBody>
           <a:bodyPr lIns="45719" rIns="45719">
-            <a:normAutofit fontScale="100000" lnSpcReduction="0"/>
+            <a:normAutofit/>
           </a:bodyPr>
           <a:lstStyle/>
           <a:p>
-            <a:pPr/>
             <a:r>
               <a:t>Click to edit Master text styles</a:t>
             </a:r>
@@ -1924,7 +2008,9 @@
       <p:sp>
         <p:nvSpPr>
           <p:cNvPr id="4" name="Shape 4"/>
-          <p:cNvSpPr/>
+          <p:cNvSpPr>
+            <a:spLocks noGrp="1"/>
+          </p:cNvSpPr>
           <p:nvPr>
             <p:ph type="sldNum" sz="quarter" idx="2"/>
           </p:nvPr>
@@ -1955,8 +2041,10 @@
             </a:lvl1pPr>
           </a:lstStyle>
           <a:p>
-            <a:pPr/>
-            <a:fld id="{86CB4B4D-7CA3-9044-876B-883B54F8677D}" type="slidenum"/>
+            <a:fld id="{86CB4B4D-7CA3-9044-876B-883B54F8677D}" type="slidenum">
+              <a:t>‹#›</a:t>
+            </a:fld>
+            <a:endParaRPr/>
           </a:p>
         </p:txBody>
       </p:sp>
@@ -1964,19 +2052,19 @@
   </p:cSld>
   <p:clrMap bg1="lt1" tx1="dk1" bg2="lt2" tx2="dk2" accent1="accent1" accent2="accent2" accent3="accent3" accent4="accent4" accent5="accent5" accent6="accent6" hlink="hlink" folHlink="folHlink"/>
   <p:sldLayoutIdLst>
-    <p:sldLayoutId id="2147483649" r:id="rId2"/>
-    <p:sldLayoutId id="2147483650" r:id="rId3"/>
-    <p:sldLayoutId id="2147483651" r:id="rId4"/>
-    <p:sldLayoutId id="2147483652" r:id="rId5"/>
-    <p:sldLayoutId id="2147483653" r:id="rId6"/>
-    <p:sldLayoutId id="2147483654" r:id="rId7"/>
-    <p:sldLayoutId id="2147483655" r:id="rId8"/>
-    <p:sldLayoutId id="2147483656" r:id="rId9"/>
-    <p:sldLayoutId id="2147483657" r:id="rId10"/>
-    <p:sldLayoutId id="2147483658" r:id="rId11"/>
-    <p:sldLayoutId id="2147483659" r:id="rId12"/>
+    <p:sldLayoutId id="2147483649" r:id="rId1"/>
+    <p:sldLayoutId id="2147483650" r:id="rId2"/>
+    <p:sldLayoutId id="2147483651" r:id="rId3"/>
+    <p:sldLayoutId id="2147483652" r:id="rId4"/>
+    <p:sldLayoutId id="2147483653" r:id="rId5"/>
+    <p:sldLayoutId id="2147483654" r:id="rId6"/>
+    <p:sldLayoutId id="2147483655" r:id="rId7"/>
+    <p:sldLayoutId id="2147483656" r:id="rId8"/>
+    <p:sldLayoutId id="2147483657" r:id="rId9"/>
+    <p:sldLayoutId id="2147483658" r:id="rId10"/>
+    <p:sldLayoutId id="2147483659" r:id="rId11"/>
   </p:sldLayoutIdLst>
-  <p:transition xmlns:p14="http://schemas.microsoft.com/office/powerpoint/2010/main" spd="med" advClick="1"/>
+  <p:transition xmlns:p14="http://schemas.microsoft.com/office/powerpoint/2010/main" spd="med"/>
   <p:txStyles>
     <p:titleStyle>
       <a:lvl1pPr marL="0" marR="0" indent="0" algn="ctr" defTabSz="457200" rtl="0" latinLnBrk="0">
@@ -1994,7 +2082,7 @@
         <a:buFontTx/>
         <a:buNone/>
         <a:tabLst/>
-        <a:defRPr b="0" baseline="0" cap="none" i="0" spc="0" strike="noStrike" sz="4400" u="none">
+        <a:defRPr sz="4400" b="0" i="0" u="none" strike="noStrike" cap="none" spc="0" baseline="0">
           <a:ln>
             <a:noFill/>
           </a:ln>
@@ -2023,7 +2111,7 @@
         <a:buFontTx/>
         <a:buNone/>
         <a:tabLst/>
-        <a:defRPr b="0" baseline="0" cap="none" i="0" spc="0" strike="noStrike" sz="4400" u="none">
+        <a:defRPr sz="4400" b="0" i="0" u="none" strike="noStrike" cap="none" spc="0" baseline="0">
           <a:ln>
             <a:noFill/>
           </a:ln>
@@ -2052,7 +2140,7 @@
         <a:buFontTx/>
         <a:buNone/>
         <a:tabLst/>
-        <a:defRPr b="0" baseline="0" cap="none" i="0" spc="0" strike="noStrike" sz="4400" u="none">
+        <a:defRPr sz="4400" b="0" i="0" u="none" strike="noStrike" cap="none" spc="0" baseline="0">
           <a:ln>
             <a:noFill/>
           </a:ln>
@@ -2081,7 +2169,7 @@
         <a:buFontTx/>
         <a:buNone/>
         <a:tabLst/>
-        <a:defRPr b="0" baseline="0" cap="none" i="0" spc="0" strike="noStrike" sz="4400" u="none">
+        <a:defRPr sz="4400" b="0" i="0" u="none" strike="noStrike" cap="none" spc="0" baseline="0">
           <a:ln>
             <a:noFill/>
           </a:ln>
@@ -2110,7 +2198,7 @@
         <a:buFontTx/>
         <a:buNone/>
         <a:tabLst/>
-        <a:defRPr b="0" baseline="0" cap="none" i="0" spc="0" strike="noStrike" sz="4400" u="none">
+        <a:defRPr sz="4400" b="0" i="0" u="none" strike="noStrike" cap="none" spc="0" baseline="0">
           <a:ln>
             <a:noFill/>
           </a:ln>
@@ -2139,7 +2227,7 @@
         <a:buFontTx/>
         <a:buNone/>
         <a:tabLst/>
-        <a:defRPr b="0" baseline="0" cap="none" i="0" spc="0" strike="noStrike" sz="4400" u="none">
+        <a:defRPr sz="4400" b="0" i="0" u="none" strike="noStrike" cap="none" spc="0" baseline="0">
           <a:ln>
             <a:noFill/>
           </a:ln>
@@ -2168,7 +2256,7 @@
         <a:buFontTx/>
         <a:buNone/>
         <a:tabLst/>
-        <a:defRPr b="0" baseline="0" cap="none" i="0" spc="0" strike="noStrike" sz="4400" u="none">
+        <a:defRPr sz="4400" b="0" i="0" u="none" strike="noStrike" cap="none" spc="0" baseline="0">
           <a:ln>
             <a:noFill/>
           </a:ln>
@@ -2197,7 +2285,7 @@
         <a:buFontTx/>
         <a:buNone/>
         <a:tabLst/>
-        <a:defRPr b="0" baseline="0" cap="none" i="0" spc="0" strike="noStrike" sz="4400" u="none">
+        <a:defRPr sz="4400" b="0" i="0" u="none" strike="noStrike" cap="none" spc="0" baseline="0">
           <a:ln>
             <a:noFill/>
           </a:ln>
@@ -2226,7 +2314,7 @@
         <a:buFontTx/>
         <a:buNone/>
         <a:tabLst/>
-        <a:defRPr b="0" baseline="0" cap="none" i="0" spc="0" strike="noStrike" sz="4400" u="none">
+        <a:defRPr sz="4400" b="0" i="0" u="none" strike="noStrike" cap="none" spc="0" baseline="0">
           <a:ln>
             <a:noFill/>
           </a:ln>
@@ -2257,7 +2345,7 @@
         <a:buFont typeface="Arial"/>
         <a:buChar char="•"/>
         <a:tabLst/>
-        <a:defRPr b="0" baseline="0" cap="none" i="0" spc="0" strike="noStrike" sz="3200" u="none">
+        <a:defRPr sz="3200" b="0" i="0" u="none" strike="noStrike" cap="none" spc="0" baseline="0">
           <a:ln>
             <a:noFill/>
           </a:ln>
@@ -2286,7 +2374,7 @@
         <a:buFont typeface="Arial"/>
         <a:buChar char="–"/>
         <a:tabLst/>
-        <a:defRPr b="0" baseline="0" cap="none" i="0" spc="0" strike="noStrike" sz="3200" u="none">
+        <a:defRPr sz="3200" b="0" i="0" u="none" strike="noStrike" cap="none" spc="0" baseline="0">
           <a:ln>
             <a:noFill/>
           </a:ln>
@@ -2315,7 +2403,7 @@
         <a:buFont typeface="Arial"/>
         <a:buChar char="•"/>
         <a:tabLst/>
-        <a:defRPr b="0" baseline="0" cap="none" i="0" spc="0" strike="noStrike" sz="3200" u="none">
+        <a:defRPr sz="3200" b="0" i="0" u="none" strike="noStrike" cap="none" spc="0" baseline="0">
           <a:ln>
             <a:noFill/>
           </a:ln>
@@ -2344,7 +2432,7 @@
         <a:buFont typeface="Arial"/>
         <a:buChar char="–"/>
         <a:tabLst/>
-        <a:defRPr b="0" baseline="0" cap="none" i="0" spc="0" strike="noStrike" sz="3200" u="none">
+        <a:defRPr sz="3200" b="0" i="0" u="none" strike="noStrike" cap="none" spc="0" baseline="0">
           <a:ln>
             <a:noFill/>
           </a:ln>
@@ -2373,7 +2461,7 @@
         <a:buFont typeface="Arial"/>
         <a:buChar char="»"/>
         <a:tabLst/>
-        <a:defRPr b="0" baseline="0" cap="none" i="0" spc="0" strike="noStrike" sz="3200" u="none">
+        <a:defRPr sz="3200" b="0" i="0" u="none" strike="noStrike" cap="none" spc="0" baseline="0">
           <a:ln>
             <a:noFill/>
           </a:ln>
@@ -2402,7 +2490,7 @@
         <a:buFont typeface="Arial"/>
         <a:buChar char="•"/>
         <a:tabLst/>
-        <a:defRPr b="0" baseline="0" cap="none" i="0" spc="0" strike="noStrike" sz="3200" u="none">
+        <a:defRPr sz="3200" b="0" i="0" u="none" strike="noStrike" cap="none" spc="0" baseline="0">
           <a:ln>
             <a:noFill/>
           </a:ln>
@@ -2431,7 +2519,7 @@
         <a:buFont typeface="Arial"/>
         <a:buChar char="•"/>
         <a:tabLst/>
-        <a:defRPr b="0" baseline="0" cap="none" i="0" spc="0" strike="noStrike" sz="3200" u="none">
+        <a:defRPr sz="3200" b="0" i="0" u="none" strike="noStrike" cap="none" spc="0" baseline="0">
           <a:ln>
             <a:noFill/>
           </a:ln>
@@ -2460,7 +2548,7 @@
         <a:buFont typeface="Arial"/>
         <a:buChar char="•"/>
         <a:tabLst/>
-        <a:defRPr b="0" baseline="0" cap="none" i="0" spc="0" strike="noStrike" sz="3200" u="none">
+        <a:defRPr sz="3200" b="0" i="0" u="none" strike="noStrike" cap="none" spc="0" baseline="0">
           <a:ln>
             <a:noFill/>
           </a:ln>
@@ -2489,7 +2577,7 @@
         <a:buFont typeface="Arial"/>
         <a:buChar char="•"/>
         <a:tabLst/>
-        <a:defRPr b="0" baseline="0" cap="none" i="0" spc="0" strike="noStrike" sz="3200" u="none">
+        <a:defRPr sz="3200" b="0" i="0" u="none" strike="noStrike" cap="none" spc="0" baseline="0">
           <a:ln>
             <a:noFill/>
           </a:ln>
@@ -2520,7 +2608,7 @@
         <a:buFontTx/>
         <a:buNone/>
         <a:tabLst/>
-        <a:defRPr b="0" baseline="0" cap="none" i="0" spc="0" strike="noStrike" sz="1200" u="none">
+        <a:defRPr sz="1200" b="0" i="0" u="none" strike="noStrike" cap="none" spc="0" baseline="0">
           <a:ln>
             <a:noFill/>
           </a:ln>
@@ -2549,7 +2637,7 @@
         <a:buFontTx/>
         <a:buNone/>
         <a:tabLst/>
-        <a:defRPr b="0" baseline="0" cap="none" i="0" spc="0" strike="noStrike" sz="1200" u="none">
+        <a:defRPr sz="1200" b="0" i="0" u="none" strike="noStrike" cap="none" spc="0" baseline="0">
           <a:ln>
             <a:noFill/>
           </a:ln>
@@ -2578,7 +2666,7 @@
         <a:buFontTx/>
         <a:buNone/>
         <a:tabLst/>
-        <a:defRPr b="0" baseline="0" cap="none" i="0" spc="0" strike="noStrike" sz="1200" u="none">
+        <a:defRPr sz="1200" b="0" i="0" u="none" strike="noStrike" cap="none" spc="0" baseline="0">
           <a:ln>
             <a:noFill/>
           </a:ln>
@@ -2607,7 +2695,7 @@
         <a:buFontTx/>
         <a:buNone/>
         <a:tabLst/>
-        <a:defRPr b="0" baseline="0" cap="none" i="0" spc="0" strike="noStrike" sz="1200" u="none">
+        <a:defRPr sz="1200" b="0" i="0" u="none" strike="noStrike" cap="none" spc="0" baseline="0">
           <a:ln>
             <a:noFill/>
           </a:ln>
@@ -2636,7 +2724,7 @@
         <a:buFontTx/>
         <a:buNone/>
         <a:tabLst/>
-        <a:defRPr b="0" baseline="0" cap="none" i="0" spc="0" strike="noStrike" sz="1200" u="none">
+        <a:defRPr sz="1200" b="0" i="0" u="none" strike="noStrike" cap="none" spc="0" baseline="0">
           <a:ln>
             <a:noFill/>
           </a:ln>
@@ -2665,7 +2753,7 @@
         <a:buFontTx/>
         <a:buNone/>
         <a:tabLst/>
-        <a:defRPr b="0" baseline="0" cap="none" i="0" spc="0" strike="noStrike" sz="1200" u="none">
+        <a:defRPr sz="1200" b="0" i="0" u="none" strike="noStrike" cap="none" spc="0" baseline="0">
           <a:ln>
             <a:noFill/>
           </a:ln>
@@ -2694,7 +2782,7 @@
         <a:buFontTx/>
         <a:buNone/>
         <a:tabLst/>
-        <a:defRPr b="0" baseline="0" cap="none" i="0" spc="0" strike="noStrike" sz="1200" u="none">
+        <a:defRPr sz="1200" b="0" i="0" u="none" strike="noStrike" cap="none" spc="0" baseline="0">
           <a:ln>
             <a:noFill/>
           </a:ln>
@@ -2723,7 +2811,7 @@
         <a:buFontTx/>
         <a:buNone/>
         <a:tabLst/>
-        <a:defRPr b="0" baseline="0" cap="none" i="0" spc="0" strike="noStrike" sz="1200" u="none">
+        <a:defRPr sz="1200" b="0" i="0" u="none" strike="noStrike" cap="none" spc="0" baseline="0">
           <a:ln>
             <a:noFill/>
           </a:ln>
@@ -2752,7 +2840,7 @@
         <a:buFontTx/>
         <a:buNone/>
         <a:tabLst/>
-        <a:defRPr b="0" baseline="0" cap="none" i="0" spc="0" strike="noStrike" sz="1200" u="none">
+        <a:defRPr sz="1200" b="0" i="0" u="none" strike="noStrike" cap="none" spc="0" baseline="0">
           <a:ln>
             <a:noFill/>
           </a:ln>
@@ -2772,7 +2860,7 @@
 </file>
 
 <file path=ppt/slides/slide1.xml><?xml version="1.0" encoding="utf-8"?>
-<p:sld xmlns:a="http://schemas.openxmlformats.org/drawingml/2006/main" xmlns:r="http://schemas.openxmlformats.org/officeDocument/2006/relationships" xmlns:p="http://schemas.openxmlformats.org/presentationml/2006/main" showMasterSp="1" showMasterPhAnim="1">
+<p:sld xmlns:a="http://schemas.openxmlformats.org/drawingml/2006/main" xmlns:r="http://schemas.openxmlformats.org/officeDocument/2006/relationships" xmlns:p="http://schemas.openxmlformats.org/presentationml/2006/main">
   <p:cSld>
     <p:spTree>
       <p:nvGrpSpPr>
@@ -2825,7 +2913,7 @@
             </a:solidFill>
           </a:ln>
           <a:effectLst>
-            <a:outerShdw sx="100000" sy="100000" kx="0" ky="0" algn="b" rotWithShape="0" blurRad="38100" dist="23000" dir="5400000">
+            <a:outerShdw blurRad="38100" dist="23000" dir="5400000" rotWithShape="0">
               <a:srgbClr val="000000">
                 <a:alpha val="35000"/>
               </a:srgbClr>
@@ -2843,6 +2931,11 @@
                 </a:solidFill>
               </a:defRPr>
             </a:pPr>
+            <a:r>
+              <a:rPr lang="en-US" dirty="0" smtClean="0"/>
+              <a:t>Subject</a:t>
+            </a:r>
+            <a:endParaRPr dirty="0"/>
           </a:p>
         </p:txBody>
       </p:sp>
@@ -2854,7 +2947,7 @@
         </p:nvSpPr>
         <p:spPr>
           <a:xfrm>
-            <a:off x="5983995" y="3307774"/>
+            <a:off x="6908930" y="3307774"/>
             <a:ext cx="1463300" cy="1330506"/>
           </a:xfrm>
           <a:prstGeom prst="roundRect">
@@ -2883,7 +2976,7 @@
             </a:solidFill>
           </a:ln>
           <a:effectLst>
-            <a:outerShdw sx="100000" sy="100000" kx="0" ky="0" algn="b" rotWithShape="0" blurRad="38100" dist="23000" dir="5400000">
+            <a:outerShdw blurRad="38100" dist="23000" dir="5400000" rotWithShape="0">
               <a:srgbClr val="000000">
                 <a:alpha val="35000"/>
               </a:srgbClr>
@@ -2901,6 +2994,7 @@
                 </a:solidFill>
               </a:defRPr>
             </a:pPr>
+            <a:endParaRPr/>
           </a:p>
         </p:txBody>
       </p:sp>
@@ -2912,8 +3006,8 @@
         </p:nvSpPr>
         <p:spPr>
           <a:xfrm>
-            <a:off x="313107" y="3236235"/>
-            <a:ext cx="967076" cy="944143"/>
+            <a:off x="4800420" y="4647492"/>
+            <a:ext cx="967076" cy="421004"/>
           </a:xfrm>
           <a:prstGeom prst="roundRect">
             <a:avLst>
@@ -2941,7 +3035,7 @@
             </a:solidFill>
           </a:ln>
           <a:effectLst>
-            <a:outerShdw sx="100000" sy="100000" kx="0" ky="0" algn="b" rotWithShape="0" blurRad="38100" dist="23000" dir="5400000">
+            <a:outerShdw blurRad="38100" dist="23000" dir="5400000" rotWithShape="0">
               <a:srgbClr val="000000">
                 <a:alpha val="35000"/>
               </a:srgbClr>
@@ -2959,83 +3053,14 @@
                 </a:solidFill>
               </a:defRPr>
             </a:pPr>
+            <a:r>
+              <a:rPr lang="en-US" dirty="0" smtClean="0"/>
+              <a:t>Agent</a:t>
+            </a:r>
+            <a:endParaRPr dirty="0"/>
           </a:p>
         </p:txBody>
       </p:sp>
-      <p:sp>
-        <p:nvSpPr>
-          <p:cNvPr id="115" name="Shape 115"/>
-          <p:cNvSpPr/>
-          <p:nvPr/>
-        </p:nvSpPr>
-        <p:spPr>
-          <a:xfrm>
-            <a:off x="515205" y="3543691"/>
-            <a:ext cx="562879" cy="294641"/>
-          </a:xfrm>
-          <a:prstGeom prst="rect">
-            <a:avLst/>
-          </a:prstGeom>
-          <a:ln w="12700">
-            <a:miter lim="400000"/>
-          </a:ln>
-          <a:extLst>
-            <a:ext uri="{C572A759-6A51-4108-AA02-DFA0A04FC94B}">
-              <ma14:wrappingTextBoxFlag xmlns:ma14="http://schemas.microsoft.com/office/mac/drawingml/2011/main" val="1"/>
-            </a:ext>
-          </a:extLst>
-        </p:spPr>
-        <p:txBody>
-          <a:bodyPr wrap="none" lIns="45719" rIns="45719">
-            <a:spAutoFit/>
-          </a:bodyPr>
-          <a:lstStyle>
-            <a:lvl1pPr algn="ctr">
-              <a:defRPr sz="1400"/>
-            </a:lvl1pPr>
-          </a:lstStyle>
-          <a:p>
-            <a:pPr/>
-            <a:r>
-              <a:t>Agent</a:t>
-            </a:r>
-          </a:p>
-        </p:txBody>
-      </p:sp>
-      <p:cxnSp>
-        <p:nvCxnSpPr>
-          <p:cNvPr id="116" name="Connector 116"/>
-          <p:cNvCxnSpPr>
-            <a:stCxn id="113" idx="0"/>
-            <a:endCxn id="114" idx="0"/>
-          </p:cNvCxnSpPr>
-          <p:nvPr/>
-        </p:nvCxnSpPr>
-        <p:spPr>
-          <a:xfrm flipV="1" rot="16200000">
-            <a:off x="3625850" y="882650"/>
-            <a:ext cx="266700" cy="5918200"/>
-          </a:xfrm>
-          <a:prstGeom prst="bentConnector3">
-            <a:avLst>
-              <a:gd name="adj1" fmla="val 447619"/>
-            </a:avLst>
-          </a:prstGeom>
-          <a:ln w="25400">
-            <a:solidFill>
-              <a:schemeClr val="accent1"/>
-            </a:solidFill>
-            <a:tailEnd type="triangle"/>
-          </a:ln>
-          <a:effectLst>
-            <a:outerShdw sx="100000" sy="100000" kx="0" ky="0" algn="b" rotWithShape="0" blurRad="38100" dist="20000" dir="5400000">
-              <a:srgbClr val="000000">
-                <a:alpha val="38000"/>
-              </a:srgbClr>
-            </a:outerShdw>
-          </a:effectLst>
-        </p:spPr>
-      </p:cxnSp>
       <p:sp>
         <p:nvSpPr>
           <p:cNvPr id="117" name="Shape 117"/>
@@ -3044,7 +3069,7 @@
         </p:nvSpPr>
         <p:spPr>
           <a:xfrm>
-            <a:off x="1308161" y="2536679"/>
+            <a:off x="5741081" y="4802827"/>
             <a:ext cx="1679785" cy="269241"/>
           </a:xfrm>
           <a:prstGeom prst="rect">
@@ -3069,122 +3094,10 @@
             </a:lvl1pPr>
           </a:lstStyle>
           <a:p>
-            <a:pPr/>
-            <a:r>
+            <a:r>
+              <a:rPr dirty="0"/>
               <a:t>Edge*HasLocalPrincipal</a:t>
             </a:r>
-          </a:p>
-        </p:txBody>
-      </p:sp>
-      <p:sp>
-        <p:nvSpPr>
-          <p:cNvPr id="118" name="Shape 118"/>
-          <p:cNvSpPr/>
-          <p:nvPr/>
-        </p:nvSpPr>
-        <p:spPr>
-          <a:xfrm>
-            <a:off x="1444173" y="3398151"/>
-            <a:ext cx="1420991" cy="396241"/>
-          </a:xfrm>
-          <a:prstGeom prst="rect">
-            <a:avLst/>
-          </a:prstGeom>
-          <a:ln w="12700">
-            <a:miter lim="400000"/>
-          </a:ln>
-          <a:extLst>
-            <a:ext uri="{C572A759-6A51-4108-AA02-DFA0A04FC94B}">
-              <ma14:wrappingTextBoxFlag xmlns:ma14="http://schemas.microsoft.com/office/mac/drawingml/2011/main" val="1"/>
-            </a:ext>
-          </a:extLst>
-        </p:spPr>
-        <p:txBody>
-          <a:bodyPr wrap="none" lIns="45719" rIns="45719">
-            <a:spAutoFit/>
-          </a:bodyPr>
-          <a:lstStyle>
-            <a:lvl1pPr>
-              <a:defRPr sz="1100"/>
-            </a:lvl1pPr>
-          </a:lstStyle>
-          <a:p>
-            <a:pPr/>
-            <a:r>
-              <a:t>prov:wasInformedBy</a:t>
-            </a:r>
-          </a:p>
-        </p:txBody>
-      </p:sp>
-      <p:sp>
-        <p:nvSpPr>
-          <p:cNvPr id="119" name="Shape 119"/>
-          <p:cNvSpPr/>
-          <p:nvPr/>
-        </p:nvSpPr>
-        <p:spPr>
-          <a:xfrm flipH="1" flipV="1" rot="5400000">
-            <a:off x="6748841" y="3939830"/>
-            <a:ext cx="893854" cy="960246"/>
-          </a:xfrm>
-          <a:custGeom>
-            <a:avLst/>
-            <a:gdLst/>
-            <a:ahLst/>
-            <a:cxnLst>
-              <a:cxn ang="0">
-                <a:pos x="wd2" y="hd2"/>
-              </a:cxn>
-              <a:cxn ang="5400000">
-                <a:pos x="wd2" y="hd2"/>
-              </a:cxn>
-              <a:cxn ang="10800000">
-                <a:pos x="wd2" y="hd2"/>
-              </a:cxn>
-              <a:cxn ang="16200000">
-                <a:pos x="wd2" y="hd2"/>
-              </a:cxn>
-            </a:cxnLst>
-            <a:rect l="0" t="0" r="r" b="b"/>
-            <a:pathLst>
-              <a:path w="21600" h="21600" fill="norm" stroke="1" extrusionOk="0">
-                <a:moveTo>
-                  <a:pt x="5524" y="0"/>
-                </a:moveTo>
-                <a:lnTo>
-                  <a:pt x="0" y="0"/>
-                </a:lnTo>
-                <a:lnTo>
-                  <a:pt x="0" y="21600"/>
-                </a:lnTo>
-                <a:lnTo>
-                  <a:pt x="21600" y="21600"/>
-                </a:lnTo>
-                <a:lnTo>
-                  <a:pt x="21600" y="16458"/>
-                </a:lnTo>
-              </a:path>
-            </a:pathLst>
-          </a:custGeom>
-          <a:ln w="25400">
-            <a:solidFill>
-              <a:schemeClr val="accent1"/>
-            </a:solidFill>
-            <a:tailEnd type="triangle"/>
-          </a:ln>
-          <a:effectLst>
-            <a:outerShdw sx="100000" sy="100000" kx="0" ky="0" algn="b" rotWithShape="0" blurRad="38100" dist="20000" dir="5400000">
-              <a:srgbClr val="000000">
-                <a:alpha val="38000"/>
-              </a:srgbClr>
-            </a:outerShdw>
-          </a:effectLst>
-        </p:spPr>
-        <p:txBody>
-          <a:bodyPr lIns="45719" rIns="45719" anchor="ctr"/>
-          <a:lstStyle/>
-          <a:p>
-            <a:pPr/>
           </a:p>
         </p:txBody>
       </p:sp>
@@ -3196,8 +3109,8 @@
         </p:nvSpPr>
         <p:spPr>
           <a:xfrm>
-            <a:off x="7150905" y="4822945"/>
-            <a:ext cx="1585279" cy="269241"/>
+            <a:off x="7509188" y="2654274"/>
+            <a:ext cx="1151816" cy="276999"/>
           </a:xfrm>
           <a:prstGeom prst="rect">
             <a:avLst/>
@@ -3221,48 +3134,14 @@
             </a:lvl1pPr>
           </a:lstStyle>
           <a:p>
-            <a:pPr/>
-            <a:r>
-              <a:t>prov:wasDerivedFrom</a:t>
-            </a:r>
+            <a:r>
+              <a:rPr dirty="0" smtClean="0"/>
+              <a:t>wasDerivedFrom</a:t>
+            </a:r>
+            <a:endParaRPr dirty="0"/>
           </a:p>
         </p:txBody>
       </p:sp>
-      <p:cxnSp>
-        <p:nvCxnSpPr>
-          <p:cNvPr id="121" name="Connector 121"/>
-          <p:cNvCxnSpPr>
-            <a:stCxn id="112" idx="0"/>
-            <a:endCxn id="114" idx="0"/>
-          </p:cNvCxnSpPr>
-          <p:nvPr/>
-        </p:nvCxnSpPr>
-        <p:spPr>
-          <a:xfrm flipH="1" flipV="1">
-            <a:off x="800100" y="3708400"/>
-            <a:ext cx="2819400" cy="266700"/>
-          </a:xfrm>
-          <a:prstGeom prst="bentConnector4">
-            <a:avLst>
-              <a:gd name="adj1" fmla="val 50000"/>
-              <a:gd name="adj2" fmla="val 376190"/>
-            </a:avLst>
-          </a:prstGeom>
-          <a:ln w="25400">
-            <a:solidFill>
-              <a:schemeClr val="accent1"/>
-            </a:solidFill>
-            <a:tailEnd type="triangle"/>
-          </a:ln>
-          <a:effectLst>
-            <a:outerShdw sx="100000" sy="100000" kx="0" ky="0" algn="b" rotWithShape="0" blurRad="38100" dist="20000" dir="5400000">
-              <a:srgbClr val="000000">
-                <a:alpha val="38000"/>
-              </a:srgbClr>
-            </a:outerShdw>
-          </a:effectLst>
-        </p:spPr>
-      </p:cxnSp>
       <p:sp>
         <p:nvSpPr>
           <p:cNvPr id="122" name="Shape 122"/>
@@ -3271,8 +3150,8 @@
         </p:nvSpPr>
         <p:spPr>
           <a:xfrm>
-            <a:off x="1167737" y="2959236"/>
-            <a:ext cx="2140185" cy="269241"/>
+            <a:off x="4554333" y="4244885"/>
+            <a:ext cx="1693806" cy="276999"/>
           </a:xfrm>
           <a:prstGeom prst="rect">
             <a:avLst/>
@@ -3296,10 +3175,11 @@
             </a:lvl1pPr>
           </a:lstStyle>
           <a:p>
-            <a:pPr/>
-            <a:r>
-              <a:t>EdgeSubjectHasLocalPrincipal</a:t>
-            </a:r>
+            <a:r>
+              <a:rPr dirty="0" smtClean="0"/>
+              <a:t>EdgeSubjectHasPrincipal</a:t>
+            </a:r>
+            <a:endParaRPr dirty="0"/>
           </a:p>
         </p:txBody>
       </p:sp>
@@ -3311,8 +3191,8 @@
         </p:nvSpPr>
         <p:spPr>
           <a:xfrm>
-            <a:off x="4570967" y="3903379"/>
-            <a:ext cx="1352586" cy="269241"/>
+            <a:off x="4574704" y="3704971"/>
+            <a:ext cx="1341087" cy="276999"/>
           </a:xfrm>
           <a:prstGeom prst="rect">
             <a:avLst/>
@@ -3327,7 +3207,7 @@
           </a:extLst>
         </p:spPr>
         <p:txBody>
-          <a:bodyPr wrap="none" lIns="45719" rIns="45719">
+          <a:bodyPr wrap="square" lIns="45719" rIns="45719">
             <a:spAutoFit/>
           </a:bodyPr>
           <a:lstStyle>
@@ -3336,79 +3216,10 @@
             </a:lvl1pPr>
           </a:lstStyle>
           <a:p>
-            <a:pPr/>
-            <a:r>
+            <a:r>
+              <a:rPr dirty="0"/>
               <a:t>EdgeEventAffects*</a:t>
             </a:r>
-          </a:p>
-        </p:txBody>
-      </p:sp>
-      <p:sp>
-        <p:nvSpPr>
-          <p:cNvPr id="124" name="Shape 124"/>
-          <p:cNvSpPr/>
-          <p:nvPr/>
-        </p:nvSpPr>
-        <p:spPr>
-          <a:xfrm flipH="1">
-            <a:off x="4439229" y="3866561"/>
-            <a:ext cx="1472825" cy="43167"/>
-          </a:xfrm>
-          <a:custGeom>
-            <a:avLst/>
-            <a:gdLst/>
-            <a:ahLst/>
-            <a:cxnLst>
-              <a:cxn ang="0">
-                <a:pos x="wd2" y="hd2"/>
-              </a:cxn>
-              <a:cxn ang="5400000">
-                <a:pos x="wd2" y="hd2"/>
-              </a:cxn>
-              <a:cxn ang="10800000">
-                <a:pos x="wd2" y="hd2"/>
-              </a:cxn>
-              <a:cxn ang="16200000">
-                <a:pos x="wd2" y="hd2"/>
-              </a:cxn>
-            </a:cxnLst>
-            <a:rect l="0" t="0" r="r" b="b"/>
-            <a:pathLst>
-              <a:path w="21600" h="21600" fill="norm" stroke="1" extrusionOk="0">
-                <a:moveTo>
-                  <a:pt x="0" y="0"/>
-                </a:moveTo>
-                <a:lnTo>
-                  <a:pt x="10800" y="0"/>
-                </a:lnTo>
-                <a:lnTo>
-                  <a:pt x="10800" y="21600"/>
-                </a:lnTo>
-                <a:lnTo>
-                  <a:pt x="21600" y="21600"/>
-                </a:lnTo>
-              </a:path>
-            </a:pathLst>
-          </a:custGeom>
-          <a:ln w="25400">
-            <a:solidFill>
-              <a:schemeClr val="accent1"/>
-            </a:solidFill>
-            <a:headEnd type="triangle"/>
-          </a:ln>
-          <a:effectLst>
-            <a:outerShdw sx="100000" sy="100000" kx="0" ky="0" algn="b" rotWithShape="0" blurRad="38100" dist="20000" dir="5400000">
-              <a:srgbClr val="000000">
-                <a:alpha val="38000"/>
-              </a:srgbClr>
-            </a:outerShdw>
-          </a:effectLst>
-        </p:spPr>
-        <p:txBody>
-          <a:bodyPr lIns="45719" rIns="45719" anchor="ctr"/>
-          <a:lstStyle/>
-          <a:p>
-            <a:pPr/>
           </a:p>
         </p:txBody>
       </p:sp>
@@ -3420,7 +3231,7 @@
         </p:nvSpPr>
         <p:spPr>
           <a:xfrm>
-            <a:off x="3880355" y="5309332"/>
+            <a:off x="235777" y="5433586"/>
             <a:ext cx="1177888" cy="482106"/>
           </a:xfrm>
           <a:prstGeom prst="roundRect">
@@ -3449,7 +3260,7 @@
             </a:solidFill>
           </a:ln>
           <a:effectLst>
-            <a:outerShdw sx="100000" sy="100000" kx="0" ky="0" algn="b" rotWithShape="0" blurRad="38100" dist="23000" dir="5400000">
+            <a:outerShdw blurRad="38100" dist="23000" dir="5400000" rotWithShape="0">
               <a:srgbClr val="000000">
                 <a:alpha val="35000"/>
               </a:srgbClr>
@@ -3467,152 +3278,11 @@
                 </a:solidFill>
               </a:defRPr>
             </a:pPr>
-          </a:p>
-        </p:txBody>
-      </p:sp>
-      <p:sp>
-        <p:nvSpPr>
-          <p:cNvPr id="126" name="Shape 126"/>
-          <p:cNvSpPr/>
-          <p:nvPr/>
-        </p:nvSpPr>
-        <p:spPr>
-          <a:xfrm>
-            <a:off x="4049414" y="5360070"/>
-            <a:ext cx="816035" cy="294641"/>
-          </a:xfrm>
-          <a:prstGeom prst="rect">
-            <a:avLst/>
-          </a:prstGeom>
-          <a:ln w="12700">
-            <a:miter lim="400000"/>
-          </a:ln>
-          <a:extLst>
-            <a:ext uri="{C572A759-6A51-4108-AA02-DFA0A04FC94B}">
-              <ma14:wrappingTextBoxFlag xmlns:ma14="http://schemas.microsoft.com/office/mac/drawingml/2011/main" val="1"/>
-            </a:ext>
-          </a:extLst>
-        </p:spPr>
-        <p:txBody>
-          <a:bodyPr wrap="none" lIns="45719" rIns="45719">
-            <a:spAutoFit/>
-          </a:bodyPr>
-          <a:lstStyle>
-            <a:lvl1pPr>
-              <a:defRPr sz="1400"/>
-            </a:lvl1pPr>
-          </a:lstStyle>
-          <a:p>
-            <a:pPr/>
-            <a:r>
+            <a:r>
+              <a:rPr lang="en-US" dirty="0" smtClean="0"/>
               <a:t>Resource</a:t>
             </a:r>
-          </a:p>
-        </p:txBody>
-      </p:sp>
-      <p:sp>
-        <p:nvSpPr>
-          <p:cNvPr id="127" name="Shape 127"/>
-          <p:cNvSpPr/>
-          <p:nvPr/>
-        </p:nvSpPr>
-        <p:spPr>
-          <a:xfrm flipH="1">
-            <a:off x="1560802" y="3717466"/>
-            <a:ext cx="1183531" cy="1"/>
-          </a:xfrm>
-          <a:prstGeom prst="line">
-            <a:avLst/>
-          </a:prstGeom>
-          <a:ln w="25400">
-            <a:solidFill>
-              <a:schemeClr val="accent1"/>
-            </a:solidFill>
-          </a:ln>
-          <a:effectLst>
-            <a:outerShdw sx="100000" sy="100000" kx="0" ky="0" algn="b" rotWithShape="0" blurRad="38100" dist="20000" dir="5400000">
-              <a:srgbClr val="000000">
-                <a:alpha val="38000"/>
-              </a:srgbClr>
-            </a:outerShdw>
-          </a:effectLst>
-        </p:spPr>
-        <p:txBody>
-          <a:bodyPr lIns="45719" rIns="45719"/>
-          <a:lstStyle/>
-          <a:p>
-            <a:pPr/>
-          </a:p>
-        </p:txBody>
-      </p:sp>
-      <p:sp>
-        <p:nvSpPr>
-          <p:cNvPr id="128" name="Shape 128"/>
-          <p:cNvSpPr/>
-          <p:nvPr/>
-        </p:nvSpPr>
-        <p:spPr>
-          <a:xfrm flipH="1">
-            <a:off x="1560802" y="3717466"/>
-            <a:ext cx="3" cy="512871"/>
-          </a:xfrm>
-          <a:prstGeom prst="line">
-            <a:avLst/>
-          </a:prstGeom>
-          <a:ln w="25400">
-            <a:solidFill>
-              <a:schemeClr val="accent1"/>
-            </a:solidFill>
-          </a:ln>
-          <a:effectLst>
-            <a:outerShdw sx="100000" sy="100000" kx="0" ky="0" algn="b" rotWithShape="0" blurRad="38100" dist="20000" dir="5400000">
-              <a:srgbClr val="000000">
-                <a:alpha val="38000"/>
-              </a:srgbClr>
-            </a:outerShdw>
-          </a:effectLst>
-        </p:spPr>
-        <p:txBody>
-          <a:bodyPr lIns="45719" rIns="45719"/>
-          <a:lstStyle/>
-          <a:p>
-            <a:pPr/>
-          </a:p>
-        </p:txBody>
-      </p:sp>
-      <p:sp>
-        <p:nvSpPr>
-          <p:cNvPr id="129" name="Shape 129"/>
-          <p:cNvSpPr/>
-          <p:nvPr/>
-        </p:nvSpPr>
-        <p:spPr>
-          <a:xfrm flipV="1">
-            <a:off x="1563048" y="4211504"/>
-            <a:ext cx="1181283" cy="18834"/>
-          </a:xfrm>
-          <a:prstGeom prst="line">
-            <a:avLst/>
-          </a:prstGeom>
-          <a:ln w="25400">
-            <a:solidFill>
-              <a:schemeClr val="accent1"/>
-            </a:solidFill>
-            <a:tailEnd type="triangle"/>
-          </a:ln>
-          <a:effectLst>
-            <a:outerShdw sx="100000" sy="100000" kx="0" ky="0" algn="b" rotWithShape="0" blurRad="38100" dist="20000" dir="5400000">
-              <a:srgbClr val="000000">
-                <a:alpha val="38000"/>
-              </a:srgbClr>
-            </a:outerShdw>
-          </a:effectLst>
-        </p:spPr>
-        <p:txBody>
-          <a:bodyPr lIns="45719" rIns="45719"/>
-          <a:lstStyle/>
-          <a:p>
-            <a:pPr/>
+            <a:endParaRPr dirty="0"/>
           </a:p>
         </p:txBody>
       </p:sp>
@@ -3620,15 +3290,15 @@
         <p:nvCxnSpPr>
           <p:cNvPr id="130" name="Connector 130"/>
           <p:cNvCxnSpPr>
-            <a:stCxn id="112" idx="0"/>
+            <a:stCxn id="112" idx="2"/>
             <a:endCxn id="125" idx="0"/>
           </p:cNvCxnSpPr>
           <p:nvPr/>
         </p:nvCxnSpPr>
         <p:spPr>
-          <a:xfrm>
-            <a:off x="3621639" y="3973027"/>
-            <a:ext cx="847660" cy="1577359"/>
+          <a:xfrm flipH="1">
+            <a:off x="824721" y="4638282"/>
+            <a:ext cx="2796919" cy="795304"/>
           </a:xfrm>
           <a:prstGeom prst="straightConnector1">
             <a:avLst/>
@@ -3640,7 +3310,7 @@
             <a:tailEnd type="triangle"/>
           </a:ln>
           <a:effectLst>
-            <a:outerShdw sx="100000" sy="100000" kx="0" ky="0" algn="b" rotWithShape="0" blurRad="38100" dist="20000" dir="5400000">
+            <a:outerShdw blurRad="38100" dist="20000" dir="5400000" rotWithShape="0">
               <a:srgbClr val="000000">
                 <a:alpha val="38000"/>
               </a:srgbClr>
@@ -3656,7 +3326,7 @@
         </p:nvSpPr>
         <p:spPr>
           <a:xfrm>
-            <a:off x="3301313" y="4785382"/>
+            <a:off x="1843162" y="4995146"/>
             <a:ext cx="1847487" cy="269241"/>
           </a:xfrm>
           <a:prstGeom prst="rect">
@@ -3681,8 +3351,8 @@
             </a:lvl1pPr>
           </a:lstStyle>
           <a:p>
-            <a:pPr/>
-            <a:r>
+            <a:r>
+              <a:rPr dirty="0"/>
               <a:t>EdgeEventAffectsSrcSink</a:t>
             </a:r>
           </a:p>
@@ -3690,14 +3360,14 @@
       </p:sp>
       <p:sp>
         <p:nvSpPr>
-          <p:cNvPr id="132" name="Shape 132"/>
+          <p:cNvPr id="133" name="Shape 133"/>
           <p:cNvSpPr/>
           <p:nvPr/>
         </p:nvSpPr>
         <p:spPr>
           <a:xfrm>
-            <a:off x="3259654" y="3788323"/>
-            <a:ext cx="706560" cy="294641"/>
+            <a:off x="7025415" y="3359219"/>
+            <a:ext cx="1233669" cy="1169551"/>
           </a:xfrm>
           <a:prstGeom prst="rect">
             <a:avLst/>
@@ -3715,52 +3385,17 @@
           <a:bodyPr wrap="none" lIns="45719" rIns="45719">
             <a:spAutoFit/>
           </a:bodyPr>
-          <a:lstStyle>
-            <a:lvl1pPr algn="ctr">
-              <a:defRPr sz="1400" u="sng"/>
-            </a:lvl1pPr>
-          </a:lstStyle>
-          <a:p>
-            <a:pPr/>
-            <a:r>
-              <a:t>Subject</a:t>
-            </a:r>
-          </a:p>
-        </p:txBody>
-      </p:sp>
-      <p:sp>
-        <p:nvSpPr>
-          <p:cNvPr id="133" name="Shape 133"/>
-          <p:cNvSpPr/>
-          <p:nvPr/>
-        </p:nvSpPr>
-        <p:spPr>
-          <a:xfrm>
-            <a:off x="6043736" y="3388250"/>
-            <a:ext cx="1377130" cy="1107441"/>
-          </a:xfrm>
-          <a:prstGeom prst="rect">
-            <a:avLst/>
-          </a:prstGeom>
-          <a:ln w="12700">
-            <a:miter lim="400000"/>
-          </a:ln>
-          <a:extLst>
-            <a:ext uri="{C572A759-6A51-4108-AA02-DFA0A04FC94B}">
-              <ma14:wrappingTextBoxFlag xmlns:ma14="http://schemas.microsoft.com/office/mac/drawingml/2011/main" val="1"/>
-            </a:ext>
-          </a:extLst>
-        </p:spPr>
-        <p:txBody>
-          <a:bodyPr wrap="none" lIns="45719" rIns="45719">
-            <a:spAutoFit/>
-          </a:bodyPr>
           <a:lstStyle/>
           <a:p>
             <a:pPr algn="ctr">
               <a:defRPr sz="1400" u="sng"/>
             </a:pPr>
             <a:r>
+              <a:rPr dirty="0">
+                <a:solidFill>
+                  <a:schemeClr val="bg1"/>
+                </a:solidFill>
+              </a:rPr>
               <a:t>Entity-File</a:t>
             </a:r>
           </a:p>
@@ -3769,6 +3404,11 @@
               <a:defRPr sz="1400"/>
             </a:pPr>
             <a:r>
+              <a:rPr dirty="0">
+                <a:solidFill>
+                  <a:schemeClr val="bg1"/>
+                </a:solidFill>
+              </a:rPr>
               <a:t>Or</a:t>
             </a:r>
           </a:p>
@@ -3777,6 +3417,11 @@
               <a:defRPr sz="1400" u="sng"/>
             </a:pPr>
             <a:r>
+              <a:rPr dirty="0">
+                <a:solidFill>
+                  <a:schemeClr val="bg1"/>
+                </a:solidFill>
+              </a:rPr>
               <a:t>Entity_NetFlow</a:t>
             </a:r>
           </a:p>
@@ -3785,6 +3430,11 @@
               <a:defRPr sz="1400"/>
             </a:pPr>
             <a:r>
+              <a:rPr dirty="0">
+                <a:solidFill>
+                  <a:schemeClr val="bg1"/>
+                </a:solidFill>
+              </a:rPr>
               <a:t>Or</a:t>
             </a:r>
           </a:p>
@@ -3793,6 +3443,11 @@
               <a:defRPr sz="1400" u="sng"/>
             </a:pPr>
             <a:r>
+              <a:rPr dirty="0">
+                <a:solidFill>
+                  <a:schemeClr val="bg1"/>
+                </a:solidFill>
+              </a:rPr>
               <a:t>Entity_Memory</a:t>
             </a:r>
           </a:p>
@@ -3806,7 +3461,7 @@
         </p:nvSpPr>
         <p:spPr>
           <a:xfrm>
-            <a:off x="2946556" y="6129611"/>
+            <a:off x="4700093" y="5469620"/>
             <a:ext cx="1360915" cy="387209"/>
           </a:xfrm>
           <a:prstGeom prst="roundRect">
@@ -3835,7 +3490,7 @@
             </a:solidFill>
           </a:ln>
           <a:effectLst>
-            <a:outerShdw sx="100000" sy="100000" kx="0" ky="0" algn="b" rotWithShape="0" blurRad="38100" dist="23000" dir="5400000">
+            <a:outerShdw blurRad="38100" dist="23000" dir="5400000" rotWithShape="0">
               <a:srgbClr val="000000">
                 <a:alpha val="35000"/>
               </a:srgbClr>
@@ -3853,46 +3508,11 @@
                 </a:solidFill>
               </a:defRPr>
             </a:pPr>
-          </a:p>
-        </p:txBody>
-      </p:sp>
-      <p:sp>
-        <p:nvSpPr>
-          <p:cNvPr id="135" name="Shape 135"/>
-          <p:cNvSpPr/>
-          <p:nvPr/>
-        </p:nvSpPr>
-        <p:spPr>
-          <a:xfrm>
-            <a:off x="3417634" y="6169326"/>
-            <a:ext cx="458352" cy="294641"/>
-          </a:xfrm>
-          <a:prstGeom prst="rect">
-            <a:avLst/>
-          </a:prstGeom>
-          <a:ln w="12700">
-            <a:miter lim="400000"/>
-          </a:ln>
-          <a:extLst>
-            <a:ext uri="{C572A759-6A51-4108-AA02-DFA0A04FC94B}">
-              <ma14:wrappingTextBoxFlag xmlns:ma14="http://schemas.microsoft.com/office/mac/drawingml/2011/main" val="1"/>
-            </a:ext>
-          </a:extLst>
-        </p:spPr>
-        <p:txBody>
-          <a:bodyPr wrap="none" lIns="45719" rIns="45719">
-            <a:spAutoFit/>
-          </a:bodyPr>
-          <a:lstStyle>
-            <a:lvl1pPr algn="ctr">
-              <a:defRPr sz="1400"/>
-            </a:lvl1pPr>
-          </a:lstStyle>
-          <a:p>
-            <a:pPr/>
-            <a:r>
+            <a:r>
+              <a:rPr lang="en-US" dirty="0" smtClean="0"/>
               <a:t>Host</a:t>
             </a:r>
+            <a:endParaRPr dirty="0"/>
           </a:p>
         </p:txBody>
       </p:sp>
@@ -3900,15 +3520,15 @@
         <p:nvCxnSpPr>
           <p:cNvPr id="136" name="Connector 136"/>
           <p:cNvCxnSpPr>
-            <a:stCxn id="125" idx="0"/>
-            <a:endCxn id="134" idx="0"/>
+            <a:stCxn id="125" idx="3"/>
+            <a:endCxn id="134" idx="1"/>
           </p:cNvCxnSpPr>
           <p:nvPr/>
         </p:nvCxnSpPr>
         <p:spPr>
-          <a:xfrm flipH="1">
-            <a:off x="3627013" y="5550385"/>
-            <a:ext cx="842286" cy="772831"/>
+          <a:xfrm flipV="1">
+            <a:off x="1413665" y="5663225"/>
+            <a:ext cx="3286428" cy="11414"/>
           </a:xfrm>
           <a:prstGeom prst="straightConnector1">
             <a:avLst/>
@@ -3920,7 +3540,7 @@
             <a:tailEnd type="triangle"/>
           </a:ln>
           <a:effectLst>
-            <a:outerShdw sx="100000" sy="100000" kx="0" ky="0" algn="b" rotWithShape="0" blurRad="38100" dist="20000" dir="5400000">
+            <a:outerShdw blurRad="38100" dist="20000" dir="5400000" rotWithShape="0">
               <a:srgbClr val="000000">
                 <a:alpha val="38000"/>
               </a:srgbClr>
@@ -3932,15 +3552,15 @@
         <p:nvCxnSpPr>
           <p:cNvPr id="137" name="Connector 137"/>
           <p:cNvCxnSpPr>
-            <a:stCxn id="113" idx="0"/>
-            <a:endCxn id="134" idx="0"/>
+            <a:stCxn id="113" idx="2"/>
+            <a:endCxn id="134" idx="3"/>
           </p:cNvCxnSpPr>
           <p:nvPr/>
         </p:nvCxnSpPr>
         <p:spPr>
           <a:xfrm rot="5400000">
-            <a:off x="4000500" y="3606800"/>
-            <a:ext cx="2349500" cy="3086100"/>
+            <a:off x="6338322" y="4360966"/>
+            <a:ext cx="1024945" cy="1579572"/>
           </a:xfrm>
           <a:prstGeom prst="bentConnector2">
             <a:avLst/>
@@ -3952,7 +3572,7 @@
             <a:tailEnd type="triangle"/>
           </a:ln>
           <a:effectLst>
-            <a:outerShdw sx="100000" sy="100000" kx="0" ky="0" algn="b" rotWithShape="0" blurRad="38100" dist="20000" dir="5400000">
+            <a:outerShdw blurRad="38100" dist="20000" dir="5400000" rotWithShape="0">
               <a:srgbClr val="000000">
                 <a:alpha val="38000"/>
               </a:srgbClr>
@@ -3968,7 +3588,7 @@
         </p:nvSpPr>
         <p:spPr>
           <a:xfrm>
-            <a:off x="5465439" y="6067426"/>
+            <a:off x="6248139" y="5405398"/>
             <a:ext cx="1172727" cy="269241"/>
           </a:xfrm>
           <a:prstGeom prst="rect">
@@ -3993,8 +3613,8 @@
             </a:lvl1pPr>
           </a:lstStyle>
           <a:p>
-            <a:pPr/>
-            <a:r>
+            <a:r>
+              <a:rPr dirty="0"/>
               <a:t>Edge*ResidesOn</a:t>
             </a:r>
           </a:p>
@@ -4008,7 +3628,7 @@
         </p:nvSpPr>
         <p:spPr>
           <a:xfrm>
-            <a:off x="4031921" y="5790427"/>
+            <a:off x="2162963" y="5656817"/>
             <a:ext cx="1601649" cy="269241"/>
           </a:xfrm>
           <a:prstGeom prst="rect">
@@ -4033,8 +3653,8 @@
             </a:lvl1pPr>
           </a:lstStyle>
           <a:p>
-            <a:pPr/>
-            <a:r>
+            <a:r>
+              <a:rPr dirty="0"/>
               <a:t>EdgeSrcSinkResidesOn</a:t>
             </a:r>
           </a:p>
@@ -4044,15 +3664,15 @@
         <p:nvCxnSpPr>
           <p:cNvPr id="140" name="Connector 140"/>
           <p:cNvCxnSpPr>
-            <a:stCxn id="112" idx="0"/>
-            <a:endCxn id="134" idx="0"/>
+            <a:stCxn id="112" idx="2"/>
+            <a:endCxn id="134" idx="1"/>
           </p:cNvCxnSpPr>
           <p:nvPr/>
         </p:nvCxnSpPr>
         <p:spPr>
           <a:xfrm>
-            <a:off x="3621639" y="3973027"/>
-            <a:ext cx="5375" cy="2350189"/>
+            <a:off x="3621640" y="4638282"/>
+            <a:ext cx="1078453" cy="1024943"/>
           </a:xfrm>
           <a:prstGeom prst="straightConnector1">
             <a:avLst/>
@@ -4064,7 +3684,7 @@
             <a:tailEnd type="triangle"/>
           </a:ln>
           <a:effectLst>
-            <a:outerShdw sx="100000" sy="100000" kx="0" ky="0" algn="b" rotWithShape="0" blurRad="38100" dist="20000" dir="5400000">
+            <a:outerShdw blurRad="38100" dist="20000" dir="5400000" rotWithShape="0">
               <a:srgbClr val="000000">
                 <a:alpha val="38000"/>
               </a:srgbClr>
@@ -4080,7 +3700,7 @@
         </p:nvSpPr>
         <p:spPr>
           <a:xfrm>
-            <a:off x="2371590" y="5196961"/>
+            <a:off x="4329346" y="5164345"/>
             <a:ext cx="1445157" cy="269241"/>
           </a:xfrm>
           <a:prstGeom prst="rect">
@@ -4105,8 +3725,8 @@
             </a:lvl1pPr>
           </a:lstStyle>
           <a:p>
-            <a:pPr/>
-            <a:r>
+            <a:r>
+              <a:rPr dirty="0"/>
               <a:t>EdgeSubjectRunsOn</a:t>
             </a:r>
           </a:p>
@@ -4165,7 +3785,7 @@
               <a:round/>
             </a:ln>
             <a:effectLst>
-              <a:outerShdw sx="100000" sy="100000" kx="0" ky="0" algn="b" rotWithShape="0" blurRad="38100" dist="23000" dir="5400000">
+              <a:outerShdw blurRad="38100" dist="23000" dir="5400000" rotWithShape="0">
                 <a:srgbClr val="000000">
                   <a:alpha val="35000"/>
                 </a:srgbClr>
@@ -4179,6 +3799,7 @@
             <a:lstStyle/>
             <a:p>
               <a:pPr algn="ctr"/>
+              <a:endParaRPr/>
             </a:p>
           </p:txBody>
         </p:sp>
@@ -4216,7 +3837,6 @@
               <a:lvl1pPr algn="ctr"/>
             </a:lstStyle>
             <a:p>
-              <a:pPr/>
               <a:r>
                 <a:t>Pattern</a:t>
               </a:r>
@@ -4277,7 +3897,7 @@
               <a:round/>
             </a:ln>
             <a:effectLst>
-              <a:outerShdw sx="100000" sy="100000" kx="0" ky="0" algn="b" rotWithShape="0" blurRad="38100" dist="23000" dir="5400000">
+              <a:outerShdw blurRad="38100" dist="23000" dir="5400000" rotWithShape="0">
                 <a:srgbClr val="000000">
                   <a:alpha val="35000"/>
                 </a:srgbClr>
@@ -4291,6 +3911,7 @@
             <a:lstStyle/>
             <a:p>
               <a:pPr algn="ctr"/>
+              <a:endParaRPr/>
             </a:p>
           </p:txBody>
         </p:sp>
@@ -4328,7 +3949,6 @@
               <a:lvl1pPr algn="ctr"/>
             </a:lstStyle>
             <a:p>
-              <a:pPr/>
               <a:r>
                 <a:t>Activity</a:t>
               </a:r>
@@ -4389,7 +4009,7 @@
               <a:round/>
             </a:ln>
             <a:effectLst>
-              <a:outerShdw sx="100000" sy="100000" kx="0" ky="0" algn="b" rotWithShape="0" blurRad="38100" dist="23000" dir="5400000">
+              <a:outerShdw blurRad="38100" dist="23000" dir="5400000" rotWithShape="0">
                 <a:srgbClr val="000000">
                   <a:alpha val="35000"/>
                 </a:srgbClr>
@@ -4403,6 +4023,7 @@
             <a:lstStyle/>
             <a:p>
               <a:pPr algn="ctr"/>
+              <a:endParaRPr/>
             </a:p>
           </p:txBody>
         </p:sp>
@@ -4440,7 +4061,6 @@
               <a:lvl1pPr algn="ctr"/>
             </a:lstStyle>
             <a:p>
-              <a:pPr/>
               <a:r>
                 <a:t>APT</a:t>
               </a:r>
@@ -4501,7 +4121,7 @@
               <a:round/>
             </a:ln>
             <a:effectLst>
-              <a:outerShdw sx="100000" sy="100000" kx="0" ky="0" algn="b" rotWithShape="0" blurRad="38100" dist="23000" dir="5400000">
+              <a:outerShdw blurRad="38100" dist="23000" dir="5400000" rotWithShape="0">
                 <a:srgbClr val="000000">
                   <a:alpha val="35000"/>
                 </a:srgbClr>
@@ -4515,6 +4135,7 @@
             <a:lstStyle/>
             <a:p>
               <a:pPr algn="ctr"/>
+              <a:endParaRPr/>
             </a:p>
           </p:txBody>
         </p:sp>
@@ -4552,7 +4173,6 @@
               <a:lvl1pPr algn="ctr"/>
             </a:lstStyle>
             <a:p>
-              <a:pPr/>
               <a:r>
                 <a:t>Phase</a:t>
               </a:r>
@@ -4568,7 +4188,7 @@
         </p:nvGrpSpPr>
         <p:grpSpPr>
           <a:xfrm>
-            <a:off x="785268" y="886536"/>
+            <a:off x="785268" y="527580"/>
             <a:ext cx="1168235" cy="431560"/>
             <a:chOff x="0" y="0"/>
             <a:chExt cx="1168234" cy="431559"/>
@@ -4613,7 +4233,7 @@
               <a:round/>
             </a:ln>
             <a:effectLst>
-              <a:outerShdw sx="100000" sy="100000" kx="0" ky="0" algn="b" rotWithShape="0" blurRad="38100" dist="23000" dir="5400000">
+              <a:outerShdw blurRad="38100" dist="23000" dir="5400000" rotWithShape="0">
                 <a:srgbClr val="000000">
                   <a:alpha val="35000"/>
                 </a:srgbClr>
@@ -4627,6 +4247,7 @@
             <a:lstStyle/>
             <a:p>
               <a:pPr algn="ctr"/>
+              <a:endParaRPr/>
             </a:p>
           </p:txBody>
         </p:sp>
@@ -4664,7 +4285,6 @@
               <a:lvl1pPr algn="ctr"/>
             </a:lstStyle>
             <a:p>
-              <a:pPr/>
               <a:r>
                 <a:t>Segment</a:t>
               </a:r>
@@ -4703,7 +4323,7 @@
             </a:cxnLst>
             <a:rect l="0" t="0" r="r" b="b"/>
             <a:pathLst>
-              <a:path w="21600" h="21600" fill="norm" stroke="1" extrusionOk="0">
+              <a:path w="21600" h="21600" extrusionOk="0">
                 <a:moveTo>
                   <a:pt x="0" y="21600"/>
                 </a:moveTo>
@@ -4722,7 +4342,7 @@
             <a:tailEnd type="triangle"/>
           </a:ln>
           <a:effectLst>
-            <a:outerShdw sx="100000" sy="100000" kx="0" ky="0" algn="b" rotWithShape="0" blurRad="38100" dist="20000" dir="5400000">
+            <a:outerShdw blurRad="38100" dist="20000" dir="5400000" rotWithShape="0">
               <a:srgbClr val="000000">
                 <a:alpha val="38000"/>
               </a:srgbClr>
@@ -4733,7 +4353,7 @@
           <a:bodyPr/>
           <a:lstStyle/>
           <a:p>
-            <a:pPr/>
+            <a:endParaRPr/>
           </a:p>
         </p:txBody>
       </p:sp>
@@ -4745,8 +4365,8 @@
         </p:nvSpPr>
         <p:spPr>
           <a:xfrm>
-            <a:off x="5272469" y="2352114"/>
-            <a:ext cx="858102" cy="963783"/>
+            <a:off x="5272468" y="2352114"/>
+            <a:ext cx="1636461" cy="1062329"/>
           </a:xfrm>
           <a:custGeom>
             <a:avLst/>
@@ -4768,7 +4388,7 @@
             </a:cxnLst>
             <a:rect l="0" t="0" r="r" b="b"/>
             <a:pathLst>
-              <a:path w="21600" h="21600" fill="norm" stroke="1" extrusionOk="0">
+              <a:path w="21600" h="21600" extrusionOk="0">
                 <a:moveTo>
                   <a:pt x="21600" y="21600"/>
                 </a:moveTo>
@@ -4787,7 +4407,7 @@
             <a:tailEnd type="triangle"/>
           </a:ln>
           <a:effectLst>
-            <a:outerShdw sx="100000" sy="100000" kx="0" ky="0" algn="b" rotWithShape="0" blurRad="38100" dist="20000" dir="5400000">
+            <a:outerShdw blurRad="38100" dist="20000" dir="5400000" rotWithShape="0">
               <a:srgbClr val="000000">
                 <a:alpha val="38000"/>
               </a:srgbClr>
@@ -4798,72 +4418,7 @@
           <a:bodyPr/>
           <a:lstStyle/>
           <a:p>
-            <a:pPr/>
-          </a:p>
-        </p:txBody>
-      </p:sp>
-      <p:sp>
-        <p:nvSpPr>
-          <p:cNvPr id="174" name="Shape 174"/>
-          <p:cNvSpPr/>
-          <p:nvPr/>
-        </p:nvSpPr>
-        <p:spPr>
-          <a:xfrm>
-            <a:off x="4511396" y="2352114"/>
-            <a:ext cx="505639" cy="2952457"/>
-          </a:xfrm>
-          <a:custGeom>
-            <a:avLst/>
-            <a:gdLst/>
-            <a:ahLst/>
-            <a:cxnLst>
-              <a:cxn ang="0">
-                <a:pos x="wd2" y="hd2"/>
-              </a:cxn>
-              <a:cxn ang="5400000">
-                <a:pos x="wd2" y="hd2"/>
-              </a:cxn>
-              <a:cxn ang="10800000">
-                <a:pos x="wd2" y="hd2"/>
-              </a:cxn>
-              <a:cxn ang="16200000">
-                <a:pos x="wd2" y="hd2"/>
-              </a:cxn>
-            </a:cxnLst>
-            <a:rect l="0" t="0" r="r" b="b"/>
-            <a:pathLst>
-              <a:path w="21600" h="21600" fill="norm" stroke="1" extrusionOk="0">
-                <a:moveTo>
-                  <a:pt x="0" y="21600"/>
-                </a:moveTo>
-                <a:cubicBezTo>
-                  <a:pt x="7200" y="14400"/>
-                  <a:pt x="14400" y="7200"/>
-                  <a:pt x="21600" y="0"/>
-                </a:cubicBezTo>
-              </a:path>
-            </a:pathLst>
-          </a:custGeom>
-          <a:ln w="25400">
-            <a:solidFill>
-              <a:schemeClr val="accent1"/>
-            </a:solidFill>
-            <a:tailEnd type="triangle"/>
-          </a:ln>
-          <a:effectLst>
-            <a:outerShdw sx="100000" sy="100000" kx="0" ky="0" algn="b" rotWithShape="0" blurRad="38100" dist="20000" dir="5400000">
-              <a:srgbClr val="000000">
-                <a:alpha val="38000"/>
-              </a:srgbClr>
-            </a:outerShdw>
-          </a:effectLst>
-        </p:spPr>
-        <p:txBody>
-          <a:bodyPr/>
-          <a:lstStyle/>
-          <a:p>
-            <a:pPr/>
+            <a:endParaRPr/>
           </a:p>
         </p:txBody>
       </p:sp>
@@ -4875,7 +4430,7 @@
         </p:nvSpPr>
         <p:spPr>
           <a:xfrm>
-            <a:off x="4541369" y="2401578"/>
+            <a:off x="2712131" y="1875468"/>
             <a:ext cx="1052176" cy="269241"/>
           </a:xfrm>
           <a:prstGeom prst="rect">
@@ -4900,8 +4455,8 @@
             </a:lvl1pPr>
           </a:lstStyle>
           <a:p>
-            <a:pPr/>
-            <a:r>
+            <a:r>
+              <a:rPr dirty="0"/>
               <a:t>partOfPattern</a:t>
             </a:r>
           </a:p>
@@ -4938,7 +4493,7 @@
             </a:cxnLst>
             <a:rect l="0" t="0" r="r" b="b"/>
             <a:pathLst>
-              <a:path w="21600" h="21600" fill="norm" stroke="1" extrusionOk="0">
+              <a:path w="21600" h="21600" extrusionOk="0">
                 <a:moveTo>
                   <a:pt x="21600" y="21600"/>
                 </a:moveTo>
@@ -4957,7 +4512,7 @@
             <a:tailEnd type="triangle"/>
           </a:ln>
           <a:effectLst>
-            <a:outerShdw sx="100000" sy="100000" kx="0" ky="0" algn="b" rotWithShape="0" blurRad="38100" dist="20000" dir="5400000">
+            <a:outerShdw blurRad="38100" dist="20000" dir="5400000" rotWithShape="0">
               <a:srgbClr val="000000">
                 <a:alpha val="38000"/>
               </a:srgbClr>
@@ -4968,7 +4523,7 @@
           <a:bodyPr/>
           <a:lstStyle/>
           <a:p>
-            <a:pPr/>
+            <a:endParaRPr/>
           </a:p>
         </p:txBody>
       </p:sp>
@@ -5005,7 +4560,6 @@
             </a:lvl1pPr>
           </a:lstStyle>
           <a:p>
-            <a:pPr/>
             <a:r>
               <a:t>partOfActivity</a:t>
             </a:r>
@@ -5045,7 +4599,6 @@
             </a:lvl1pPr>
           </a:lstStyle>
           <a:p>
-            <a:pPr/>
             <a:r>
               <a:t>partOfPhase</a:t>
             </a:r>
@@ -5083,7 +4636,7 @@
             </a:cxnLst>
             <a:rect l="0" t="0" r="r" b="b"/>
             <a:pathLst>
-              <a:path w="0" h="21600" fill="norm" stroke="1" extrusionOk="0">
+              <a:path h="21600" extrusionOk="0">
                 <a:moveTo>
                   <a:pt x="0" y="21600"/>
                 </a:moveTo>
@@ -5102,7 +4655,7 @@
             <a:tailEnd type="triangle"/>
           </a:ln>
           <a:effectLst>
-            <a:outerShdw sx="100000" sy="100000" kx="0" ky="0" algn="b" rotWithShape="0" blurRad="38100" dist="20000" dir="5400000">
+            <a:outerShdw blurRad="38100" dist="20000" dir="5400000" rotWithShape="0">
               <a:srgbClr val="000000">
                 <a:alpha val="38000"/>
               </a:srgbClr>
@@ -5113,7 +4666,7 @@
           <a:bodyPr/>
           <a:lstStyle/>
           <a:p>
-            <a:pPr/>
+            <a:endParaRPr/>
           </a:p>
         </p:txBody>
       </p:sp>
@@ -5150,7 +4703,6 @@
             </a:lvl1pPr>
           </a:lstStyle>
           <a:p>
-            <a:pPr/>
             <a:r>
               <a:t>partOfAPT</a:t>
             </a:r>
@@ -5188,7 +4740,7 @@
             </a:cxnLst>
             <a:rect l="0" t="0" r="r" b="b"/>
             <a:pathLst>
-              <a:path w="21600" h="21600" fill="norm" stroke="1" extrusionOk="0">
+              <a:path w="21600" h="21600" extrusionOk="0">
                 <a:moveTo>
                   <a:pt x="21600" y="0"/>
                 </a:moveTo>
@@ -5207,7 +4759,7 @@
             <a:tailEnd type="triangle"/>
           </a:ln>
           <a:effectLst>
-            <a:outerShdw sx="100000" sy="100000" kx="0" ky="0" algn="b" rotWithShape="0" blurRad="38100" dist="20000" dir="5400000">
+            <a:outerShdw blurRad="38100" dist="20000" dir="5400000" rotWithShape="0">
               <a:srgbClr val="000000">
                 <a:alpha val="38000"/>
               </a:srgbClr>
@@ -5218,7 +4770,7 @@
           <a:bodyPr/>
           <a:lstStyle/>
           <a:p>
-            <a:pPr/>
+            <a:endParaRPr/>
           </a:p>
         </p:txBody>
       </p:sp>
@@ -5230,7 +4782,7 @@
         </p:nvSpPr>
         <p:spPr>
           <a:xfrm flipV="1">
-            <a:off x="1369385" y="1318096"/>
+            <a:off x="1369385" y="959140"/>
             <a:ext cx="1" cy="428181"/>
           </a:xfrm>
           <a:prstGeom prst="line">
@@ -5243,7 +4795,7 @@
             <a:tailEnd type="triangle"/>
           </a:ln>
           <a:effectLst>
-            <a:outerShdw sx="100000" sy="100000" kx="0" ky="0" algn="b" rotWithShape="0" blurRad="38100" dist="20000" dir="5400000">
+            <a:outerShdw blurRad="38100" dist="20000" dir="5400000" rotWithShape="0">
               <a:srgbClr val="000000">
                 <a:alpha val="38000"/>
               </a:srgbClr>
@@ -5254,7 +4806,7 @@
           <a:bodyPr lIns="45719" rIns="45719"/>
           <a:lstStyle/>
           <a:p>
-            <a:pPr/>
+            <a:endParaRPr/>
           </a:p>
         </p:txBody>
       </p:sp>
@@ -5266,7 +4818,7 @@
         </p:nvSpPr>
         <p:spPr>
           <a:xfrm>
-            <a:off x="1315359" y="1388127"/>
+            <a:off x="1315359" y="1029171"/>
             <a:ext cx="1134032" cy="269241"/>
           </a:xfrm>
           <a:prstGeom prst="rect">
@@ -5291,7 +4843,6 @@
             </a:lvl1pPr>
           </a:lstStyle>
           <a:p>
-            <a:pPr/>
             <a:r>
               <a:t>partOfSegment</a:t>
             </a:r>
@@ -5306,7 +4857,7 @@
         </p:nvSpPr>
         <p:spPr>
           <a:xfrm>
-            <a:off x="393265" y="1824716"/>
+            <a:off x="393265" y="1465760"/>
             <a:ext cx="1939482" cy="447041"/>
           </a:xfrm>
           <a:prstGeom prst="rect">
@@ -5331,7 +4882,6 @@
             </a:lvl1pPr>
           </a:lstStyle>
           <a:p>
-            <a:pPr/>
             <a:r>
               <a:t>Resources, Subjects, Entities, Patterns, Agents</a:t>
             </a:r>
@@ -5346,7 +4896,7 @@
         </p:nvSpPr>
         <p:spPr>
           <a:xfrm>
-            <a:off x="4570967" y="4302470"/>
+            <a:off x="4574765" y="3547721"/>
             <a:ext cx="1352586" cy="269241"/>
           </a:xfrm>
           <a:prstGeom prst="rect">
@@ -5371,8 +4921,8 @@
             </a:lvl1pPr>
           </a:lstStyle>
           <a:p>
-            <a:pPr/>
-            <a:r>
+            <a:r>
+              <a:rPr dirty="0"/>
               <a:t>Edge*AffectsEvent</a:t>
             </a:r>
           </a:p>
@@ -5380,84 +4930,641 @@
       </p:sp>
       <p:sp>
         <p:nvSpPr>
-          <p:cNvPr id="171" name="Shape 171"/>
+          <p:cNvPr id="73" name="Shape 170"/>
           <p:cNvSpPr/>
           <p:nvPr/>
         </p:nvSpPr>
         <p:spPr>
-          <a:xfrm flipH="1">
-            <a:off x="4439229" y="4265652"/>
-            <a:ext cx="1472825" cy="43168"/>
+          <a:xfrm>
+            <a:off x="866136" y="3042188"/>
+            <a:ext cx="1645566" cy="276999"/>
           </a:xfrm>
-          <a:custGeom>
+          <a:prstGeom prst="rect">
             <a:avLst/>
-            <a:gdLst/>
-            <a:ahLst/>
-            <a:cxnLst>
-              <a:cxn ang="0">
-                <a:pos x="wd2" y="hd2"/>
-              </a:cxn>
-              <a:cxn ang="5400000">
-                <a:pos x="wd2" y="hd2"/>
-              </a:cxn>
-              <a:cxn ang="10800000">
-                <a:pos x="wd2" y="hd2"/>
-              </a:cxn>
-              <a:cxn ang="16200000">
-                <a:pos x="wd2" y="hd2"/>
-              </a:cxn>
-            </a:cxnLst>
-            <a:rect l="0" t="0" r="r" b="b"/>
-            <a:pathLst>
-              <a:path w="21600" h="21600" fill="norm" stroke="1" extrusionOk="0">
-                <a:moveTo>
-                  <a:pt x="0" y="0"/>
-                </a:moveTo>
-                <a:lnTo>
-                  <a:pt x="10800" y="0"/>
-                </a:lnTo>
-                <a:lnTo>
-                  <a:pt x="10800" y="21600"/>
-                </a:lnTo>
-                <a:lnTo>
-                  <a:pt x="21600" y="21600"/>
-                </a:lnTo>
-              </a:path>
-            </a:pathLst>
-          </a:custGeom>
-          <a:ln w="25400">
+          </a:prstGeom>
+          <a:ln w="12700">
+            <a:miter lim="400000"/>
+          </a:ln>
+          <a:extLst>
+            <a:ext uri="{C572A759-6A51-4108-AA02-DFA0A04FC94B}">
+              <ma14:wrappingTextBoxFlag xmlns:ma14="http://schemas.microsoft.com/office/mac/drawingml/2011/main" val="1"/>
+            </a:ext>
+          </a:extLst>
+        </p:spPr>
+        <p:txBody>
+          <a:bodyPr wrap="none" lIns="45719" rIns="45719">
+            <a:spAutoFit/>
+          </a:bodyPr>
+          <a:lstStyle>
+            <a:lvl1pPr algn="ctr">
+              <a:defRPr sz="1200"/>
+            </a:lvl1pPr>
+          </a:lstStyle>
+          <a:p>
+            <a:r>
+              <a:rPr dirty="0" smtClean="0"/>
+              <a:t>Edge</a:t>
+            </a:r>
+            <a:r>
+              <a:rPr lang="en-US" dirty="0" smtClean="0"/>
+              <a:t>Event</a:t>
+            </a:r>
+            <a:r>
+              <a:rPr dirty="0" smtClean="0"/>
+              <a:t>Affects</a:t>
+            </a:r>
+            <a:r>
+              <a:rPr lang="en-US" dirty="0" smtClean="0"/>
+              <a:t>Subject</a:t>
+            </a:r>
+            <a:endParaRPr dirty="0"/>
+          </a:p>
+        </p:txBody>
+      </p:sp>
+      <p:sp>
+        <p:nvSpPr>
+          <p:cNvPr id="74" name="Shape 170"/>
+          <p:cNvSpPr/>
+          <p:nvPr/>
+        </p:nvSpPr>
+        <p:spPr>
+          <a:xfrm>
+            <a:off x="748861" y="3193763"/>
+            <a:ext cx="1750162" cy="276999"/>
+          </a:xfrm>
+          <a:prstGeom prst="rect">
+            <a:avLst/>
+          </a:prstGeom>
+          <a:ln w="12700">
+            <a:miter lim="400000"/>
+          </a:ln>
+          <a:extLst>
+            <a:ext uri="{C572A759-6A51-4108-AA02-DFA0A04FC94B}">
+              <ma14:wrappingTextBoxFlag xmlns:ma14="http://schemas.microsoft.com/office/mac/drawingml/2011/main" val="1"/>
+            </a:ext>
+          </a:extLst>
+        </p:spPr>
+        <p:txBody>
+          <a:bodyPr wrap="none" lIns="45719" rIns="45719">
+            <a:spAutoFit/>
+          </a:bodyPr>
+          <a:lstStyle>
+            <a:lvl1pPr algn="ctr">
+              <a:defRPr sz="1200"/>
+            </a:lvl1pPr>
+          </a:lstStyle>
+          <a:p>
+            <a:r>
+              <a:rPr lang="en-US" dirty="0" err="1" smtClean="0"/>
+              <a:t>EdgeEventHasParentEvent</a:t>
+            </a:r>
+            <a:endParaRPr dirty="0"/>
+          </a:p>
+        </p:txBody>
+      </p:sp>
+      <p:sp>
+        <p:nvSpPr>
+          <p:cNvPr id="75" name="Shape 170"/>
+          <p:cNvSpPr/>
+          <p:nvPr/>
+        </p:nvSpPr>
+        <p:spPr>
+          <a:xfrm>
+            <a:off x="403609" y="3358478"/>
+            <a:ext cx="2133079" cy="276999"/>
+          </a:xfrm>
+          <a:prstGeom prst="rect">
+            <a:avLst/>
+          </a:prstGeom>
+          <a:ln w="12700">
+            <a:miter lim="400000"/>
+          </a:ln>
+          <a:extLst>
+            <a:ext uri="{C572A759-6A51-4108-AA02-DFA0A04FC94B}">
+              <ma14:wrappingTextBoxFlag xmlns:ma14="http://schemas.microsoft.com/office/mac/drawingml/2011/main" val="1"/>
+            </a:ext>
+          </a:extLst>
+        </p:spPr>
+        <p:txBody>
+          <a:bodyPr wrap="none" lIns="45719" rIns="45719">
+            <a:spAutoFit/>
+          </a:bodyPr>
+          <a:lstStyle>
+            <a:lvl1pPr algn="ctr">
+              <a:defRPr sz="1200"/>
+            </a:lvl1pPr>
+          </a:lstStyle>
+          <a:p>
+            <a:r>
+              <a:rPr lang="en-US" dirty="0" err="1" smtClean="0"/>
+              <a:t>EdgeEventIGeneratedBySubject</a:t>
+            </a:r>
+            <a:endParaRPr dirty="0"/>
+          </a:p>
+        </p:txBody>
+      </p:sp>
+      <p:sp>
+        <p:nvSpPr>
+          <p:cNvPr id="76" name="Shape 170"/>
+          <p:cNvSpPr/>
+          <p:nvPr/>
+        </p:nvSpPr>
+        <p:spPr>
+          <a:xfrm>
+            <a:off x="846322" y="3517737"/>
+            <a:ext cx="1645566" cy="276999"/>
+          </a:xfrm>
+          <a:prstGeom prst="rect">
+            <a:avLst/>
+          </a:prstGeom>
+          <a:ln w="12700">
+            <a:miter lim="400000"/>
+          </a:ln>
+          <a:extLst>
+            <a:ext uri="{C572A759-6A51-4108-AA02-DFA0A04FC94B}">
+              <ma14:wrappingTextBoxFlag xmlns:ma14="http://schemas.microsoft.com/office/mac/drawingml/2011/main" val="1"/>
+            </a:ext>
+          </a:extLst>
+        </p:spPr>
+        <p:txBody>
+          <a:bodyPr wrap="none" lIns="45719" rIns="45719">
+            <a:spAutoFit/>
+          </a:bodyPr>
+          <a:lstStyle>
+            <a:lvl1pPr algn="ctr">
+              <a:defRPr sz="1200"/>
+            </a:lvl1pPr>
+          </a:lstStyle>
+          <a:p>
+            <a:r>
+              <a:rPr lang="en-US" dirty="0" err="1" smtClean="0"/>
+              <a:t>EdgeSubjectAffectsEvent</a:t>
+            </a:r>
+            <a:endParaRPr dirty="0"/>
+          </a:p>
+        </p:txBody>
+      </p:sp>
+      <p:sp>
+        <p:nvSpPr>
+          <p:cNvPr id="77" name="Shape 170"/>
+          <p:cNvSpPr/>
+          <p:nvPr/>
+        </p:nvSpPr>
+        <p:spPr>
+          <a:xfrm>
+            <a:off x="546312" y="3696148"/>
+            <a:ext cx="1967769" cy="276999"/>
+          </a:xfrm>
+          <a:prstGeom prst="rect">
+            <a:avLst/>
+          </a:prstGeom>
+          <a:ln w="12700">
+            <a:miter lim="400000"/>
+          </a:ln>
+          <a:extLst>
+            <a:ext uri="{C572A759-6A51-4108-AA02-DFA0A04FC94B}">
+              <ma14:wrappingTextBoxFlag xmlns:ma14="http://schemas.microsoft.com/office/mac/drawingml/2011/main" val="1"/>
+            </a:ext>
+          </a:extLst>
+        </p:spPr>
+        <p:txBody>
+          <a:bodyPr wrap="none" lIns="45719" rIns="45719">
+            <a:spAutoFit/>
+          </a:bodyPr>
+          <a:lstStyle>
+            <a:lvl1pPr algn="ctr">
+              <a:defRPr sz="1200"/>
+            </a:lvl1pPr>
+          </a:lstStyle>
+          <a:p>
+            <a:r>
+              <a:rPr lang="en-US" dirty="0" err="1" smtClean="0"/>
+              <a:t>EdgeSubjectHasParentSubject</a:t>
+            </a:r>
+            <a:endParaRPr dirty="0"/>
+          </a:p>
+        </p:txBody>
+      </p:sp>
+      <p:sp>
+        <p:nvSpPr>
+          <p:cNvPr id="79" name="Shape 170"/>
+          <p:cNvSpPr/>
+          <p:nvPr/>
+        </p:nvSpPr>
+        <p:spPr>
+          <a:xfrm>
+            <a:off x="1829617" y="5147410"/>
+            <a:ext cx="1867982" cy="276999"/>
+          </a:xfrm>
+          <a:prstGeom prst="rect">
+            <a:avLst/>
+          </a:prstGeom>
+          <a:ln w="12700">
+            <a:miter lim="400000"/>
+          </a:ln>
+          <a:extLst>
+            <a:ext uri="{C572A759-6A51-4108-AA02-DFA0A04FC94B}">
+              <ma14:wrappingTextBoxFlag xmlns:ma14="http://schemas.microsoft.com/office/mac/drawingml/2011/main" val="1"/>
+            </a:ext>
+          </a:extLst>
+        </p:spPr>
+        <p:txBody>
+          <a:bodyPr wrap="none" lIns="45719" rIns="45719">
+            <a:spAutoFit/>
+          </a:bodyPr>
+          <a:lstStyle>
+            <a:lvl1pPr algn="ctr">
+              <a:defRPr sz="1200"/>
+            </a:lvl1pPr>
+          </a:lstStyle>
+          <a:p>
+            <a:r>
+              <a:rPr lang="en-US" dirty="0" err="1" smtClean="0"/>
+              <a:t>EdgeSourceSinkAffectsEvent</a:t>
+            </a:r>
+            <a:endParaRPr dirty="0"/>
+          </a:p>
+        </p:txBody>
+      </p:sp>
+      <p:sp>
+        <p:nvSpPr>
+          <p:cNvPr id="80" name="Shape 120"/>
+          <p:cNvSpPr/>
+          <p:nvPr/>
+        </p:nvSpPr>
+        <p:spPr>
+          <a:xfrm>
+            <a:off x="7499533" y="2828950"/>
+            <a:ext cx="1564338" cy="276999"/>
+          </a:xfrm>
+          <a:prstGeom prst="rect">
+            <a:avLst/>
+          </a:prstGeom>
+          <a:ln w="12700">
+            <a:miter lim="400000"/>
+          </a:ln>
+          <a:extLst>
+            <a:ext uri="{C572A759-6A51-4108-AA02-DFA0A04FC94B}">
+              <ma14:wrappingTextBoxFlag xmlns:ma14="http://schemas.microsoft.com/office/mac/drawingml/2011/main" val="1"/>
+            </a:ext>
+          </a:extLst>
+        </p:spPr>
+        <p:txBody>
+          <a:bodyPr wrap="none" lIns="45719" rIns="45719">
+            <a:spAutoFit/>
+          </a:bodyPr>
+          <a:lstStyle>
+            <a:lvl1pPr algn="ctr">
+              <a:defRPr sz="1200"/>
+            </a:lvl1pPr>
+          </a:lstStyle>
+          <a:p>
+            <a:r>
+              <a:rPr lang="en-US" dirty="0" err="1" smtClean="0"/>
+              <a:t>EdgeObjectPrevVersion</a:t>
+            </a:r>
+            <a:endParaRPr dirty="0"/>
+          </a:p>
+        </p:txBody>
+      </p:sp>
+      <p:cxnSp>
+        <p:nvCxnSpPr>
+          <p:cNvPr id="18" name="Elbow Connector 17"/>
+          <p:cNvCxnSpPr>
+            <a:stCxn id="112" idx="1"/>
+            <a:endCxn id="112" idx="0"/>
+          </p:cNvCxnSpPr>
+          <p:nvPr/>
+        </p:nvCxnSpPr>
+        <p:spPr>
+          <a:xfrm rot="10800000" flipH="1">
+            <a:off x="2775746" y="3307774"/>
+            <a:ext cx="845893" cy="665254"/>
+          </a:xfrm>
+          <a:prstGeom prst="bentConnector4">
+            <a:avLst>
+              <a:gd name="adj1" fmla="val -27025"/>
+              <a:gd name="adj2" fmla="val 129270"/>
+            </a:avLst>
+          </a:prstGeom>
+          <a:noFill/>
+          <a:ln w="25400" cap="flat">
             <a:solidFill>
               <a:schemeClr val="accent1"/>
             </a:solidFill>
-            <a:tailEnd type="triangle"/>
+            <a:prstDash val="solid"/>
+            <a:round/>
+            <a:tailEnd type="arrow"/>
           </a:ln>
           <a:effectLst>
-            <a:outerShdw sx="100000" sy="100000" kx="0" ky="0" algn="b" rotWithShape="0" blurRad="38100" dist="20000" dir="5400000">
+            <a:outerShdw blurRad="38100" dist="20000" dir="5400000" rotWithShape="0">
               <a:srgbClr val="000000">
                 <a:alpha val="38000"/>
               </a:srgbClr>
             </a:outerShdw>
           </a:effectLst>
+          <a:sp3d/>
+        </p:spPr>
+        <p:style>
+          <a:lnRef idx="0">
+            <a:scrgbClr r="0" g="0" b="0"/>
+          </a:lnRef>
+          <a:fillRef idx="0">
+            <a:scrgbClr r="0" g="0" b="0"/>
+          </a:fillRef>
+          <a:effectRef idx="0">
+            <a:scrgbClr r="0" g="0" b="0"/>
+          </a:effectRef>
+          <a:fontRef idx="none"/>
+        </p:style>
+      </p:cxnSp>
+      <p:cxnSp>
+        <p:nvCxnSpPr>
+          <p:cNvPr id="92" name="Connector 140"/>
+          <p:cNvCxnSpPr>
+            <a:stCxn id="112" idx="3"/>
+            <a:endCxn id="113" idx="1"/>
+          </p:cNvCxnSpPr>
+          <p:nvPr/>
+        </p:nvCxnSpPr>
+        <p:spPr>
+          <a:xfrm flipV="1">
+            <a:off x="4467532" y="3973027"/>
+            <a:ext cx="2441398" cy="1"/>
+          </a:xfrm>
+          <a:prstGeom prst="straightConnector1">
+            <a:avLst/>
+          </a:prstGeom>
+          <a:ln w="25400">
+            <a:solidFill>
+              <a:schemeClr val="accent1"/>
+            </a:solidFill>
+            <a:tailEnd type="triangle"/>
+          </a:ln>
+          <a:effectLst>
+            <a:outerShdw blurRad="38100" dist="20000" dir="5400000" rotWithShape="0">
+              <a:srgbClr val="000000">
+                <a:alpha val="38000"/>
+              </a:srgbClr>
+            </a:outerShdw>
+          </a:effectLst>
+        </p:spPr>
+      </p:cxnSp>
+      <p:cxnSp>
+        <p:nvCxnSpPr>
+          <p:cNvPr id="30" name="Elbow Connector 29"/>
+          <p:cNvCxnSpPr>
+            <a:stCxn id="125" idx="1"/>
+            <a:endCxn id="142" idx="1"/>
+          </p:cNvCxnSpPr>
+          <p:nvPr/>
+        </p:nvCxnSpPr>
+        <p:spPr>
+          <a:xfrm rot="10800000" flipH="1">
+            <a:off x="235776" y="2111505"/>
+            <a:ext cx="4338927" cy="3563134"/>
+          </a:xfrm>
+          <a:prstGeom prst="bentConnector3">
+            <a:avLst>
+              <a:gd name="adj1" fmla="val -3360"/>
+            </a:avLst>
+          </a:prstGeom>
+          <a:noFill/>
+          <a:ln w="25400" cap="flat">
+            <a:solidFill>
+              <a:schemeClr val="accent1"/>
+            </a:solidFill>
+            <a:prstDash val="solid"/>
+            <a:round/>
+            <a:tailEnd type="arrow"/>
+          </a:ln>
+          <a:effectLst>
+            <a:outerShdw blurRad="38100" dist="20000" dir="5400000" rotWithShape="0">
+              <a:srgbClr val="000000">
+                <a:alpha val="38000"/>
+              </a:srgbClr>
+            </a:outerShdw>
+          </a:effectLst>
+          <a:sp3d/>
+        </p:spPr>
+        <p:style>
+          <a:lnRef idx="0">
+            <a:scrgbClr r="0" g="0" b="0"/>
+          </a:lnRef>
+          <a:fillRef idx="0">
+            <a:scrgbClr r="0" g="0" b="0"/>
+          </a:fillRef>
+          <a:effectRef idx="0">
+            <a:scrgbClr r="0" g="0" b="0"/>
+          </a:effectRef>
+          <a:fontRef idx="none"/>
+        </p:style>
+      </p:cxnSp>
+      <p:sp>
+        <p:nvSpPr>
+          <p:cNvPr id="157" name="Shape 160"/>
+          <p:cNvSpPr/>
+          <p:nvPr/>
+        </p:nvSpPr>
+        <p:spPr>
+          <a:xfrm>
+            <a:off x="3621640" y="2519653"/>
+            <a:ext cx="1052176" cy="269241"/>
+          </a:xfrm>
+          <a:prstGeom prst="rect">
+            <a:avLst/>
+          </a:prstGeom>
+          <a:ln w="12700">
+            <a:miter lim="400000"/>
+          </a:ln>
+          <a:extLst>
+            <a:ext uri="{C572A759-6A51-4108-AA02-DFA0A04FC94B}">
+              <ma14:wrappingTextBoxFlag xmlns:ma14="http://schemas.microsoft.com/office/mac/drawingml/2011/main" val="1"/>
+            </a:ext>
+          </a:extLst>
         </p:spPr>
         <p:txBody>
-          <a:bodyPr lIns="45719" rIns="45719" anchor="ctr"/>
-          <a:lstStyle/>
-          <a:p>
-            <a:pPr/>
+          <a:bodyPr wrap="none" lIns="45719" rIns="45719">
+            <a:spAutoFit/>
+          </a:bodyPr>
+          <a:lstStyle>
+            <a:lvl1pPr algn="ctr">
+              <a:defRPr sz="1200"/>
+            </a:lvl1pPr>
+          </a:lstStyle>
+          <a:p>
+            <a:r>
+              <a:rPr dirty="0"/>
+              <a:t>partOfPattern</a:t>
+            </a:r>
           </a:p>
         </p:txBody>
       </p:sp>
+      <p:sp>
+        <p:nvSpPr>
+          <p:cNvPr id="158" name="Shape 160"/>
+          <p:cNvSpPr/>
+          <p:nvPr/>
+        </p:nvSpPr>
+        <p:spPr>
+          <a:xfrm>
+            <a:off x="5774503" y="2519653"/>
+            <a:ext cx="1052176" cy="269241"/>
+          </a:xfrm>
+          <a:prstGeom prst="rect">
+            <a:avLst/>
+          </a:prstGeom>
+          <a:ln w="12700">
+            <a:miter lim="400000"/>
+          </a:ln>
+          <a:extLst>
+            <a:ext uri="{C572A759-6A51-4108-AA02-DFA0A04FC94B}">
+              <ma14:wrappingTextBoxFlag xmlns:ma14="http://schemas.microsoft.com/office/mac/drawingml/2011/main" val="1"/>
+            </a:ext>
+          </a:extLst>
+        </p:spPr>
+        <p:txBody>
+          <a:bodyPr wrap="none" lIns="45719" rIns="45719">
+            <a:spAutoFit/>
+          </a:bodyPr>
+          <a:lstStyle>
+            <a:lvl1pPr algn="ctr">
+              <a:defRPr sz="1200"/>
+            </a:lvl1pPr>
+          </a:lstStyle>
+          <a:p>
+            <a:r>
+              <a:rPr dirty="0"/>
+              <a:t>partOfPattern</a:t>
+            </a:r>
+          </a:p>
+        </p:txBody>
+      </p:sp>
+      <p:cxnSp>
+        <p:nvCxnSpPr>
+          <p:cNvPr id="159" name="Elbow Connector 158"/>
+          <p:cNvCxnSpPr>
+            <a:stCxn id="113" idx="0"/>
+            <a:endCxn id="113" idx="3"/>
+          </p:cNvCxnSpPr>
+          <p:nvPr/>
+        </p:nvCxnSpPr>
+        <p:spPr>
+          <a:xfrm rot="16200000" flipH="1">
+            <a:off x="7673778" y="3274575"/>
+            <a:ext cx="665253" cy="731650"/>
+          </a:xfrm>
+          <a:prstGeom prst="bentConnector4">
+            <a:avLst>
+              <a:gd name="adj1" fmla="val -34363"/>
+              <a:gd name="adj2" fmla="val 131244"/>
+            </a:avLst>
+          </a:prstGeom>
+          <a:noFill/>
+          <a:ln w="25400" cap="flat">
+            <a:solidFill>
+              <a:schemeClr val="accent1"/>
+            </a:solidFill>
+            <a:prstDash val="solid"/>
+            <a:round/>
+            <a:tailEnd type="arrow"/>
+          </a:ln>
+          <a:effectLst>
+            <a:outerShdw blurRad="38100" dist="20000" dir="5400000" rotWithShape="0">
+              <a:srgbClr val="000000">
+                <a:alpha val="38000"/>
+              </a:srgbClr>
+            </a:outerShdw>
+          </a:effectLst>
+          <a:sp3d/>
+        </p:spPr>
+        <p:style>
+          <a:lnRef idx="0">
+            <a:scrgbClr r="0" g="0" b="0"/>
+          </a:lnRef>
+          <a:fillRef idx="0">
+            <a:scrgbClr r="0" g="0" b="0"/>
+          </a:fillRef>
+          <a:effectRef idx="0">
+            <a:scrgbClr r="0" g="0" b="0"/>
+          </a:effectRef>
+          <a:fontRef idx="none"/>
+        </p:style>
+      </p:cxnSp>
+      <p:cxnSp>
+        <p:nvCxnSpPr>
+          <p:cNvPr id="161" name="Connector 140"/>
+          <p:cNvCxnSpPr>
+            <a:stCxn id="112" idx="3"/>
+          </p:cNvCxnSpPr>
+          <p:nvPr/>
+        </p:nvCxnSpPr>
+        <p:spPr>
+          <a:xfrm>
+            <a:off x="4467532" y="3973028"/>
+            <a:ext cx="332888" cy="1022118"/>
+          </a:xfrm>
+          <a:prstGeom prst="straightConnector1">
+            <a:avLst/>
+          </a:prstGeom>
+          <a:ln w="25400">
+            <a:solidFill>
+              <a:schemeClr val="accent1"/>
+            </a:solidFill>
+            <a:tailEnd type="triangle"/>
+          </a:ln>
+          <a:effectLst>
+            <a:outerShdw blurRad="38100" dist="20000" dir="5400000" rotWithShape="0">
+              <a:srgbClr val="000000">
+                <a:alpha val="38000"/>
+              </a:srgbClr>
+            </a:outerShdw>
+          </a:effectLst>
+        </p:spPr>
+      </p:cxnSp>
+      <p:cxnSp>
+        <p:nvCxnSpPr>
+          <p:cNvPr id="164" name="Connector 140"/>
+          <p:cNvCxnSpPr>
+            <a:stCxn id="113" idx="1"/>
+            <a:endCxn id="114" idx="3"/>
+          </p:cNvCxnSpPr>
+          <p:nvPr/>
+        </p:nvCxnSpPr>
+        <p:spPr>
+          <a:xfrm flipH="1">
+            <a:off x="5767496" y="3973027"/>
+            <a:ext cx="1141434" cy="884967"/>
+          </a:xfrm>
+          <a:prstGeom prst="straightConnector1">
+            <a:avLst/>
+          </a:prstGeom>
+          <a:ln w="25400">
+            <a:solidFill>
+              <a:schemeClr val="accent1"/>
+            </a:solidFill>
+            <a:tailEnd type="triangle"/>
+          </a:ln>
+          <a:effectLst>
+            <a:outerShdw blurRad="38100" dist="20000" dir="5400000" rotWithShape="0">
+              <a:srgbClr val="000000">
+                <a:alpha val="38000"/>
+              </a:srgbClr>
+            </a:outerShdw>
+          </a:effectLst>
+        </p:spPr>
+      </p:cxnSp>
     </p:spTree>
   </p:cSld>
   <p:clrMapOvr>
     <a:masterClrMapping/>
   </p:clrMapOvr>
-  <p:transition xmlns:p14="http://schemas.microsoft.com/office/powerpoint/2010/main" spd="med" advClick="1"/>
+  <p:transition xmlns:p14="http://schemas.microsoft.com/office/powerpoint/2010/main" spd="med"/>
 </p:sld>
 </file>
 
 <file path=ppt/theme/theme1.xml><?xml version="1.0" encoding="utf-8"?>
-<a:theme xmlns:a="http://schemas.openxmlformats.org/drawingml/2006/main" xmlns:r="http://schemas.openxmlformats.org/officeDocument/2006/relationships" name="Office Theme">
+<a:theme xmlns:a="http://schemas.openxmlformats.org/drawingml/2006/main" name="Office Theme">
   <a:themeElements>
     <a:clrScheme name="Office Theme">
       <a:dk1>
@@ -5583,7 +5690,7 @@
       <a:effectStyleLst>
         <a:effectStyle>
           <a:effectLst>
-            <a:outerShdw sx="100000" sy="100000" kx="0" ky="0" algn="b" rotWithShape="0" blurRad="38100" dist="23000" dir="5400000">
+            <a:outerShdw blurRad="38100" dist="23000" dir="5400000" rotWithShape="0">
               <a:srgbClr val="000000">
                 <a:alpha val="35000"/>
               </a:srgbClr>
@@ -5592,7 +5699,7 @@
         </a:effectStyle>
         <a:effectStyle>
           <a:effectLst>
-            <a:outerShdw sx="100000" sy="100000" kx="0" ky="0" algn="b" rotWithShape="0" blurRad="38100" dist="23000" dir="5400000">
+            <a:outerShdw blurRad="38100" dist="23000" dir="5400000" rotWithShape="0">
               <a:srgbClr val="000000">
                 <a:alpha val="35000"/>
               </a:srgbClr>
@@ -5601,7 +5708,7 @@
         </a:effectStyle>
         <a:effectStyle>
           <a:effectLst>
-            <a:outerShdw sx="100000" sy="100000" kx="0" ky="0" algn="b" rotWithShape="0" blurRad="38100" dist="20000" dir="5400000">
+            <a:outerShdw blurRad="38100" dist="20000" dir="5400000" rotWithShape="0">
               <a:srgbClr val="000000">
                 <a:alpha val="38000"/>
               </a:srgbClr>
@@ -5675,7 +5782,7 @@
           <a:round/>
         </a:ln>
         <a:effectLst>
-          <a:outerShdw sx="100000" sy="100000" kx="0" ky="0" algn="b" rotWithShape="0" blurRad="38100" dist="23000" dir="5400000">
+          <a:outerShdw blurRad="38100" dist="23000" dir="5400000" rotWithShape="0">
             <a:srgbClr val="000000">
               <a:alpha val="35000"/>
             </a:srgbClr>
@@ -5683,7 +5790,7 @@
         </a:effectLst>
         <a:sp3d/>
       </a:spPr>
-      <a:bodyPr rot="0" spcFirstLastPara="1" vertOverflow="overflow" horzOverflow="overflow" vert="horz" wrap="square" lIns="45719" tIns="45719" rIns="45719" bIns="45719" numCol="1" spcCol="38100" rtlCol="0" anchor="ctr" upright="0">
+      <a:bodyPr rot="0" spcFirstLastPara="1" vertOverflow="overflow" horzOverflow="overflow" vert="horz" wrap="square" lIns="45719" tIns="45719" rIns="45719" bIns="45719" numCol="1" spcCol="38100" rtlCol="0" anchor="ctr">
         <a:spAutoFit/>
       </a:bodyPr>
       <a:lstStyle>
@@ -5702,7 +5809,7 @@
           <a:buFontTx/>
           <a:buNone/>
           <a:tabLst/>
-          <a:defRPr b="0" baseline="0" cap="none" i="0" spc="0" strike="noStrike" sz="1800" u="none" kumimoji="0" normalizeH="0">
+          <a:defRPr kumimoji="0" sz="1800" b="0" i="0" u="none" strike="noStrike" cap="none" spc="0" normalizeH="0" baseline="0">
             <a:ln>
               <a:noFill/>
             </a:ln>
@@ -5732,7 +5839,7 @@
           <a:buFontTx/>
           <a:buNone/>
           <a:tabLst/>
-          <a:defRPr b="0" baseline="0" cap="none" i="0" spc="0" strike="noStrike" sz="1800" u="none" kumimoji="0" normalizeH="0">
+          <a:defRPr kumimoji="0" sz="1800" b="0" i="0" u="none" strike="noStrike" cap="none" spc="0" normalizeH="0" baseline="0">
             <a:ln>
               <a:noFill/>
             </a:ln>
@@ -5758,7 +5865,7 @@
           <a:buFontTx/>
           <a:buNone/>
           <a:tabLst/>
-          <a:defRPr b="0" baseline="0" cap="none" i="0" spc="0" strike="noStrike" sz="1800" u="none" kumimoji="0" normalizeH="0">
+          <a:defRPr kumimoji="0" sz="1800" b="0" i="0" u="none" strike="noStrike" cap="none" spc="0" normalizeH="0" baseline="0">
             <a:ln>
               <a:noFill/>
             </a:ln>
@@ -5784,7 +5891,7 @@
           <a:buFontTx/>
           <a:buNone/>
           <a:tabLst/>
-          <a:defRPr b="0" baseline="0" cap="none" i="0" spc="0" strike="noStrike" sz="1800" u="none" kumimoji="0" normalizeH="0">
+          <a:defRPr kumimoji="0" sz="1800" b="0" i="0" u="none" strike="noStrike" cap="none" spc="0" normalizeH="0" baseline="0">
             <a:ln>
               <a:noFill/>
             </a:ln>
@@ -5810,7 +5917,7 @@
           <a:buFontTx/>
           <a:buNone/>
           <a:tabLst/>
-          <a:defRPr b="0" baseline="0" cap="none" i="0" spc="0" strike="noStrike" sz="1800" u="none" kumimoji="0" normalizeH="0">
+          <a:defRPr kumimoji="0" sz="1800" b="0" i="0" u="none" strike="noStrike" cap="none" spc="0" normalizeH="0" baseline="0">
             <a:ln>
               <a:noFill/>
             </a:ln>
@@ -5836,7 +5943,7 @@
           <a:buFontTx/>
           <a:buNone/>
           <a:tabLst/>
-          <a:defRPr b="0" baseline="0" cap="none" i="0" spc="0" strike="noStrike" sz="1800" u="none" kumimoji="0" normalizeH="0">
+          <a:defRPr kumimoji="0" sz="1800" b="0" i="0" u="none" strike="noStrike" cap="none" spc="0" normalizeH="0" baseline="0">
             <a:ln>
               <a:noFill/>
             </a:ln>
@@ -5862,7 +5969,7 @@
           <a:buFontTx/>
           <a:buNone/>
           <a:tabLst/>
-          <a:defRPr b="0" baseline="0" cap="none" i="0" spc="0" strike="noStrike" sz="1800" u="none" kumimoji="0" normalizeH="0">
+          <a:defRPr kumimoji="0" sz="1800" b="0" i="0" u="none" strike="noStrike" cap="none" spc="0" normalizeH="0" baseline="0">
             <a:ln>
               <a:noFill/>
             </a:ln>
@@ -5888,7 +5995,7 @@
           <a:buFontTx/>
           <a:buNone/>
           <a:tabLst/>
-          <a:defRPr b="0" baseline="0" cap="none" i="0" spc="0" strike="noStrike" sz="1800" u="none" kumimoji="0" normalizeH="0">
+          <a:defRPr kumimoji="0" sz="1800" b="0" i="0" u="none" strike="noStrike" cap="none" spc="0" normalizeH="0" baseline="0">
             <a:ln>
               <a:noFill/>
             </a:ln>
@@ -5914,7 +6021,7 @@
           <a:buFontTx/>
           <a:buNone/>
           <a:tabLst/>
-          <a:defRPr b="0" baseline="0" cap="none" i="0" spc="0" strike="noStrike" sz="1800" u="none" kumimoji="0" normalizeH="0">
+          <a:defRPr kumimoji="0" sz="1800" b="0" i="0" u="none" strike="noStrike" cap="none" spc="0" normalizeH="0" baseline="0">
             <a:ln>
               <a:noFill/>
             </a:ln>
@@ -5940,7 +6047,7 @@
           <a:buFontTx/>
           <a:buNone/>
           <a:tabLst/>
-          <a:defRPr b="0" baseline="0" cap="none" i="0" spc="0" strike="noStrike" sz="1800" u="none" kumimoji="0" normalizeH="0">
+          <a:defRPr kumimoji="0" sz="1800" b="0" i="0" u="none" strike="noStrike" cap="none" spc="0" normalizeH="0" baseline="0">
             <a:ln>
               <a:noFill/>
             </a:ln>
@@ -5953,9 +6060,15 @@
         </a:lvl9pPr>
       </a:lstStyle>
       <a:style>
-        <a:lnRef idx="0"/>
-        <a:fillRef idx="0"/>
-        <a:effectRef idx="0"/>
+        <a:lnRef idx="0">
+          <a:scrgbClr r="0" g="0" b="0"/>
+        </a:lnRef>
+        <a:fillRef idx="0">
+          <a:scrgbClr r="0" g="0" b="0"/>
+        </a:fillRef>
+        <a:effectRef idx="0">
+          <a:scrgbClr r="0" g="0" b="0"/>
+        </a:effectRef>
         <a:fontRef idx="none"/>
       </a:style>
     </a:spDef>
@@ -5970,7 +6083,7 @@
           <a:round/>
         </a:ln>
         <a:effectLst>
-          <a:outerShdw sx="100000" sy="100000" kx="0" ky="0" algn="b" rotWithShape="0" blurRad="38100" dist="20000" dir="5400000">
+          <a:outerShdw blurRad="38100" dist="20000" dir="5400000" rotWithShape="0">
             <a:srgbClr val="000000">
               <a:alpha val="38000"/>
             </a:srgbClr>
@@ -5978,7 +6091,7 @@
         </a:effectLst>
         <a:sp3d/>
       </a:spPr>
-      <a:bodyPr rot="0" spcFirstLastPara="1" vertOverflow="overflow" horzOverflow="overflow" vert="horz" wrap="square" lIns="91439" tIns="45719" rIns="91439" bIns="45719" numCol="1" spcCol="38100" rtlCol="0" anchor="t" upright="0">
+      <a:bodyPr rot="0" spcFirstLastPara="1" vertOverflow="overflow" horzOverflow="overflow" vert="horz" wrap="square" lIns="91439" tIns="45719" rIns="91439" bIns="45719" numCol="1" spcCol="38100" rtlCol="0" anchor="t">
         <a:noAutofit/>
       </a:bodyPr>
       <a:lstStyle>
@@ -5997,7 +6110,7 @@
           <a:buFontTx/>
           <a:buNone/>
           <a:tabLst/>
-          <a:defRPr b="0" baseline="0" cap="none" i="0" spc="0" strike="noStrike" sz="1800" u="none" kumimoji="0" normalizeH="0">
+          <a:defRPr kumimoji="0" sz="1800" b="0" i="0" u="none" strike="noStrike" cap="none" spc="0" normalizeH="0" baseline="0">
             <a:ln>
               <a:noFill/>
             </a:ln>
@@ -6023,7 +6136,7 @@
           <a:buFontTx/>
           <a:buNone/>
           <a:tabLst/>
-          <a:defRPr b="0" baseline="0" cap="none" i="0" spc="0" strike="noStrike" sz="1800" u="none" kumimoji="0" normalizeH="0">
+          <a:defRPr kumimoji="0" sz="1800" b="0" i="0" u="none" strike="noStrike" cap="none" spc="0" normalizeH="0" baseline="0">
             <a:ln>
               <a:noFill/>
             </a:ln>
@@ -6049,7 +6162,7 @@
           <a:buFontTx/>
           <a:buNone/>
           <a:tabLst/>
-          <a:defRPr b="0" baseline="0" cap="none" i="0" spc="0" strike="noStrike" sz="1800" u="none" kumimoji="0" normalizeH="0">
+          <a:defRPr kumimoji="0" sz="1800" b="0" i="0" u="none" strike="noStrike" cap="none" spc="0" normalizeH="0" baseline="0">
             <a:ln>
               <a:noFill/>
             </a:ln>
@@ -6075,7 +6188,7 @@
           <a:buFontTx/>
           <a:buNone/>
           <a:tabLst/>
-          <a:defRPr b="0" baseline="0" cap="none" i="0" spc="0" strike="noStrike" sz="1800" u="none" kumimoji="0" normalizeH="0">
+          <a:defRPr kumimoji="0" sz="1800" b="0" i="0" u="none" strike="noStrike" cap="none" spc="0" normalizeH="0" baseline="0">
             <a:ln>
               <a:noFill/>
             </a:ln>
@@ -6101,7 +6214,7 @@
           <a:buFontTx/>
           <a:buNone/>
           <a:tabLst/>
-          <a:defRPr b="0" baseline="0" cap="none" i="0" spc="0" strike="noStrike" sz="1800" u="none" kumimoji="0" normalizeH="0">
+          <a:defRPr kumimoji="0" sz="1800" b="0" i="0" u="none" strike="noStrike" cap="none" spc="0" normalizeH="0" baseline="0">
             <a:ln>
               <a:noFill/>
             </a:ln>
@@ -6127,7 +6240,7 @@
           <a:buFontTx/>
           <a:buNone/>
           <a:tabLst/>
-          <a:defRPr b="0" baseline="0" cap="none" i="0" spc="0" strike="noStrike" sz="1800" u="none" kumimoji="0" normalizeH="0">
+          <a:defRPr kumimoji="0" sz="1800" b="0" i="0" u="none" strike="noStrike" cap="none" spc="0" normalizeH="0" baseline="0">
             <a:ln>
               <a:noFill/>
             </a:ln>
@@ -6153,7 +6266,7 @@
           <a:buFontTx/>
           <a:buNone/>
           <a:tabLst/>
-          <a:defRPr b="0" baseline="0" cap="none" i="0" spc="0" strike="noStrike" sz="1800" u="none" kumimoji="0" normalizeH="0">
+          <a:defRPr kumimoji="0" sz="1800" b="0" i="0" u="none" strike="noStrike" cap="none" spc="0" normalizeH="0" baseline="0">
             <a:ln>
               <a:noFill/>
             </a:ln>
@@ -6179,7 +6292,7 @@
           <a:buFontTx/>
           <a:buNone/>
           <a:tabLst/>
-          <a:defRPr b="0" baseline="0" cap="none" i="0" spc="0" strike="noStrike" sz="1800" u="none" kumimoji="0" normalizeH="0">
+          <a:defRPr kumimoji="0" sz="1800" b="0" i="0" u="none" strike="noStrike" cap="none" spc="0" normalizeH="0" baseline="0">
             <a:ln>
               <a:noFill/>
             </a:ln>
@@ -6205,7 +6318,7 @@
           <a:buFontTx/>
           <a:buNone/>
           <a:tabLst/>
-          <a:defRPr b="0" baseline="0" cap="none" i="0" spc="0" strike="noStrike" sz="1800" u="none" kumimoji="0" normalizeH="0">
+          <a:defRPr kumimoji="0" sz="1800" b="0" i="0" u="none" strike="noStrike" cap="none" spc="0" normalizeH="0" baseline="0">
             <a:ln>
               <a:noFill/>
             </a:ln>
@@ -6231,7 +6344,7 @@
           <a:buFontTx/>
           <a:buNone/>
           <a:tabLst/>
-          <a:defRPr b="0" baseline="0" cap="none" i="0" spc="0" strike="noStrike" sz="1800" u="none" kumimoji="0" normalizeH="0">
+          <a:defRPr kumimoji="0" sz="1800" b="0" i="0" u="none" strike="noStrike" cap="none" spc="0" normalizeH="0" baseline="0">
             <a:ln>
               <a:noFill/>
             </a:ln>
@@ -6244,9 +6357,15 @@
         </a:lvl9pPr>
       </a:lstStyle>
       <a:style>
-        <a:lnRef idx="0"/>
-        <a:fillRef idx="0"/>
-        <a:effectRef idx="0"/>
+        <a:lnRef idx="0">
+          <a:scrgbClr r="0" g="0" b="0"/>
+        </a:lnRef>
+        <a:fillRef idx="0">
+          <a:scrgbClr r="0" g="0" b="0"/>
+        </a:fillRef>
+        <a:effectRef idx="0">
+          <a:scrgbClr r="0" g="0" b="0"/>
+        </a:effectRef>
         <a:fontRef idx="none"/>
       </a:style>
     </a:lnDef>
@@ -6260,7 +6379,7 @@
         <a:effectLst/>
         <a:sp3d/>
       </a:spPr>
-      <a:bodyPr rot="0" spcFirstLastPara="1" vertOverflow="overflow" horzOverflow="overflow" vert="horz" wrap="square" lIns="45719" tIns="45719" rIns="45719" bIns="45719" numCol="1" spcCol="38100" rtlCol="0" anchor="t" upright="0">
+      <a:bodyPr rot="0" spcFirstLastPara="1" vertOverflow="overflow" horzOverflow="overflow" vert="horz" wrap="square" lIns="45719" tIns="45719" rIns="45719" bIns="45719" numCol="1" spcCol="38100" rtlCol="0" anchor="t">
         <a:spAutoFit/>
       </a:bodyPr>
       <a:lstStyle>
@@ -6279,7 +6398,7 @@
           <a:buFontTx/>
           <a:buNone/>
           <a:tabLst/>
-          <a:defRPr b="0" baseline="0" cap="none" i="0" spc="0" strike="noStrike" sz="1800" u="none" kumimoji="0" normalizeH="0">
+          <a:defRPr kumimoji="0" sz="1800" b="0" i="0" u="none" strike="noStrike" cap="none" spc="0" normalizeH="0" baseline="0">
             <a:ln>
               <a:noFill/>
             </a:ln>
@@ -6309,7 +6428,7 @@
           <a:buFontTx/>
           <a:buNone/>
           <a:tabLst/>
-          <a:defRPr b="0" baseline="0" cap="none" i="0" spc="0" strike="noStrike" sz="1800" u="none" kumimoji="0" normalizeH="0">
+          <a:defRPr kumimoji="0" sz="1800" b="0" i="0" u="none" strike="noStrike" cap="none" spc="0" normalizeH="0" baseline="0">
             <a:ln>
               <a:noFill/>
             </a:ln>
@@ -6335,7 +6454,7 @@
           <a:buFontTx/>
           <a:buNone/>
           <a:tabLst/>
-          <a:defRPr b="0" baseline="0" cap="none" i="0" spc="0" strike="noStrike" sz="1800" u="none" kumimoji="0" normalizeH="0">
+          <a:defRPr kumimoji="0" sz="1800" b="0" i="0" u="none" strike="noStrike" cap="none" spc="0" normalizeH="0" baseline="0">
             <a:ln>
               <a:noFill/>
             </a:ln>
@@ -6361,7 +6480,7 @@
           <a:buFontTx/>
           <a:buNone/>
           <a:tabLst/>
-          <a:defRPr b="0" baseline="0" cap="none" i="0" spc="0" strike="noStrike" sz="1800" u="none" kumimoji="0" normalizeH="0">
+          <a:defRPr kumimoji="0" sz="1800" b="0" i="0" u="none" strike="noStrike" cap="none" spc="0" normalizeH="0" baseline="0">
             <a:ln>
               <a:noFill/>
             </a:ln>
@@ -6387,7 +6506,7 @@
           <a:buFontTx/>
           <a:buNone/>
           <a:tabLst/>
-          <a:defRPr b="0" baseline="0" cap="none" i="0" spc="0" strike="noStrike" sz="1800" u="none" kumimoji="0" normalizeH="0">
+          <a:defRPr kumimoji="0" sz="1800" b="0" i="0" u="none" strike="noStrike" cap="none" spc="0" normalizeH="0" baseline="0">
             <a:ln>
               <a:noFill/>
             </a:ln>
@@ -6413,7 +6532,7 @@
           <a:buFontTx/>
           <a:buNone/>
           <a:tabLst/>
-          <a:defRPr b="0" baseline="0" cap="none" i="0" spc="0" strike="noStrike" sz="1800" u="none" kumimoji="0" normalizeH="0">
+          <a:defRPr kumimoji="0" sz="1800" b="0" i="0" u="none" strike="noStrike" cap="none" spc="0" normalizeH="0" baseline="0">
             <a:ln>
               <a:noFill/>
             </a:ln>
@@ -6439,7 +6558,7 @@
           <a:buFontTx/>
           <a:buNone/>
           <a:tabLst/>
-          <a:defRPr b="0" baseline="0" cap="none" i="0" spc="0" strike="noStrike" sz="1800" u="none" kumimoji="0" normalizeH="0">
+          <a:defRPr kumimoji="0" sz="1800" b="0" i="0" u="none" strike="noStrike" cap="none" spc="0" normalizeH="0" baseline="0">
             <a:ln>
               <a:noFill/>
             </a:ln>
@@ -6465,7 +6584,7 @@
           <a:buFontTx/>
           <a:buNone/>
           <a:tabLst/>
-          <a:defRPr b="0" baseline="0" cap="none" i="0" spc="0" strike="noStrike" sz="1800" u="none" kumimoji="0" normalizeH="0">
+          <a:defRPr kumimoji="0" sz="1800" b="0" i="0" u="none" strike="noStrike" cap="none" spc="0" normalizeH="0" baseline="0">
             <a:ln>
               <a:noFill/>
             </a:ln>
@@ -6491,7 +6610,7 @@
           <a:buFontTx/>
           <a:buNone/>
           <a:tabLst/>
-          <a:defRPr b="0" baseline="0" cap="none" i="0" spc="0" strike="noStrike" sz="1800" u="none" kumimoji="0" normalizeH="0">
+          <a:defRPr kumimoji="0" sz="1800" b="0" i="0" u="none" strike="noStrike" cap="none" spc="0" normalizeH="0" baseline="0">
             <a:ln>
               <a:noFill/>
             </a:ln>
@@ -6517,7 +6636,7 @@
           <a:buFontTx/>
           <a:buNone/>
           <a:tabLst/>
-          <a:defRPr b="0" baseline="0" cap="none" i="0" spc="0" strike="noStrike" sz="1800" u="none" kumimoji="0" normalizeH="0">
+          <a:defRPr kumimoji="0" sz="1800" b="0" i="0" u="none" strike="noStrike" cap="none" spc="0" normalizeH="0" baseline="0">
             <a:ln>
               <a:noFill/>
             </a:ln>
@@ -6530,18 +6649,25 @@
         </a:lvl9pPr>
       </a:lstStyle>
       <a:style>
-        <a:lnRef idx="0"/>
-        <a:fillRef idx="0"/>
-        <a:effectRef idx="0"/>
+        <a:lnRef idx="0">
+          <a:scrgbClr r="0" g="0" b="0"/>
+        </a:lnRef>
+        <a:fillRef idx="0">
+          <a:scrgbClr r="0" g="0" b="0"/>
+        </a:fillRef>
+        <a:effectRef idx="0">
+          <a:scrgbClr r="0" g="0" b="0"/>
+        </a:effectRef>
         <a:fontRef idx="none"/>
       </a:style>
     </a:txDef>
   </a:objectDefaults>
+  <a:extraClrSchemeLst/>
 </a:theme>
 </file>
 
 <file path=ppt/theme/theme2.xml><?xml version="1.0" encoding="utf-8"?>
-<a:theme xmlns:a="http://schemas.openxmlformats.org/drawingml/2006/main" xmlns:r="http://schemas.openxmlformats.org/officeDocument/2006/relationships" name="Office Theme">
+<a:theme xmlns:a="http://schemas.openxmlformats.org/drawingml/2006/main" name="Office Theme">
   <a:themeElements>
     <a:clrScheme name="Office Theme">
       <a:dk1>
@@ -6667,7 +6793,7 @@
       <a:effectStyleLst>
         <a:effectStyle>
           <a:effectLst>
-            <a:outerShdw sx="100000" sy="100000" kx="0" ky="0" algn="b" rotWithShape="0" blurRad="38100" dist="23000" dir="5400000">
+            <a:outerShdw blurRad="38100" dist="23000" dir="5400000" rotWithShape="0">
               <a:srgbClr val="000000">
                 <a:alpha val="35000"/>
               </a:srgbClr>
@@ -6676,7 +6802,7 @@
         </a:effectStyle>
         <a:effectStyle>
           <a:effectLst>
-            <a:outerShdw sx="100000" sy="100000" kx="0" ky="0" algn="b" rotWithShape="0" blurRad="38100" dist="23000" dir="5400000">
+            <a:outerShdw blurRad="38100" dist="23000" dir="5400000" rotWithShape="0">
               <a:srgbClr val="000000">
                 <a:alpha val="35000"/>
               </a:srgbClr>
@@ -6685,7 +6811,7 @@
         </a:effectStyle>
         <a:effectStyle>
           <a:effectLst>
-            <a:outerShdw sx="100000" sy="100000" kx="0" ky="0" algn="b" rotWithShape="0" blurRad="38100" dist="20000" dir="5400000">
+            <a:outerShdw blurRad="38100" dist="20000" dir="5400000" rotWithShape="0">
               <a:srgbClr val="000000">
                 <a:alpha val="38000"/>
               </a:srgbClr>
@@ -6759,7 +6885,7 @@
           <a:round/>
         </a:ln>
         <a:effectLst>
-          <a:outerShdw sx="100000" sy="100000" kx="0" ky="0" algn="b" rotWithShape="0" blurRad="38100" dist="23000" dir="5400000">
+          <a:outerShdw blurRad="38100" dist="23000" dir="5400000" rotWithShape="0">
             <a:srgbClr val="000000">
               <a:alpha val="35000"/>
             </a:srgbClr>
@@ -6767,7 +6893,7 @@
         </a:effectLst>
         <a:sp3d/>
       </a:spPr>
-      <a:bodyPr rot="0" spcFirstLastPara="1" vertOverflow="overflow" horzOverflow="overflow" vert="horz" wrap="square" lIns="45719" tIns="45719" rIns="45719" bIns="45719" numCol="1" spcCol="38100" rtlCol="0" anchor="ctr" upright="0">
+      <a:bodyPr rot="0" spcFirstLastPara="1" vertOverflow="overflow" horzOverflow="overflow" vert="horz" wrap="square" lIns="45719" tIns="45719" rIns="45719" bIns="45719" numCol="1" spcCol="38100" rtlCol="0" anchor="ctr">
         <a:spAutoFit/>
       </a:bodyPr>
       <a:lstStyle>
@@ -6786,7 +6912,7 @@
           <a:buFontTx/>
           <a:buNone/>
           <a:tabLst/>
-          <a:defRPr b="0" baseline="0" cap="none" i="0" spc="0" strike="noStrike" sz="1800" u="none" kumimoji="0" normalizeH="0">
+          <a:defRPr kumimoji="0" sz="1800" b="0" i="0" u="none" strike="noStrike" cap="none" spc="0" normalizeH="0" baseline="0">
             <a:ln>
               <a:noFill/>
             </a:ln>
@@ -6816,7 +6942,7 @@
           <a:buFontTx/>
           <a:buNone/>
           <a:tabLst/>
-          <a:defRPr b="0" baseline="0" cap="none" i="0" spc="0" strike="noStrike" sz="1800" u="none" kumimoji="0" normalizeH="0">
+          <a:defRPr kumimoji="0" sz="1800" b="0" i="0" u="none" strike="noStrike" cap="none" spc="0" normalizeH="0" baseline="0">
             <a:ln>
               <a:noFill/>
             </a:ln>
@@ -6842,7 +6968,7 @@
           <a:buFontTx/>
           <a:buNone/>
           <a:tabLst/>
-          <a:defRPr b="0" baseline="0" cap="none" i="0" spc="0" strike="noStrike" sz="1800" u="none" kumimoji="0" normalizeH="0">
+          <a:defRPr kumimoji="0" sz="1800" b="0" i="0" u="none" strike="noStrike" cap="none" spc="0" normalizeH="0" baseline="0">
             <a:ln>
               <a:noFill/>
             </a:ln>
@@ -6868,7 +6994,7 @@
           <a:buFontTx/>
           <a:buNone/>
           <a:tabLst/>
-          <a:defRPr b="0" baseline="0" cap="none" i="0" spc="0" strike="noStrike" sz="1800" u="none" kumimoji="0" normalizeH="0">
+          <a:defRPr kumimoji="0" sz="1800" b="0" i="0" u="none" strike="noStrike" cap="none" spc="0" normalizeH="0" baseline="0">
             <a:ln>
               <a:noFill/>
             </a:ln>
@@ -6894,7 +7020,7 @@
           <a:buFontTx/>
           <a:buNone/>
           <a:tabLst/>
-          <a:defRPr b="0" baseline="0" cap="none" i="0" spc="0" strike="noStrike" sz="1800" u="none" kumimoji="0" normalizeH="0">
+          <a:defRPr kumimoji="0" sz="1800" b="0" i="0" u="none" strike="noStrike" cap="none" spc="0" normalizeH="0" baseline="0">
             <a:ln>
               <a:noFill/>
             </a:ln>
@@ -6920,7 +7046,7 @@
           <a:buFontTx/>
           <a:buNone/>
           <a:tabLst/>
-          <a:defRPr b="0" baseline="0" cap="none" i="0" spc="0" strike="noStrike" sz="1800" u="none" kumimoji="0" normalizeH="0">
+          <a:defRPr kumimoji="0" sz="1800" b="0" i="0" u="none" strike="noStrike" cap="none" spc="0" normalizeH="0" baseline="0">
             <a:ln>
               <a:noFill/>
             </a:ln>
@@ -6946,7 +7072,7 @@
           <a:buFontTx/>
           <a:buNone/>
           <a:tabLst/>
-          <a:defRPr b="0" baseline="0" cap="none" i="0" spc="0" strike="noStrike" sz="1800" u="none" kumimoji="0" normalizeH="0">
+          <a:defRPr kumimoji="0" sz="1800" b="0" i="0" u="none" strike="noStrike" cap="none" spc="0" normalizeH="0" baseline="0">
             <a:ln>
               <a:noFill/>
             </a:ln>
@@ -6972,7 +7098,7 @@
           <a:buFontTx/>
           <a:buNone/>
           <a:tabLst/>
-          <a:defRPr b="0" baseline="0" cap="none" i="0" spc="0" strike="noStrike" sz="1800" u="none" kumimoji="0" normalizeH="0">
+          <a:defRPr kumimoji="0" sz="1800" b="0" i="0" u="none" strike="noStrike" cap="none" spc="0" normalizeH="0" baseline="0">
             <a:ln>
               <a:noFill/>
             </a:ln>
@@ -6998,7 +7124,7 @@
           <a:buFontTx/>
           <a:buNone/>
           <a:tabLst/>
-          <a:defRPr b="0" baseline="0" cap="none" i="0" spc="0" strike="noStrike" sz="1800" u="none" kumimoji="0" normalizeH="0">
+          <a:defRPr kumimoji="0" sz="1800" b="0" i="0" u="none" strike="noStrike" cap="none" spc="0" normalizeH="0" baseline="0">
             <a:ln>
               <a:noFill/>
             </a:ln>
@@ -7024,7 +7150,7 @@
           <a:buFontTx/>
           <a:buNone/>
           <a:tabLst/>
-          <a:defRPr b="0" baseline="0" cap="none" i="0" spc="0" strike="noStrike" sz="1800" u="none" kumimoji="0" normalizeH="0">
+          <a:defRPr kumimoji="0" sz="1800" b="0" i="0" u="none" strike="noStrike" cap="none" spc="0" normalizeH="0" baseline="0">
             <a:ln>
               <a:noFill/>
             </a:ln>
@@ -7037,9 +7163,15 @@
         </a:lvl9pPr>
       </a:lstStyle>
       <a:style>
-        <a:lnRef idx="0"/>
-        <a:fillRef idx="0"/>
-        <a:effectRef idx="0"/>
+        <a:lnRef idx="0">
+          <a:scrgbClr r="0" g="0" b="0"/>
+        </a:lnRef>
+        <a:fillRef idx="0">
+          <a:scrgbClr r="0" g="0" b="0"/>
+        </a:fillRef>
+        <a:effectRef idx="0">
+          <a:scrgbClr r="0" g="0" b="0"/>
+        </a:effectRef>
         <a:fontRef idx="none"/>
       </a:style>
     </a:spDef>
@@ -7054,7 +7186,7 @@
           <a:round/>
         </a:ln>
         <a:effectLst>
-          <a:outerShdw sx="100000" sy="100000" kx="0" ky="0" algn="b" rotWithShape="0" blurRad="38100" dist="20000" dir="5400000">
+          <a:outerShdw blurRad="38100" dist="20000" dir="5400000" rotWithShape="0">
             <a:srgbClr val="000000">
               <a:alpha val="38000"/>
             </a:srgbClr>
@@ -7062,7 +7194,7 @@
         </a:effectLst>
         <a:sp3d/>
       </a:spPr>
-      <a:bodyPr rot="0" spcFirstLastPara="1" vertOverflow="overflow" horzOverflow="overflow" vert="horz" wrap="square" lIns="91439" tIns="45719" rIns="91439" bIns="45719" numCol="1" spcCol="38100" rtlCol="0" anchor="t" upright="0">
+      <a:bodyPr rot="0" spcFirstLastPara="1" vertOverflow="overflow" horzOverflow="overflow" vert="horz" wrap="square" lIns="91439" tIns="45719" rIns="91439" bIns="45719" numCol="1" spcCol="38100" rtlCol="0" anchor="t">
         <a:noAutofit/>
       </a:bodyPr>
       <a:lstStyle>
@@ -7081,7 +7213,7 @@
           <a:buFontTx/>
           <a:buNone/>
           <a:tabLst/>
-          <a:defRPr b="0" baseline="0" cap="none" i="0" spc="0" strike="noStrike" sz="1800" u="none" kumimoji="0" normalizeH="0">
+          <a:defRPr kumimoji="0" sz="1800" b="0" i="0" u="none" strike="noStrike" cap="none" spc="0" normalizeH="0" baseline="0">
             <a:ln>
               <a:noFill/>
             </a:ln>
@@ -7107,7 +7239,7 @@
           <a:buFontTx/>
           <a:buNone/>
           <a:tabLst/>
-          <a:defRPr b="0" baseline="0" cap="none" i="0" spc="0" strike="noStrike" sz="1800" u="none" kumimoji="0" normalizeH="0">
+          <a:defRPr kumimoji="0" sz="1800" b="0" i="0" u="none" strike="noStrike" cap="none" spc="0" normalizeH="0" baseline="0">
             <a:ln>
               <a:noFill/>
             </a:ln>
@@ -7133,7 +7265,7 @@
           <a:buFontTx/>
           <a:buNone/>
           <a:tabLst/>
-          <a:defRPr b="0" baseline="0" cap="none" i="0" spc="0" strike="noStrike" sz="1800" u="none" kumimoji="0" normalizeH="0">
+          <a:defRPr kumimoji="0" sz="1800" b="0" i="0" u="none" strike="noStrike" cap="none" spc="0" normalizeH="0" baseline="0">
             <a:ln>
               <a:noFill/>
             </a:ln>
@@ -7159,7 +7291,7 @@
           <a:buFontTx/>
           <a:buNone/>
           <a:tabLst/>
-          <a:defRPr b="0" baseline="0" cap="none" i="0" spc="0" strike="noStrike" sz="1800" u="none" kumimoji="0" normalizeH="0">
+          <a:defRPr kumimoji="0" sz="1800" b="0" i="0" u="none" strike="noStrike" cap="none" spc="0" normalizeH="0" baseline="0">
             <a:ln>
               <a:noFill/>
             </a:ln>
@@ -7185,7 +7317,7 @@
           <a:buFontTx/>
           <a:buNone/>
           <a:tabLst/>
-          <a:defRPr b="0" baseline="0" cap="none" i="0" spc="0" strike="noStrike" sz="1800" u="none" kumimoji="0" normalizeH="0">
+          <a:defRPr kumimoji="0" sz="1800" b="0" i="0" u="none" strike="noStrike" cap="none" spc="0" normalizeH="0" baseline="0">
             <a:ln>
               <a:noFill/>
             </a:ln>
@@ -7211,7 +7343,7 @@
           <a:buFontTx/>
           <a:buNone/>
           <a:tabLst/>
-          <a:defRPr b="0" baseline="0" cap="none" i="0" spc="0" strike="noStrike" sz="1800" u="none" kumimoji="0" normalizeH="0">
+          <a:defRPr kumimoji="0" sz="1800" b="0" i="0" u="none" strike="noStrike" cap="none" spc="0" normalizeH="0" baseline="0">
             <a:ln>
               <a:noFill/>
             </a:ln>
@@ -7237,7 +7369,7 @@
           <a:buFontTx/>
           <a:buNone/>
           <a:tabLst/>
-          <a:defRPr b="0" baseline="0" cap="none" i="0" spc="0" strike="noStrike" sz="1800" u="none" kumimoji="0" normalizeH="0">
+          <a:defRPr kumimoji="0" sz="1800" b="0" i="0" u="none" strike="noStrike" cap="none" spc="0" normalizeH="0" baseline="0">
             <a:ln>
               <a:noFill/>
             </a:ln>
@@ -7263,7 +7395,7 @@
           <a:buFontTx/>
           <a:buNone/>
           <a:tabLst/>
-          <a:defRPr b="0" baseline="0" cap="none" i="0" spc="0" strike="noStrike" sz="1800" u="none" kumimoji="0" normalizeH="0">
+          <a:defRPr kumimoji="0" sz="1800" b="0" i="0" u="none" strike="noStrike" cap="none" spc="0" normalizeH="0" baseline="0">
             <a:ln>
               <a:noFill/>
             </a:ln>
@@ -7289,7 +7421,7 @@
           <a:buFontTx/>
           <a:buNone/>
           <a:tabLst/>
-          <a:defRPr b="0" baseline="0" cap="none" i="0" spc="0" strike="noStrike" sz="1800" u="none" kumimoji="0" normalizeH="0">
+          <a:defRPr kumimoji="0" sz="1800" b="0" i="0" u="none" strike="noStrike" cap="none" spc="0" normalizeH="0" baseline="0">
             <a:ln>
               <a:noFill/>
             </a:ln>
@@ -7315,7 +7447,7 @@
           <a:buFontTx/>
           <a:buNone/>
           <a:tabLst/>
-          <a:defRPr b="0" baseline="0" cap="none" i="0" spc="0" strike="noStrike" sz="1800" u="none" kumimoji="0" normalizeH="0">
+          <a:defRPr kumimoji="0" sz="1800" b="0" i="0" u="none" strike="noStrike" cap="none" spc="0" normalizeH="0" baseline="0">
             <a:ln>
               <a:noFill/>
             </a:ln>
@@ -7328,9 +7460,15 @@
         </a:lvl9pPr>
       </a:lstStyle>
       <a:style>
-        <a:lnRef idx="0"/>
-        <a:fillRef idx="0"/>
-        <a:effectRef idx="0"/>
+        <a:lnRef idx="0">
+          <a:scrgbClr r="0" g="0" b="0"/>
+        </a:lnRef>
+        <a:fillRef idx="0">
+          <a:scrgbClr r="0" g="0" b="0"/>
+        </a:fillRef>
+        <a:effectRef idx="0">
+          <a:scrgbClr r="0" g="0" b="0"/>
+        </a:effectRef>
         <a:fontRef idx="none"/>
       </a:style>
     </a:lnDef>
@@ -7344,7 +7482,7 @@
         <a:effectLst/>
         <a:sp3d/>
       </a:spPr>
-      <a:bodyPr rot="0" spcFirstLastPara="1" vertOverflow="overflow" horzOverflow="overflow" vert="horz" wrap="square" lIns="45719" tIns="45719" rIns="45719" bIns="45719" numCol="1" spcCol="38100" rtlCol="0" anchor="t" upright="0">
+      <a:bodyPr rot="0" spcFirstLastPara="1" vertOverflow="overflow" horzOverflow="overflow" vert="horz" wrap="square" lIns="45719" tIns="45719" rIns="45719" bIns="45719" numCol="1" spcCol="38100" rtlCol="0" anchor="t">
         <a:spAutoFit/>
       </a:bodyPr>
       <a:lstStyle>
@@ -7363,7 +7501,7 @@
           <a:buFontTx/>
           <a:buNone/>
           <a:tabLst/>
-          <a:defRPr b="0" baseline="0" cap="none" i="0" spc="0" strike="noStrike" sz="1800" u="none" kumimoji="0" normalizeH="0">
+          <a:defRPr kumimoji="0" sz="1800" b="0" i="0" u="none" strike="noStrike" cap="none" spc="0" normalizeH="0" baseline="0">
             <a:ln>
               <a:noFill/>
             </a:ln>
@@ -7393,7 +7531,7 @@
           <a:buFontTx/>
           <a:buNone/>
           <a:tabLst/>
-          <a:defRPr b="0" baseline="0" cap="none" i="0" spc="0" strike="noStrike" sz="1800" u="none" kumimoji="0" normalizeH="0">
+          <a:defRPr kumimoji="0" sz="1800" b="0" i="0" u="none" strike="noStrike" cap="none" spc="0" normalizeH="0" baseline="0">
             <a:ln>
               <a:noFill/>
             </a:ln>
@@ -7419,7 +7557,7 @@
           <a:buFontTx/>
           <a:buNone/>
           <a:tabLst/>
-          <a:defRPr b="0" baseline="0" cap="none" i="0" spc="0" strike="noStrike" sz="1800" u="none" kumimoji="0" normalizeH="0">
+          <a:defRPr kumimoji="0" sz="1800" b="0" i="0" u="none" strike="noStrike" cap="none" spc="0" normalizeH="0" baseline="0">
             <a:ln>
               <a:noFill/>
             </a:ln>
@@ -7445,7 +7583,7 @@
           <a:buFontTx/>
           <a:buNone/>
           <a:tabLst/>
-          <a:defRPr b="0" baseline="0" cap="none" i="0" spc="0" strike="noStrike" sz="1800" u="none" kumimoji="0" normalizeH="0">
+          <a:defRPr kumimoji="0" sz="1800" b="0" i="0" u="none" strike="noStrike" cap="none" spc="0" normalizeH="0" baseline="0">
             <a:ln>
               <a:noFill/>
             </a:ln>
@@ -7471,7 +7609,7 @@
           <a:buFontTx/>
           <a:buNone/>
           <a:tabLst/>
-          <a:defRPr b="0" baseline="0" cap="none" i="0" spc="0" strike="noStrike" sz="1800" u="none" kumimoji="0" normalizeH="0">
+          <a:defRPr kumimoji="0" sz="1800" b="0" i="0" u="none" strike="noStrike" cap="none" spc="0" normalizeH="0" baseline="0">
             <a:ln>
               <a:noFill/>
             </a:ln>
@@ -7497,7 +7635,7 @@
           <a:buFontTx/>
           <a:buNone/>
           <a:tabLst/>
-          <a:defRPr b="0" baseline="0" cap="none" i="0" spc="0" strike="noStrike" sz="1800" u="none" kumimoji="0" normalizeH="0">
+          <a:defRPr kumimoji="0" sz="1800" b="0" i="0" u="none" strike="noStrike" cap="none" spc="0" normalizeH="0" baseline="0">
             <a:ln>
               <a:noFill/>
             </a:ln>
@@ -7523,7 +7661,7 @@
           <a:buFontTx/>
           <a:buNone/>
           <a:tabLst/>
-          <a:defRPr b="0" baseline="0" cap="none" i="0" spc="0" strike="noStrike" sz="1800" u="none" kumimoji="0" normalizeH="0">
+          <a:defRPr kumimoji="0" sz="1800" b="0" i="0" u="none" strike="noStrike" cap="none" spc="0" normalizeH="0" baseline="0">
             <a:ln>
               <a:noFill/>
             </a:ln>
@@ -7549,7 +7687,7 @@
           <a:buFontTx/>
           <a:buNone/>
           <a:tabLst/>
-          <a:defRPr b="0" baseline="0" cap="none" i="0" spc="0" strike="noStrike" sz="1800" u="none" kumimoji="0" normalizeH="0">
+          <a:defRPr kumimoji="0" sz="1800" b="0" i="0" u="none" strike="noStrike" cap="none" spc="0" normalizeH="0" baseline="0">
             <a:ln>
               <a:noFill/>
             </a:ln>
@@ -7575,7 +7713,7 @@
           <a:buFontTx/>
           <a:buNone/>
           <a:tabLst/>
-          <a:defRPr b="0" baseline="0" cap="none" i="0" spc="0" strike="noStrike" sz="1800" u="none" kumimoji="0" normalizeH="0">
+          <a:defRPr kumimoji="0" sz="1800" b="0" i="0" u="none" strike="noStrike" cap="none" spc="0" normalizeH="0" baseline="0">
             <a:ln>
               <a:noFill/>
             </a:ln>
@@ -7601,7 +7739,7 @@
           <a:buFontTx/>
           <a:buNone/>
           <a:tabLst/>
-          <a:defRPr b="0" baseline="0" cap="none" i="0" spc="0" strike="noStrike" sz="1800" u="none" kumimoji="0" normalizeH="0">
+          <a:defRPr kumimoji="0" sz="1800" b="0" i="0" u="none" strike="noStrike" cap="none" spc="0" normalizeH="0" baseline="0">
             <a:ln>
               <a:noFill/>
             </a:ln>
@@ -7614,12 +7752,19 @@
         </a:lvl9pPr>
       </a:lstStyle>
       <a:style>
-        <a:lnRef idx="0"/>
-        <a:fillRef idx="0"/>
-        <a:effectRef idx="0"/>
+        <a:lnRef idx="0">
+          <a:scrgbClr r="0" g="0" b="0"/>
+        </a:lnRef>
+        <a:fillRef idx="0">
+          <a:scrgbClr r="0" g="0" b="0"/>
+        </a:fillRef>
+        <a:effectRef idx="0">
+          <a:scrgbClr r="0" g="0" b="0"/>
+        </a:effectRef>
         <a:fontRef idx="none"/>
       </a:style>
     </a:txDef>
   </a:objectDefaults>
+  <a:extraClrSchemeLst/>
 </a:theme>
 </file>
</xml_diff>